<commit_message>
automatically open ppt after completion
</commit_message>
<xml_diff>
--- a/shapes-test.pptx
+++ b/shapes-test.pptx
@@ -5,7 +5,7 @@
     <p:sldMasterId id="2147483648" r:id="rId1"/>
   </p:sldMasterIdLst>
   <p:sldIdLst>
-    <p:sldId id="256" r:id="rId-dfdd234a-7264-4aa7-a4c1-03b81af0f200"/>
+    <p:sldId id="256" r:id="rId-4b1be5ab-8be9-48d7-8cf5-bd165e693c56"/>
   </p:sldIdLst>
   <p:sldSz cx="9144000" cy="6858000" type="screen4x3"/>
   <p:notesSz cx="6858000" cy="9144000"/>
@@ -734,8 +734,8 @@
         </p:nvSpPr>
         <p:spPr>
           <a:xfrm>
-            <a:off x="3644900" y="6769100"/>
-            <a:ext cx="1981200" cy="1612900"/>
+            <a:off x="7848600" y="2679700"/>
+            <a:ext cx="2159000" cy="431800"/>
           </a:xfrm>
           <a:prstGeom prst="rect">
             <a:avLst/>
@@ -758,8 +758,8 @@
         </p:nvSpPr>
         <p:spPr>
           <a:xfrm>
-            <a:off x="3657600" y="7835900"/>
-            <a:ext cx="1955800" cy="533400"/>
+            <a:off x="4165600" y="2679700"/>
+            <a:ext cx="2159000" cy="431800"/>
           </a:xfrm>
           <a:prstGeom prst="rect">
             <a:avLst/>
@@ -782,8 +782,8 @@
         </p:nvSpPr>
         <p:spPr>
           <a:xfrm>
-            <a:off x="3657600" y="7315200"/>
-            <a:ext cx="1955800" cy="520700"/>
+            <a:off x="469900" y="2679700"/>
+            <a:ext cx="2159000" cy="431800"/>
           </a:xfrm>
           <a:prstGeom prst="rect">
             <a:avLst/>
@@ -806,8 +806,8 @@
         </p:nvSpPr>
         <p:spPr>
           <a:xfrm>
-            <a:off x="3657600" y="6781800"/>
-            <a:ext cx="1955800" cy="520700"/>
+            <a:off x="7848600" y="584200"/>
+            <a:ext cx="2159000" cy="2095500"/>
           </a:xfrm>
           <a:prstGeom prst="rect">
             <a:avLst/>
@@ -830,8 +830,8 @@
         </p:nvSpPr>
         <p:spPr>
           <a:xfrm>
-            <a:off x="4318000" y="5969000"/>
-            <a:ext cx="774700" cy="584200"/>
+            <a:off x="4165600" y="584200"/>
+            <a:ext cx="2159000" cy="2095500"/>
           </a:xfrm>
           <a:prstGeom prst="rect">
             <a:avLst/>
@@ -854,556 +854,8 @@
         </p:nvSpPr>
         <p:spPr>
           <a:xfrm>
-            <a:off x="4305300" y="5956300"/>
-            <a:ext cx="800100" cy="609600"/>
-          </a:xfrm>
-          <a:prstGeom prst="octagon">
-            <a:avLst>
-              <a:gd name="adj" fmla="val 29289"/>
-            </a:avLst>
-          </a:prstGeom>
-          <a:solidFill>
-            <a:srgbClr val="ffffff"/>
-          </a:solidFill>
-        </p:spPr>
-        <p:txBody>
-          <a:bodyPr rtlCol="0" wrap="square" anchor="ctr"/>
-          <a:lstStyle/>
-          <a:p/>
-        </p:txBody>
-      </p:sp>
-      <p:sp>
-        <p:nvSpPr>
-          <p:cNvPr id="7" name="Shape 7"/>
-          <p:cNvSpPr/>
-          <p:nvPr/>
-        </p:nvSpPr>
-        <p:spPr>
-          <a:xfrm>
-            <a:off x="2781300" y="4826000"/>
-            <a:ext cx="1308100" cy="1231900"/>
-          </a:xfrm>
-          <a:prstGeom prst="hexagon">
-            <a:avLst>
-              <a:gd name="adj" fmla="val 25000"/>
-              <a:gd name="vf" fmla="val 115470"/>
-            </a:avLst>
-          </a:prstGeom>
-          <a:solidFill>
-            <a:srgbClr val="ffffff"/>
-          </a:solidFill>
-        </p:spPr>
-        <p:txBody>
-          <a:bodyPr rtlCol="0" wrap="square" anchor="ctr"/>
-          <a:lstStyle/>
-          <a:p/>
-        </p:txBody>
-      </p:sp>
-      <p:sp>
-        <p:nvSpPr>
-          <p:cNvPr id="8" name="Shape 8"/>
-          <p:cNvSpPr/>
-          <p:nvPr/>
-        </p:nvSpPr>
-        <p:spPr>
-          <a:xfrm>
-            <a:off x="5334000" y="4711700"/>
-            <a:ext cx="1397000" cy="1409700"/>
-          </a:xfrm>
-          <a:prstGeom prst="hexagon">
-            <a:avLst>
-              <a:gd name="adj" fmla="val 25000"/>
-              <a:gd name="vf" fmla="val 115470"/>
-            </a:avLst>
-          </a:prstGeom>
-          <a:solidFill>
-            <a:srgbClr val="ffffff"/>
-          </a:solidFill>
-        </p:spPr>
-        <p:txBody>
-          <a:bodyPr rtlCol="0" wrap="square" anchor="ctr"/>
-          <a:lstStyle/>
-          <a:p/>
-        </p:txBody>
-      </p:sp>
-      <p:sp>
-        <p:nvSpPr>
-          <p:cNvPr id="9" name="Shape 9"/>
-          <p:cNvSpPr/>
-          <p:nvPr/>
-        </p:nvSpPr>
-        <p:spPr>
-          <a:xfrm>
-            <a:off x="2209800" y="3987800"/>
-            <a:ext cx="774700" cy="584200"/>
-          </a:xfrm>
-          <a:prstGeom prst="rect">
-            <a:avLst/>
-          </a:prstGeom>
-          <a:solidFill>
-            <a:srgbClr val="ffffff"/>
-          </a:solidFill>
-        </p:spPr>
-        <p:txBody>
-          <a:bodyPr rtlCol="0" wrap="square" anchor="ctr"/>
-          <a:lstStyle/>
-          <a:p/>
-        </p:txBody>
-      </p:sp>
-      <p:sp>
-        <p:nvSpPr>
-          <p:cNvPr id="10" name="Shape 10"/>
-          <p:cNvSpPr/>
-          <p:nvPr/>
-        </p:nvSpPr>
-        <p:spPr>
-          <a:xfrm>
-            <a:off x="2197100" y="3975100"/>
-            <a:ext cx="800100" cy="609600"/>
-          </a:xfrm>
-          <a:prstGeom prst="octagon">
-            <a:avLst>
-              <a:gd name="adj" fmla="val 29289"/>
-            </a:avLst>
-          </a:prstGeom>
-          <a:solidFill>
-            <a:srgbClr val="ffffff"/>
-          </a:solidFill>
-        </p:spPr>
-        <p:txBody>
-          <a:bodyPr rtlCol="0" wrap="square" anchor="ctr"/>
-          <a:lstStyle/>
-          <a:p/>
-        </p:txBody>
-      </p:sp>
-      <p:sp>
-        <p:nvSpPr>
-          <p:cNvPr id="11" name="Shape 11"/>
-          <p:cNvSpPr/>
-          <p:nvPr/>
-        </p:nvSpPr>
-        <p:spPr>
-          <a:xfrm>
-            <a:off x="6578600" y="3924300"/>
-            <a:ext cx="774700" cy="584200"/>
-          </a:xfrm>
-          <a:prstGeom prst="rect">
-            <a:avLst/>
-          </a:prstGeom>
-          <a:solidFill>
-            <a:srgbClr val="ffffff"/>
-          </a:solidFill>
-        </p:spPr>
-        <p:txBody>
-          <a:bodyPr rtlCol="0" wrap="square" anchor="ctr"/>
-          <a:lstStyle/>
-          <a:p/>
-        </p:txBody>
-      </p:sp>
-      <p:sp>
-        <p:nvSpPr>
-          <p:cNvPr id="12" name="Shape 12"/>
-          <p:cNvSpPr/>
-          <p:nvPr/>
-        </p:nvSpPr>
-        <p:spPr>
-          <a:xfrm>
-            <a:off x="6565900" y="3911600"/>
-            <a:ext cx="800100" cy="609600"/>
-          </a:xfrm>
-          <a:prstGeom prst="octagon">
-            <a:avLst>
-              <a:gd name="adj" fmla="val 29289"/>
-            </a:avLst>
-          </a:prstGeom>
-          <a:solidFill>
-            <a:srgbClr val="ffffff"/>
-          </a:solidFill>
-        </p:spPr>
-        <p:txBody>
-          <a:bodyPr rtlCol="0" wrap="square" anchor="ctr"/>
-          <a:lstStyle/>
-          <a:p/>
-        </p:txBody>
-      </p:sp>
-      <p:sp>
-        <p:nvSpPr>
-          <p:cNvPr id="13" name="Shape 13"/>
-          <p:cNvSpPr/>
-          <p:nvPr/>
-        </p:nvSpPr>
-        <p:spPr>
-          <a:xfrm>
-            <a:off x="50800" y="3505200"/>
-            <a:ext cx="1981200" cy="1612900"/>
-          </a:xfrm>
-          <a:prstGeom prst="rect">
-            <a:avLst/>
-          </a:prstGeom>
-          <a:solidFill>
-            <a:srgbClr val="ffffff"/>
-          </a:solidFill>
-        </p:spPr>
-        <p:txBody>
-          <a:bodyPr rtlCol="0" wrap="square" anchor="ctr"/>
-          <a:lstStyle/>
-          <a:p/>
-        </p:txBody>
-      </p:sp>
-      <p:sp>
-        <p:nvSpPr>
-          <p:cNvPr id="14" name="Shape 14"/>
-          <p:cNvSpPr/>
-          <p:nvPr/>
-        </p:nvSpPr>
-        <p:spPr>
-          <a:xfrm>
-            <a:off x="63500" y="4572000"/>
-            <a:ext cx="1955800" cy="533400"/>
-          </a:xfrm>
-          <a:prstGeom prst="rect">
-            <a:avLst/>
-          </a:prstGeom>
-          <a:solidFill>
-            <a:srgbClr val="ffffff"/>
-          </a:solidFill>
-        </p:spPr>
-        <p:txBody>
-          <a:bodyPr rtlCol="0" wrap="square" anchor="ctr"/>
-          <a:lstStyle/>
-          <a:p/>
-        </p:txBody>
-      </p:sp>
-      <p:sp>
-        <p:nvSpPr>
-          <p:cNvPr id="15" name="Shape 15"/>
-          <p:cNvSpPr/>
-          <p:nvPr/>
-        </p:nvSpPr>
-        <p:spPr>
-          <a:xfrm>
-            <a:off x="63500" y="4051300"/>
-            <a:ext cx="1955800" cy="520700"/>
-          </a:xfrm>
-          <a:prstGeom prst="rect">
-            <a:avLst/>
-          </a:prstGeom>
-          <a:solidFill>
-            <a:srgbClr val="ffffff"/>
-          </a:solidFill>
-        </p:spPr>
-        <p:txBody>
-          <a:bodyPr rtlCol="0" wrap="square" anchor="ctr"/>
-          <a:lstStyle/>
-          <a:p/>
-        </p:txBody>
-      </p:sp>
-      <p:sp>
-        <p:nvSpPr>
-          <p:cNvPr id="16" name="Shape 16"/>
-          <p:cNvSpPr/>
-          <p:nvPr/>
-        </p:nvSpPr>
-        <p:spPr>
-          <a:xfrm>
-            <a:off x="63500" y="3517900"/>
-            <a:ext cx="1955800" cy="520700"/>
-          </a:xfrm>
-          <a:prstGeom prst="rect">
-            <a:avLst/>
-          </a:prstGeom>
-          <a:solidFill>
-            <a:srgbClr val="ffffff"/>
-          </a:solidFill>
-        </p:spPr>
-        <p:txBody>
-          <a:bodyPr rtlCol="0" wrap="square" anchor="ctr"/>
-          <a:lstStyle/>
-          <a:p/>
-        </p:txBody>
-      </p:sp>
-      <p:sp>
-        <p:nvSpPr>
-          <p:cNvPr id="17" name="Shape 17"/>
-          <p:cNvSpPr/>
-          <p:nvPr/>
-        </p:nvSpPr>
-        <p:spPr>
-          <a:xfrm>
-            <a:off x="7632700" y="3225800"/>
-            <a:ext cx="1981200" cy="1612900"/>
-          </a:xfrm>
-          <a:prstGeom prst="rect">
-            <a:avLst/>
-          </a:prstGeom>
-          <a:solidFill>
-            <a:srgbClr val="ffffff"/>
-          </a:solidFill>
-        </p:spPr>
-        <p:txBody>
-          <a:bodyPr rtlCol="0" wrap="square" anchor="ctr"/>
-          <a:lstStyle/>
-          <a:p/>
-        </p:txBody>
-      </p:sp>
-      <p:sp>
-        <p:nvSpPr>
-          <p:cNvPr id="18" name="Shape 18"/>
-          <p:cNvSpPr/>
-          <p:nvPr/>
-        </p:nvSpPr>
-        <p:spPr>
-          <a:xfrm>
-            <a:off x="7645400" y="4292600"/>
-            <a:ext cx="1955800" cy="533400"/>
-          </a:xfrm>
-          <a:prstGeom prst="rect">
-            <a:avLst/>
-          </a:prstGeom>
-          <a:solidFill>
-            <a:srgbClr val="ffffff"/>
-          </a:solidFill>
-        </p:spPr>
-        <p:txBody>
-          <a:bodyPr rtlCol="0" wrap="square" anchor="ctr"/>
-          <a:lstStyle/>
-          <a:p/>
-        </p:txBody>
-      </p:sp>
-      <p:sp>
-        <p:nvSpPr>
-          <p:cNvPr id="19" name="Shape 19"/>
-          <p:cNvSpPr/>
-          <p:nvPr/>
-        </p:nvSpPr>
-        <p:spPr>
-          <a:xfrm>
-            <a:off x="7645400" y="3771900"/>
-            <a:ext cx="1955800" cy="520700"/>
-          </a:xfrm>
-          <a:prstGeom prst="rect">
-            <a:avLst/>
-          </a:prstGeom>
-          <a:solidFill>
-            <a:srgbClr val="ffffff"/>
-          </a:solidFill>
-        </p:spPr>
-        <p:txBody>
-          <a:bodyPr rtlCol="0" wrap="square" anchor="ctr"/>
-          <a:lstStyle/>
-          <a:p/>
-        </p:txBody>
-      </p:sp>
-      <p:sp>
-        <p:nvSpPr>
-          <p:cNvPr id="20" name="Shape 20"/>
-          <p:cNvSpPr/>
-          <p:nvPr/>
-        </p:nvSpPr>
-        <p:spPr>
-          <a:xfrm>
-            <a:off x="7645400" y="3238500"/>
-            <a:ext cx="1955800" cy="520700"/>
-          </a:xfrm>
-          <a:prstGeom prst="rect">
-            <a:avLst/>
-          </a:prstGeom>
-          <a:solidFill>
-            <a:srgbClr val="ffffff"/>
-          </a:solidFill>
-        </p:spPr>
-        <p:txBody>
-          <a:bodyPr rtlCol="0" wrap="square" anchor="ctr"/>
-          <a:lstStyle/>
-          <a:p/>
-        </p:txBody>
-      </p:sp>
-      <p:sp>
-        <p:nvSpPr>
-          <p:cNvPr id="21" name="Shape 21"/>
-          <p:cNvSpPr/>
-          <p:nvPr/>
-        </p:nvSpPr>
-        <p:spPr>
-          <a:xfrm>
-            <a:off x="2832100" y="2667000"/>
-            <a:ext cx="1181100" cy="1193800"/>
-          </a:xfrm>
-          <a:prstGeom prst="hexagon">
-            <a:avLst>
-              <a:gd name="adj" fmla="val 25000"/>
-              <a:gd name="vf" fmla="val 115470"/>
-            </a:avLst>
-          </a:prstGeom>
-          <a:solidFill>
-            <a:srgbClr val="ffffff"/>
-          </a:solidFill>
-        </p:spPr>
-        <p:txBody>
-          <a:bodyPr rtlCol="0" wrap="square" anchor="ctr"/>
-          <a:lstStyle/>
-          <a:p/>
-        </p:txBody>
-      </p:sp>
-      <p:sp>
-        <p:nvSpPr>
-          <p:cNvPr id="22" name="Shape 22"/>
-          <p:cNvSpPr/>
-          <p:nvPr/>
-        </p:nvSpPr>
-        <p:spPr>
-          <a:xfrm>
-            <a:off x="5245100" y="2552700"/>
-            <a:ext cx="1460500" cy="1244600"/>
-          </a:xfrm>
-          <a:prstGeom prst="hexagon">
-            <a:avLst>
-              <a:gd name="adj" fmla="val 25000"/>
-              <a:gd name="vf" fmla="val 115470"/>
-            </a:avLst>
-          </a:prstGeom>
-          <a:solidFill>
-            <a:srgbClr val="ffffff"/>
-          </a:solidFill>
-        </p:spPr>
-        <p:txBody>
-          <a:bodyPr rtlCol="0" wrap="square" anchor="ctr"/>
-          <a:lstStyle/>
-          <a:p/>
-        </p:txBody>
-      </p:sp>
-      <p:sp>
-        <p:nvSpPr>
-          <p:cNvPr id="23" name="Shape 23"/>
-          <p:cNvSpPr/>
-          <p:nvPr/>
-        </p:nvSpPr>
-        <p:spPr>
-          <a:xfrm>
-            <a:off x="4330700" y="2133600"/>
-            <a:ext cx="774700" cy="584200"/>
-          </a:xfrm>
-          <a:prstGeom prst="rect">
-            <a:avLst/>
-          </a:prstGeom>
-          <a:solidFill>
-            <a:srgbClr val="ffffff"/>
-          </a:solidFill>
-        </p:spPr>
-        <p:txBody>
-          <a:bodyPr rtlCol="0" wrap="square" anchor="ctr"/>
-          <a:lstStyle/>
-          <a:p/>
-        </p:txBody>
-      </p:sp>
-      <p:sp>
-        <p:nvSpPr>
-          <p:cNvPr id="24" name="Shape 24"/>
-          <p:cNvSpPr/>
-          <p:nvPr/>
-        </p:nvSpPr>
-        <p:spPr>
-          <a:xfrm>
-            <a:off x="4318000" y="2120900"/>
-            <a:ext cx="800100" cy="609600"/>
-          </a:xfrm>
-          <a:prstGeom prst="octagon">
-            <a:avLst>
-              <a:gd name="adj" fmla="val 29289"/>
-            </a:avLst>
-          </a:prstGeom>
-          <a:solidFill>
-            <a:srgbClr val="ffffff"/>
-          </a:solidFill>
-        </p:spPr>
-        <p:txBody>
-          <a:bodyPr rtlCol="0" wrap="square" anchor="ctr"/>
-          <a:lstStyle/>
-          <a:p/>
-        </p:txBody>
-      </p:sp>
-      <p:sp>
-        <p:nvSpPr>
-          <p:cNvPr id="25" name="Shape 25"/>
-          <p:cNvSpPr/>
-          <p:nvPr/>
-        </p:nvSpPr>
-        <p:spPr>
-          <a:xfrm>
-            <a:off x="3873500" y="368300"/>
-            <a:ext cx="1981200" cy="1612900"/>
-          </a:xfrm>
-          <a:prstGeom prst="rect">
-            <a:avLst/>
-          </a:prstGeom>
-          <a:solidFill>
-            <a:srgbClr val="ffffff"/>
-          </a:solidFill>
-        </p:spPr>
-        <p:txBody>
-          <a:bodyPr rtlCol="0" wrap="square" anchor="ctr"/>
-          <a:lstStyle/>
-          <a:p/>
-        </p:txBody>
-      </p:sp>
-      <p:sp>
-        <p:nvSpPr>
-          <p:cNvPr id="26" name="Shape 26"/>
-          <p:cNvSpPr/>
-          <p:nvPr/>
-        </p:nvSpPr>
-        <p:spPr>
-          <a:xfrm>
-            <a:off x="3886200" y="1435100"/>
-            <a:ext cx="1955800" cy="533400"/>
-          </a:xfrm>
-          <a:prstGeom prst="rect">
-            <a:avLst/>
-          </a:prstGeom>
-          <a:solidFill>
-            <a:srgbClr val="ffffff"/>
-          </a:solidFill>
-        </p:spPr>
-        <p:txBody>
-          <a:bodyPr rtlCol="0" wrap="square" anchor="ctr"/>
-          <a:lstStyle/>
-          <a:p/>
-        </p:txBody>
-      </p:sp>
-      <p:sp>
-        <p:nvSpPr>
-          <p:cNvPr id="27" name="Shape 27"/>
-          <p:cNvSpPr/>
-          <p:nvPr/>
-        </p:nvSpPr>
-        <p:spPr>
-          <a:xfrm>
-            <a:off x="3886200" y="914400"/>
-            <a:ext cx="1955800" cy="520700"/>
-          </a:xfrm>
-          <a:prstGeom prst="rect">
-            <a:avLst/>
-          </a:prstGeom>
-          <a:solidFill>
-            <a:srgbClr val="ffffff"/>
-          </a:solidFill>
-        </p:spPr>
-        <p:txBody>
-          <a:bodyPr rtlCol="0" wrap="square" anchor="ctr"/>
-          <a:lstStyle/>
-          <a:p/>
-        </p:txBody>
-      </p:sp>
-      <p:sp>
-        <p:nvSpPr>
-          <p:cNvPr id="28" name="Shape 28"/>
-          <p:cNvSpPr/>
-          <p:nvPr/>
-        </p:nvSpPr>
-        <p:spPr>
-          <a:xfrm>
-            <a:off x="3886200" y="381000"/>
-            <a:ext cx="1955800" cy="520700"/>
+            <a:off x="469900" y="584200"/>
+            <a:ext cx="2159000" cy="2095500"/>
           </a:xfrm>
           <a:prstGeom prst="rect">
             <a:avLst/>

</xml_diff>

<commit_message>
renamed ppt file name
</commit_message>
<xml_diff>
--- a/shapes-test.pptx
+++ b/shapes-test.pptx
@@ -5,9 +5,9 @@
     <p:sldMasterId id="2147483648" r:id="rId1"/>
   </p:sldMasterIdLst>
   <p:sldIdLst>
-    <p:sldId id="256" r:id="rId-4b1be5ab-8be9-48d7-8cf5-bd165e693c56"/>
+    <p:sldId id="256" r:id="rId-d84269f8-5f74-4d80-95b5-f2b0e513b208"/>
   </p:sldIdLst>
-  <p:sldSz cx="9144000" cy="6858000" type="screen4x3"/>
+  <p:sldSz cx="10515600" cy="9144000" type="screen4x3"/>
   <p:notesSz cx="6858000" cy="9144000"/>
   <p:defaultTextStyle>
     <a:defPPr>
@@ -743,6 +743,11 @@
           <a:solidFill>
             <a:srgbClr val="ffffff"/>
           </a:solidFill>
+          <a:ln w="25400">
+            <a:solidFill>
+              <a:srgbClr val="000000"/>
+            </a:solidFill>
+          </a:ln>
         </p:spPr>
         <p:txBody>
           <a:bodyPr rtlCol="0" wrap="square" anchor="ctr"/>
@@ -767,6 +772,11 @@
           <a:solidFill>
             <a:srgbClr val="ffffff"/>
           </a:solidFill>
+          <a:ln w="25400">
+            <a:solidFill>
+              <a:srgbClr val="000000"/>
+            </a:solidFill>
+          </a:ln>
         </p:spPr>
         <p:txBody>
           <a:bodyPr rtlCol="0" wrap="square" anchor="ctr"/>
@@ -791,6 +801,11 @@
           <a:solidFill>
             <a:srgbClr val="ffffff"/>
           </a:solidFill>
+          <a:ln w="25400">
+            <a:solidFill>
+              <a:srgbClr val="000000"/>
+            </a:solidFill>
+          </a:ln>
         </p:spPr>
         <p:txBody>
           <a:bodyPr rtlCol="0" wrap="square" anchor="ctr"/>
@@ -815,6 +830,11 @@
           <a:solidFill>
             <a:srgbClr val="ffffff"/>
           </a:solidFill>
+          <a:ln w="25400">
+            <a:solidFill>
+              <a:srgbClr val="000000"/>
+            </a:solidFill>
+          </a:ln>
         </p:spPr>
         <p:txBody>
           <a:bodyPr rtlCol="0" wrap="square" anchor="ctr"/>
@@ -839,6 +859,11 @@
           <a:solidFill>
             <a:srgbClr val="ffffff"/>
           </a:solidFill>
+          <a:ln w="25400">
+            <a:solidFill>
+              <a:srgbClr val="000000"/>
+            </a:solidFill>
+          </a:ln>
         </p:spPr>
         <p:txBody>
           <a:bodyPr rtlCol="0" wrap="square" anchor="ctr"/>
@@ -863,11 +888,220 @@
           <a:solidFill>
             <a:srgbClr val="ffffff"/>
           </a:solidFill>
+          <a:ln w="25400">
+            <a:solidFill>
+              <a:srgbClr val="000000"/>
+            </a:solidFill>
+          </a:ln>
         </p:spPr>
         <p:txBody>
           <a:bodyPr rtlCol="0" wrap="square" anchor="ctr"/>
           <a:lstStyle/>
           <a:p/>
+        </p:txBody>
+      </p:sp>
+      <p:sp>
+        <p:nvSpPr>
+          <p:cNvPr id="1" name="Text 1"/>
+          <p:cNvSpPr txBox="1"/>
+          <p:nvPr/>
+        </p:nvSpPr>
+        <p:spPr>
+          <a:xfrm>
+            <a:off x="1282700" y="1485900"/>
+            <a:ext cx="2540000" cy="381000"/>
+          </a:xfrm>
+          <a:prstGeom prst="rect">
+            <a:avLst/>
+          </a:prstGeom>
+          <a:noFill/>
+        </p:spPr>
+        <p:txBody>
+          <a:bodyPr rtlCol="0" wrap="none" anchor="ctr"/>
+          <a:lstStyle/>
+          <a:p>
+            <a:pPr algn="l"/>
+            <a:r>
+              <a:rPr lang="en-US" smtClean="0" sz="2000">
+                <a:solidFill>
+                  <a:srgbClr val="000000"/>
+                </a:solidFill>
+                <a:latin typeface="Alien Encounters" pitchFamily="0" charset="0"/>
+                <a:cs typeface="Alien Encounters" pitchFamily="0" charset="0"/>
+              </a:rPr>
+              <a:t>Data</a:t>
+            </a:r>
+          </a:p>
+        </p:txBody>
+      </p:sp>
+      <p:sp>
+        <p:nvSpPr>
+          <p:cNvPr id="2" name="Text 2"/>
+          <p:cNvSpPr txBox="1"/>
+          <p:nvPr/>
+        </p:nvSpPr>
+        <p:spPr>
+          <a:xfrm>
+            <a:off x="4991100" y="1485900"/>
+            <a:ext cx="2540000" cy="381000"/>
+          </a:xfrm>
+          <a:prstGeom prst="rect">
+            <a:avLst/>
+          </a:prstGeom>
+          <a:noFill/>
+        </p:spPr>
+        <p:txBody>
+          <a:bodyPr rtlCol="0" wrap="none" anchor="ctr"/>
+          <a:lstStyle/>
+          <a:p>
+            <a:pPr algn="l"/>
+            <a:r>
+              <a:rPr lang="en-US" smtClean="0" sz="2000">
+                <a:solidFill>
+                  <a:srgbClr val="000000"/>
+                </a:solidFill>
+                <a:latin typeface="Alien Encounters" pitchFamily="0" charset="0"/>
+                <a:cs typeface="Alien Encounters" pitchFamily="0" charset="0"/>
+              </a:rPr>
+              <a:t>Data</a:t>
+            </a:r>
+          </a:p>
+        </p:txBody>
+      </p:sp>
+      <p:sp>
+        <p:nvSpPr>
+          <p:cNvPr id="3" name="Text 3"/>
+          <p:cNvSpPr txBox="1"/>
+          <p:nvPr/>
+        </p:nvSpPr>
+        <p:spPr>
+          <a:xfrm>
+            <a:off x="8674100" y="1485900"/>
+            <a:ext cx="2540000" cy="381000"/>
+          </a:xfrm>
+          <a:prstGeom prst="rect">
+            <a:avLst/>
+          </a:prstGeom>
+          <a:noFill/>
+        </p:spPr>
+        <p:txBody>
+          <a:bodyPr rtlCol="0" wrap="none" anchor="ctr"/>
+          <a:lstStyle/>
+          <a:p>
+            <a:pPr algn="l"/>
+            <a:r>
+              <a:rPr lang="en-US" smtClean="0" sz="2000">
+                <a:solidFill>
+                  <a:srgbClr val="000000"/>
+                </a:solidFill>
+                <a:latin typeface="Alien Encounters" pitchFamily="0" charset="0"/>
+                <a:cs typeface="Alien Encounters" pitchFamily="0" charset="0"/>
+              </a:rPr>
+              <a:t>Data</a:t>
+            </a:r>
+          </a:p>
+        </p:txBody>
+      </p:sp>
+      <p:sp>
+        <p:nvSpPr>
+          <p:cNvPr id="4" name="Text 4"/>
+          <p:cNvSpPr txBox="1"/>
+          <p:nvPr/>
+        </p:nvSpPr>
+        <p:spPr>
+          <a:xfrm>
+            <a:off x="1003300" y="2781300"/>
+            <a:ext cx="2540000" cy="381000"/>
+          </a:xfrm>
+          <a:prstGeom prst="rect">
+            <a:avLst/>
+          </a:prstGeom>
+          <a:noFill/>
+        </p:spPr>
+        <p:txBody>
+          <a:bodyPr rtlCol="0" wrap="none" anchor="ctr"/>
+          <a:lstStyle/>
+          <a:p>
+            <a:pPr algn="l"/>
+            <a:r>
+              <a:rPr lang="en-US" smtClean="0" sz="2000">
+                <a:solidFill>
+                  <a:srgbClr val="000000"/>
+                </a:solidFill>
+                <a:latin typeface="Alien Encounters" pitchFamily="0" charset="0"/>
+                <a:cs typeface="Alien Encounters" pitchFamily="0" charset="0"/>
+              </a:rPr>
+              <a:t>Reference</a:t>
+            </a:r>
+          </a:p>
+        </p:txBody>
+      </p:sp>
+      <p:sp>
+        <p:nvSpPr>
+          <p:cNvPr id="5" name="Text 5"/>
+          <p:cNvSpPr txBox="1"/>
+          <p:nvPr/>
+        </p:nvSpPr>
+        <p:spPr>
+          <a:xfrm>
+            <a:off x="4673600" y="2743200"/>
+            <a:ext cx="2540000" cy="381000"/>
+          </a:xfrm>
+          <a:prstGeom prst="rect">
+            <a:avLst/>
+          </a:prstGeom>
+          <a:noFill/>
+        </p:spPr>
+        <p:txBody>
+          <a:bodyPr rtlCol="0" wrap="none" anchor="ctr"/>
+          <a:lstStyle/>
+          <a:p>
+            <a:pPr algn="l"/>
+            <a:r>
+              <a:rPr lang="en-US" smtClean="0" sz="2000">
+                <a:solidFill>
+                  <a:srgbClr val="000000"/>
+                </a:solidFill>
+                <a:latin typeface="Alien Encounters" pitchFamily="0" charset="0"/>
+                <a:cs typeface="Alien Encounters" pitchFamily="0" charset="0"/>
+              </a:rPr>
+              <a:t>Reference</a:t>
+            </a:r>
+          </a:p>
+        </p:txBody>
+      </p:sp>
+      <p:sp>
+        <p:nvSpPr>
+          <p:cNvPr id="6" name="Text 6"/>
+          <p:cNvSpPr txBox="1"/>
+          <p:nvPr/>
+        </p:nvSpPr>
+        <p:spPr>
+          <a:xfrm>
+            <a:off x="8407400" y="2781300"/>
+            <a:ext cx="2540000" cy="381000"/>
+          </a:xfrm>
+          <a:prstGeom prst="rect">
+            <a:avLst/>
+          </a:prstGeom>
+          <a:noFill/>
+        </p:spPr>
+        <p:txBody>
+          <a:bodyPr rtlCol="0" wrap="none" anchor="ctr"/>
+          <a:lstStyle/>
+          <a:p>
+            <a:pPr algn="l"/>
+            <a:r>
+              <a:rPr lang="en-US" smtClean="0" sz="2000">
+                <a:solidFill>
+                  <a:srgbClr val="000000"/>
+                </a:solidFill>
+                <a:latin typeface="Alien Encounters" pitchFamily="0" charset="0"/>
+                <a:cs typeface="Alien Encounters" pitchFamily="0" charset="0"/>
+              </a:rPr>
+              <a:t>Reference</a:t>
+            </a:r>
+          </a:p>
         </p:txBody>
       </p:sp>
     </p:spTree>

</xml_diff>

<commit_message>
seperated erase text logic to new file
</commit_message>
<xml_diff>
--- a/shapes-test.pptx
+++ b/shapes-test.pptx
@@ -5,7 +5,7 @@
     <p:sldMasterId id="2147483648" r:id="rId1"/>
   </p:sldMasterIdLst>
   <p:sldIdLst>
-    <p:sldId id="256" r:id="rId-d84269f8-5f74-4d80-95b5-f2b0e513b208"/>
+    <p:sldId id="256" r:id="rId-e4add9cd-4015-49f1-b5b7-ececdb25d090"/>
   </p:sldIdLst>
   <p:sldSz cx="10515600" cy="9144000" type="screen4x3"/>
   <p:notesSz cx="6858000" cy="9144000"/>
@@ -734,8 +734,8 @@
         </p:nvSpPr>
         <p:spPr>
           <a:xfrm>
-            <a:off x="7848600" y="2679700"/>
-            <a:ext cx="2159000" cy="431800"/>
+            <a:off x="3644900" y="6769100"/>
+            <a:ext cx="1981200" cy="1612900"/>
           </a:xfrm>
           <a:prstGeom prst="rect">
             <a:avLst/>
@@ -763,8 +763,8 @@
         </p:nvSpPr>
         <p:spPr>
           <a:xfrm>
-            <a:off x="4165600" y="2679700"/>
-            <a:ext cx="2159000" cy="431800"/>
+            <a:off x="3657600" y="7835900"/>
+            <a:ext cx="1955800" cy="533400"/>
           </a:xfrm>
           <a:prstGeom prst="rect">
             <a:avLst/>
@@ -792,8 +792,8 @@
         </p:nvSpPr>
         <p:spPr>
           <a:xfrm>
-            <a:off x="469900" y="2679700"/>
-            <a:ext cx="2159000" cy="431800"/>
+            <a:off x="3657600" y="7315200"/>
+            <a:ext cx="1955800" cy="520700"/>
           </a:xfrm>
           <a:prstGeom prst="rect">
             <a:avLst/>
@@ -821,8 +821,8 @@
         </p:nvSpPr>
         <p:spPr>
           <a:xfrm>
-            <a:off x="7848600" y="584200"/>
-            <a:ext cx="2159000" cy="2095500"/>
+            <a:off x="3657600" y="6781800"/>
+            <a:ext cx="1955800" cy="520700"/>
           </a:xfrm>
           <a:prstGeom prst="rect">
             <a:avLst/>
@@ -850,8 +850,8 @@
         </p:nvSpPr>
         <p:spPr>
           <a:xfrm>
-            <a:off x="4165600" y="584200"/>
-            <a:ext cx="2159000" cy="2095500"/>
+            <a:off x="4318000" y="5969000"/>
+            <a:ext cx="774700" cy="584200"/>
           </a:xfrm>
           <a:prstGeom prst="rect">
             <a:avLst/>
@@ -879,8 +879,666 @@
         </p:nvSpPr>
         <p:spPr>
           <a:xfrm>
-            <a:off x="469900" y="584200"/>
-            <a:ext cx="2159000" cy="2095500"/>
+            <a:off x="4305300" y="5956300"/>
+            <a:ext cx="800100" cy="609600"/>
+          </a:xfrm>
+          <a:prstGeom prst="octagon">
+            <a:avLst>
+              <a:gd name="adj" fmla="val 29289"/>
+            </a:avLst>
+          </a:prstGeom>
+          <a:solidFill>
+            <a:srgbClr val="ffffff"/>
+          </a:solidFill>
+          <a:ln w="25400">
+            <a:solidFill>
+              <a:srgbClr val="000000"/>
+            </a:solidFill>
+          </a:ln>
+        </p:spPr>
+        <p:txBody>
+          <a:bodyPr rtlCol="0" wrap="square" anchor="ctr"/>
+          <a:lstStyle/>
+          <a:p/>
+        </p:txBody>
+      </p:sp>
+      <p:sp>
+        <p:nvSpPr>
+          <p:cNvPr id="7" name="Shape 7"/>
+          <p:cNvSpPr/>
+          <p:nvPr/>
+        </p:nvSpPr>
+        <p:spPr>
+          <a:xfrm>
+            <a:off x="2781300" y="4826000"/>
+            <a:ext cx="1308100" cy="1231900"/>
+          </a:xfrm>
+          <a:prstGeom prst="hexagon">
+            <a:avLst>
+              <a:gd name="adj" fmla="val 25000"/>
+              <a:gd name="vf" fmla="val 115470"/>
+            </a:avLst>
+          </a:prstGeom>
+          <a:solidFill>
+            <a:srgbClr val="ffffff"/>
+          </a:solidFill>
+          <a:ln w="25400">
+            <a:solidFill>
+              <a:srgbClr val="000000"/>
+            </a:solidFill>
+          </a:ln>
+        </p:spPr>
+        <p:txBody>
+          <a:bodyPr rtlCol="0" wrap="square" anchor="ctr"/>
+          <a:lstStyle/>
+          <a:p/>
+        </p:txBody>
+      </p:sp>
+      <p:sp>
+        <p:nvSpPr>
+          <p:cNvPr id="8" name="Shape 8"/>
+          <p:cNvSpPr/>
+          <p:nvPr/>
+        </p:nvSpPr>
+        <p:spPr>
+          <a:xfrm>
+            <a:off x="5334000" y="4711700"/>
+            <a:ext cx="1397000" cy="1409700"/>
+          </a:xfrm>
+          <a:prstGeom prst="hexagon">
+            <a:avLst>
+              <a:gd name="adj" fmla="val 25000"/>
+              <a:gd name="vf" fmla="val 115470"/>
+            </a:avLst>
+          </a:prstGeom>
+          <a:solidFill>
+            <a:srgbClr val="ffffff"/>
+          </a:solidFill>
+          <a:ln w="25400">
+            <a:solidFill>
+              <a:srgbClr val="000000"/>
+            </a:solidFill>
+          </a:ln>
+        </p:spPr>
+        <p:txBody>
+          <a:bodyPr rtlCol="0" wrap="square" anchor="ctr"/>
+          <a:lstStyle/>
+          <a:p/>
+        </p:txBody>
+      </p:sp>
+      <p:sp>
+        <p:nvSpPr>
+          <p:cNvPr id="9" name="Shape 9"/>
+          <p:cNvSpPr/>
+          <p:nvPr/>
+        </p:nvSpPr>
+        <p:spPr>
+          <a:xfrm>
+            <a:off x="2209800" y="3987800"/>
+            <a:ext cx="774700" cy="584200"/>
+          </a:xfrm>
+          <a:prstGeom prst="rect">
+            <a:avLst/>
+          </a:prstGeom>
+          <a:solidFill>
+            <a:srgbClr val="ffffff"/>
+          </a:solidFill>
+          <a:ln w="25400">
+            <a:solidFill>
+              <a:srgbClr val="000000"/>
+            </a:solidFill>
+          </a:ln>
+        </p:spPr>
+        <p:txBody>
+          <a:bodyPr rtlCol="0" wrap="square" anchor="ctr"/>
+          <a:lstStyle/>
+          <a:p/>
+        </p:txBody>
+      </p:sp>
+      <p:sp>
+        <p:nvSpPr>
+          <p:cNvPr id="10" name="Shape 10"/>
+          <p:cNvSpPr/>
+          <p:nvPr/>
+        </p:nvSpPr>
+        <p:spPr>
+          <a:xfrm>
+            <a:off x="2197100" y="3975100"/>
+            <a:ext cx="800100" cy="609600"/>
+          </a:xfrm>
+          <a:prstGeom prst="octagon">
+            <a:avLst>
+              <a:gd name="adj" fmla="val 29289"/>
+            </a:avLst>
+          </a:prstGeom>
+          <a:solidFill>
+            <a:srgbClr val="ffffff"/>
+          </a:solidFill>
+          <a:ln w="25400">
+            <a:solidFill>
+              <a:srgbClr val="000000"/>
+            </a:solidFill>
+          </a:ln>
+        </p:spPr>
+        <p:txBody>
+          <a:bodyPr rtlCol="0" wrap="square" anchor="ctr"/>
+          <a:lstStyle/>
+          <a:p/>
+        </p:txBody>
+      </p:sp>
+      <p:sp>
+        <p:nvSpPr>
+          <p:cNvPr id="11" name="Shape 11"/>
+          <p:cNvSpPr/>
+          <p:nvPr/>
+        </p:nvSpPr>
+        <p:spPr>
+          <a:xfrm>
+            <a:off x="6578600" y="3924300"/>
+            <a:ext cx="774700" cy="584200"/>
+          </a:xfrm>
+          <a:prstGeom prst="rect">
+            <a:avLst/>
+          </a:prstGeom>
+          <a:solidFill>
+            <a:srgbClr val="ffffff"/>
+          </a:solidFill>
+          <a:ln w="25400">
+            <a:solidFill>
+              <a:srgbClr val="000000"/>
+            </a:solidFill>
+          </a:ln>
+        </p:spPr>
+        <p:txBody>
+          <a:bodyPr rtlCol="0" wrap="square" anchor="ctr"/>
+          <a:lstStyle/>
+          <a:p/>
+        </p:txBody>
+      </p:sp>
+      <p:sp>
+        <p:nvSpPr>
+          <p:cNvPr id="12" name="Shape 12"/>
+          <p:cNvSpPr/>
+          <p:nvPr/>
+        </p:nvSpPr>
+        <p:spPr>
+          <a:xfrm>
+            <a:off x="6565900" y="3911600"/>
+            <a:ext cx="800100" cy="609600"/>
+          </a:xfrm>
+          <a:prstGeom prst="octagon">
+            <a:avLst>
+              <a:gd name="adj" fmla="val 29289"/>
+            </a:avLst>
+          </a:prstGeom>
+          <a:solidFill>
+            <a:srgbClr val="ffffff"/>
+          </a:solidFill>
+          <a:ln w="25400">
+            <a:solidFill>
+              <a:srgbClr val="000000"/>
+            </a:solidFill>
+          </a:ln>
+        </p:spPr>
+        <p:txBody>
+          <a:bodyPr rtlCol="0" wrap="square" anchor="ctr"/>
+          <a:lstStyle/>
+          <a:p/>
+        </p:txBody>
+      </p:sp>
+      <p:sp>
+        <p:nvSpPr>
+          <p:cNvPr id="13" name="Shape 13"/>
+          <p:cNvSpPr/>
+          <p:nvPr/>
+        </p:nvSpPr>
+        <p:spPr>
+          <a:xfrm>
+            <a:off x="50800" y="3505200"/>
+            <a:ext cx="1981200" cy="1612900"/>
+          </a:xfrm>
+          <a:prstGeom prst="rect">
+            <a:avLst/>
+          </a:prstGeom>
+          <a:solidFill>
+            <a:srgbClr val="ffffff"/>
+          </a:solidFill>
+          <a:ln w="25400">
+            <a:solidFill>
+              <a:srgbClr val="000000"/>
+            </a:solidFill>
+          </a:ln>
+        </p:spPr>
+        <p:txBody>
+          <a:bodyPr rtlCol="0" wrap="square" anchor="ctr"/>
+          <a:lstStyle/>
+          <a:p/>
+        </p:txBody>
+      </p:sp>
+      <p:sp>
+        <p:nvSpPr>
+          <p:cNvPr id="14" name="Shape 14"/>
+          <p:cNvSpPr/>
+          <p:nvPr/>
+        </p:nvSpPr>
+        <p:spPr>
+          <a:xfrm>
+            <a:off x="63500" y="4572000"/>
+            <a:ext cx="1955800" cy="533400"/>
+          </a:xfrm>
+          <a:prstGeom prst="rect">
+            <a:avLst/>
+          </a:prstGeom>
+          <a:solidFill>
+            <a:srgbClr val="ffffff"/>
+          </a:solidFill>
+          <a:ln w="25400">
+            <a:solidFill>
+              <a:srgbClr val="000000"/>
+            </a:solidFill>
+          </a:ln>
+        </p:spPr>
+        <p:txBody>
+          <a:bodyPr rtlCol="0" wrap="square" anchor="ctr"/>
+          <a:lstStyle/>
+          <a:p/>
+        </p:txBody>
+      </p:sp>
+      <p:sp>
+        <p:nvSpPr>
+          <p:cNvPr id="15" name="Shape 15"/>
+          <p:cNvSpPr/>
+          <p:nvPr/>
+        </p:nvSpPr>
+        <p:spPr>
+          <a:xfrm>
+            <a:off x="63500" y="4051300"/>
+            <a:ext cx="1955800" cy="520700"/>
+          </a:xfrm>
+          <a:prstGeom prst="rect">
+            <a:avLst/>
+          </a:prstGeom>
+          <a:solidFill>
+            <a:srgbClr val="ffffff"/>
+          </a:solidFill>
+          <a:ln w="25400">
+            <a:solidFill>
+              <a:srgbClr val="000000"/>
+            </a:solidFill>
+          </a:ln>
+        </p:spPr>
+        <p:txBody>
+          <a:bodyPr rtlCol="0" wrap="square" anchor="ctr"/>
+          <a:lstStyle/>
+          <a:p/>
+        </p:txBody>
+      </p:sp>
+      <p:sp>
+        <p:nvSpPr>
+          <p:cNvPr id="16" name="Shape 16"/>
+          <p:cNvSpPr/>
+          <p:nvPr/>
+        </p:nvSpPr>
+        <p:spPr>
+          <a:xfrm>
+            <a:off x="63500" y="3517900"/>
+            <a:ext cx="1955800" cy="520700"/>
+          </a:xfrm>
+          <a:prstGeom prst="rect">
+            <a:avLst/>
+          </a:prstGeom>
+          <a:solidFill>
+            <a:srgbClr val="ffffff"/>
+          </a:solidFill>
+          <a:ln w="25400">
+            <a:solidFill>
+              <a:srgbClr val="000000"/>
+            </a:solidFill>
+          </a:ln>
+        </p:spPr>
+        <p:txBody>
+          <a:bodyPr rtlCol="0" wrap="square" anchor="ctr"/>
+          <a:lstStyle/>
+          <a:p/>
+        </p:txBody>
+      </p:sp>
+      <p:sp>
+        <p:nvSpPr>
+          <p:cNvPr id="17" name="Shape 17"/>
+          <p:cNvSpPr/>
+          <p:nvPr/>
+        </p:nvSpPr>
+        <p:spPr>
+          <a:xfrm>
+            <a:off x="7632700" y="3225800"/>
+            <a:ext cx="1981200" cy="1612900"/>
+          </a:xfrm>
+          <a:prstGeom prst="rect">
+            <a:avLst/>
+          </a:prstGeom>
+          <a:solidFill>
+            <a:srgbClr val="ffffff"/>
+          </a:solidFill>
+          <a:ln w="25400">
+            <a:solidFill>
+              <a:srgbClr val="000000"/>
+            </a:solidFill>
+          </a:ln>
+        </p:spPr>
+        <p:txBody>
+          <a:bodyPr rtlCol="0" wrap="square" anchor="ctr"/>
+          <a:lstStyle/>
+          <a:p/>
+        </p:txBody>
+      </p:sp>
+      <p:sp>
+        <p:nvSpPr>
+          <p:cNvPr id="18" name="Shape 18"/>
+          <p:cNvSpPr/>
+          <p:nvPr/>
+        </p:nvSpPr>
+        <p:spPr>
+          <a:xfrm>
+            <a:off x="7645400" y="4292600"/>
+            <a:ext cx="1955800" cy="533400"/>
+          </a:xfrm>
+          <a:prstGeom prst="rect">
+            <a:avLst/>
+          </a:prstGeom>
+          <a:solidFill>
+            <a:srgbClr val="ffffff"/>
+          </a:solidFill>
+          <a:ln w="25400">
+            <a:solidFill>
+              <a:srgbClr val="000000"/>
+            </a:solidFill>
+          </a:ln>
+        </p:spPr>
+        <p:txBody>
+          <a:bodyPr rtlCol="0" wrap="square" anchor="ctr"/>
+          <a:lstStyle/>
+          <a:p/>
+        </p:txBody>
+      </p:sp>
+      <p:sp>
+        <p:nvSpPr>
+          <p:cNvPr id="19" name="Shape 19"/>
+          <p:cNvSpPr/>
+          <p:nvPr/>
+        </p:nvSpPr>
+        <p:spPr>
+          <a:xfrm>
+            <a:off x="7645400" y="3771900"/>
+            <a:ext cx="1955800" cy="520700"/>
+          </a:xfrm>
+          <a:prstGeom prst="rect">
+            <a:avLst/>
+          </a:prstGeom>
+          <a:solidFill>
+            <a:srgbClr val="ffffff"/>
+          </a:solidFill>
+          <a:ln w="25400">
+            <a:solidFill>
+              <a:srgbClr val="000000"/>
+            </a:solidFill>
+          </a:ln>
+        </p:spPr>
+        <p:txBody>
+          <a:bodyPr rtlCol="0" wrap="square" anchor="ctr"/>
+          <a:lstStyle/>
+          <a:p/>
+        </p:txBody>
+      </p:sp>
+      <p:sp>
+        <p:nvSpPr>
+          <p:cNvPr id="20" name="Shape 20"/>
+          <p:cNvSpPr/>
+          <p:nvPr/>
+        </p:nvSpPr>
+        <p:spPr>
+          <a:xfrm>
+            <a:off x="7645400" y="3238500"/>
+            <a:ext cx="1955800" cy="520700"/>
+          </a:xfrm>
+          <a:prstGeom prst="rect">
+            <a:avLst/>
+          </a:prstGeom>
+          <a:solidFill>
+            <a:srgbClr val="ffffff"/>
+          </a:solidFill>
+          <a:ln w="25400">
+            <a:solidFill>
+              <a:srgbClr val="000000"/>
+            </a:solidFill>
+          </a:ln>
+        </p:spPr>
+        <p:txBody>
+          <a:bodyPr rtlCol="0" wrap="square" anchor="ctr"/>
+          <a:lstStyle/>
+          <a:p/>
+        </p:txBody>
+      </p:sp>
+      <p:sp>
+        <p:nvSpPr>
+          <p:cNvPr id="21" name="Shape 21"/>
+          <p:cNvSpPr/>
+          <p:nvPr/>
+        </p:nvSpPr>
+        <p:spPr>
+          <a:xfrm>
+            <a:off x="2832100" y="2667000"/>
+            <a:ext cx="1181100" cy="1193800"/>
+          </a:xfrm>
+          <a:prstGeom prst="hexagon">
+            <a:avLst>
+              <a:gd name="adj" fmla="val 25000"/>
+              <a:gd name="vf" fmla="val 115470"/>
+            </a:avLst>
+          </a:prstGeom>
+          <a:solidFill>
+            <a:srgbClr val="ffffff"/>
+          </a:solidFill>
+          <a:ln w="25400">
+            <a:solidFill>
+              <a:srgbClr val="000000"/>
+            </a:solidFill>
+          </a:ln>
+        </p:spPr>
+        <p:txBody>
+          <a:bodyPr rtlCol="0" wrap="square" anchor="ctr"/>
+          <a:lstStyle/>
+          <a:p/>
+        </p:txBody>
+      </p:sp>
+      <p:sp>
+        <p:nvSpPr>
+          <p:cNvPr id="22" name="Shape 22"/>
+          <p:cNvSpPr/>
+          <p:nvPr/>
+        </p:nvSpPr>
+        <p:spPr>
+          <a:xfrm>
+            <a:off x="5245100" y="2552700"/>
+            <a:ext cx="1460500" cy="1244600"/>
+          </a:xfrm>
+          <a:prstGeom prst="hexagon">
+            <a:avLst>
+              <a:gd name="adj" fmla="val 25000"/>
+              <a:gd name="vf" fmla="val 115470"/>
+            </a:avLst>
+          </a:prstGeom>
+          <a:solidFill>
+            <a:srgbClr val="ffffff"/>
+          </a:solidFill>
+          <a:ln w="25400">
+            <a:solidFill>
+              <a:srgbClr val="000000"/>
+            </a:solidFill>
+          </a:ln>
+        </p:spPr>
+        <p:txBody>
+          <a:bodyPr rtlCol="0" wrap="square" anchor="ctr"/>
+          <a:lstStyle/>
+          <a:p/>
+        </p:txBody>
+      </p:sp>
+      <p:sp>
+        <p:nvSpPr>
+          <p:cNvPr id="23" name="Shape 23"/>
+          <p:cNvSpPr/>
+          <p:nvPr/>
+        </p:nvSpPr>
+        <p:spPr>
+          <a:xfrm>
+            <a:off x="4330700" y="2133600"/>
+            <a:ext cx="774700" cy="584200"/>
+          </a:xfrm>
+          <a:prstGeom prst="rect">
+            <a:avLst/>
+          </a:prstGeom>
+          <a:solidFill>
+            <a:srgbClr val="ffffff"/>
+          </a:solidFill>
+          <a:ln w="25400">
+            <a:solidFill>
+              <a:srgbClr val="000000"/>
+            </a:solidFill>
+          </a:ln>
+        </p:spPr>
+        <p:txBody>
+          <a:bodyPr rtlCol="0" wrap="square" anchor="ctr"/>
+          <a:lstStyle/>
+          <a:p/>
+        </p:txBody>
+      </p:sp>
+      <p:sp>
+        <p:nvSpPr>
+          <p:cNvPr id="24" name="Shape 24"/>
+          <p:cNvSpPr/>
+          <p:nvPr/>
+        </p:nvSpPr>
+        <p:spPr>
+          <a:xfrm>
+            <a:off x="4318000" y="2120900"/>
+            <a:ext cx="800100" cy="609600"/>
+          </a:xfrm>
+          <a:prstGeom prst="octagon">
+            <a:avLst>
+              <a:gd name="adj" fmla="val 29289"/>
+            </a:avLst>
+          </a:prstGeom>
+          <a:solidFill>
+            <a:srgbClr val="ffffff"/>
+          </a:solidFill>
+          <a:ln w="25400">
+            <a:solidFill>
+              <a:srgbClr val="000000"/>
+            </a:solidFill>
+          </a:ln>
+        </p:spPr>
+        <p:txBody>
+          <a:bodyPr rtlCol="0" wrap="square" anchor="ctr"/>
+          <a:lstStyle/>
+          <a:p/>
+        </p:txBody>
+      </p:sp>
+      <p:sp>
+        <p:nvSpPr>
+          <p:cNvPr id="25" name="Shape 25"/>
+          <p:cNvSpPr/>
+          <p:nvPr/>
+        </p:nvSpPr>
+        <p:spPr>
+          <a:xfrm>
+            <a:off x="3873500" y="368300"/>
+            <a:ext cx="1981200" cy="1612900"/>
+          </a:xfrm>
+          <a:prstGeom prst="rect">
+            <a:avLst/>
+          </a:prstGeom>
+          <a:solidFill>
+            <a:srgbClr val="ffffff"/>
+          </a:solidFill>
+          <a:ln w="25400">
+            <a:solidFill>
+              <a:srgbClr val="000000"/>
+            </a:solidFill>
+          </a:ln>
+        </p:spPr>
+        <p:txBody>
+          <a:bodyPr rtlCol="0" wrap="square" anchor="ctr"/>
+          <a:lstStyle/>
+          <a:p/>
+        </p:txBody>
+      </p:sp>
+      <p:sp>
+        <p:nvSpPr>
+          <p:cNvPr id="26" name="Shape 26"/>
+          <p:cNvSpPr/>
+          <p:nvPr/>
+        </p:nvSpPr>
+        <p:spPr>
+          <a:xfrm>
+            <a:off x="3886200" y="1435100"/>
+            <a:ext cx="1955800" cy="533400"/>
+          </a:xfrm>
+          <a:prstGeom prst="rect">
+            <a:avLst/>
+          </a:prstGeom>
+          <a:solidFill>
+            <a:srgbClr val="ffffff"/>
+          </a:solidFill>
+          <a:ln w="25400">
+            <a:solidFill>
+              <a:srgbClr val="000000"/>
+            </a:solidFill>
+          </a:ln>
+        </p:spPr>
+        <p:txBody>
+          <a:bodyPr rtlCol="0" wrap="square" anchor="ctr"/>
+          <a:lstStyle/>
+          <a:p/>
+        </p:txBody>
+      </p:sp>
+      <p:sp>
+        <p:nvSpPr>
+          <p:cNvPr id="27" name="Shape 27"/>
+          <p:cNvSpPr/>
+          <p:nvPr/>
+        </p:nvSpPr>
+        <p:spPr>
+          <a:xfrm>
+            <a:off x="3886200" y="914400"/>
+            <a:ext cx="1955800" cy="520700"/>
+          </a:xfrm>
+          <a:prstGeom prst="rect">
+            <a:avLst/>
+          </a:prstGeom>
+          <a:solidFill>
+            <a:srgbClr val="ffffff"/>
+          </a:solidFill>
+          <a:ln w="25400">
+            <a:solidFill>
+              <a:srgbClr val="000000"/>
+            </a:solidFill>
+          </a:ln>
+        </p:spPr>
+        <p:txBody>
+          <a:bodyPr rtlCol="0" wrap="square" anchor="ctr"/>
+          <a:lstStyle/>
+          <a:p/>
+        </p:txBody>
+      </p:sp>
+      <p:sp>
+        <p:nvSpPr>
+          <p:cNvPr id="28" name="Shape 28"/>
+          <p:cNvSpPr/>
+          <p:nvPr/>
+        </p:nvSpPr>
+        <p:spPr>
+          <a:xfrm>
+            <a:off x="3886200" y="381000"/>
+            <a:ext cx="1955800" cy="520700"/>
           </a:xfrm>
           <a:prstGeom prst="rect">
             <a:avLst/>
@@ -908,7 +1566,7 @@
         </p:nvSpPr>
         <p:spPr>
           <a:xfrm>
-            <a:off x="1282700" y="1485900"/>
+            <a:off x="3937000" y="0"/>
             <a:ext cx="2540000" cy="381000"/>
           </a:xfrm>
           <a:prstGeom prst="rect">
@@ -929,7 +1587,7 @@
                 <a:latin typeface="Alien Encounters" pitchFamily="0" charset="0"/>
                 <a:cs typeface="Alien Encounters" pitchFamily="0" charset="0"/>
               </a:rPr>
-              <a:t>Data</a:t>
+              <a:t>Ledger of Node A</a:t>
             </a:r>
           </a:p>
         </p:txBody>
@@ -942,7 +1600,7 @@
         </p:nvSpPr>
         <p:spPr>
           <a:xfrm>
-            <a:off x="4991100" y="1485900"/>
+            <a:off x="4140200" y="533400"/>
             <a:ext cx="2540000" cy="381000"/>
           </a:xfrm>
           <a:prstGeom prst="rect">
@@ -963,7 +1621,7 @@
                 <a:latin typeface="Alien Encounters" pitchFamily="0" charset="0"/>
                 <a:cs typeface="Alien Encounters" pitchFamily="0" charset="0"/>
               </a:rPr>
-              <a:t>Data</a:t>
+              <a:t>Transaction 1</a:t>
             </a:r>
           </a:p>
         </p:txBody>
@@ -976,7 +1634,7 @@
         </p:nvSpPr>
         <p:spPr>
           <a:xfrm>
-            <a:off x="8674100" y="1485900"/>
+            <a:off x="4127500" y="1054100"/>
             <a:ext cx="2540000" cy="381000"/>
           </a:xfrm>
           <a:prstGeom prst="rect">
@@ -997,7 +1655,7 @@
                 <a:latin typeface="Alien Encounters" pitchFamily="0" charset="0"/>
                 <a:cs typeface="Alien Encounters" pitchFamily="0" charset="0"/>
               </a:rPr>
-              <a:t>Data</a:t>
+              <a:t>Transaction 2</a:t>
             </a:r>
           </a:p>
         </p:txBody>
@@ -1010,7 +1668,7 @@
         </p:nvSpPr>
         <p:spPr>
           <a:xfrm>
-            <a:off x="1003300" y="2781300"/>
+            <a:off x="4127500" y="1562100"/>
             <a:ext cx="2540000" cy="381000"/>
           </a:xfrm>
           <a:prstGeom prst="rect">
@@ -1031,7 +1689,7 @@
                 <a:latin typeface="Alien Encounters" pitchFamily="0" charset="0"/>
                 <a:cs typeface="Alien Encounters" pitchFamily="0" charset="0"/>
               </a:rPr>
-              <a:t>Reference</a:t>
+              <a:t>Transaction 3</a:t>
             </a:r>
           </a:p>
         </p:txBody>
@@ -1044,7 +1702,7 @@
         </p:nvSpPr>
         <p:spPr>
           <a:xfrm>
-            <a:off x="4673600" y="2743200"/>
+            <a:off x="6184900" y="2374900"/>
             <a:ext cx="2540000" cy="381000"/>
           </a:xfrm>
           <a:prstGeom prst="rect">
@@ -1065,7 +1723,7 @@
                 <a:latin typeface="Alien Encounters" pitchFamily="0" charset="0"/>
                 <a:cs typeface="Alien Encounters" pitchFamily="0" charset="0"/>
               </a:rPr>
-              <a:t>Reference</a:t>
+              <a:t>Transaction 1</a:t>
             </a:r>
           </a:p>
         </p:txBody>
@@ -1078,7 +1736,7 @@
         </p:nvSpPr>
         <p:spPr>
           <a:xfrm>
-            <a:off x="8407400" y="2781300"/>
+            <a:off x="6210300" y="2705100"/>
             <a:ext cx="2540000" cy="381000"/>
           </a:xfrm>
           <a:prstGeom prst="rect">
@@ -1099,7 +1757,551 @@
                 <a:latin typeface="Alien Encounters" pitchFamily="0" charset="0"/>
                 <a:cs typeface="Alien Encounters" pitchFamily="0" charset="0"/>
               </a:rPr>
-              <a:t>Reference</a:t>
+              <a:t>A send E5 to B</a:t>
+            </a:r>
+          </a:p>
+        </p:txBody>
+      </p:sp>
+      <p:sp>
+        <p:nvSpPr>
+          <p:cNvPr id="7" name="Text 7"/>
+          <p:cNvSpPr txBox="1"/>
+          <p:nvPr/>
+        </p:nvSpPr>
+        <p:spPr>
+          <a:xfrm>
+            <a:off x="7912100" y="3390900"/>
+            <a:ext cx="2540000" cy="381000"/>
+          </a:xfrm>
+          <a:prstGeom prst="rect">
+            <a:avLst/>
+          </a:prstGeom>
+          <a:noFill/>
+        </p:spPr>
+        <p:txBody>
+          <a:bodyPr rtlCol="0" wrap="none" anchor="ctr"/>
+          <a:lstStyle/>
+          <a:p>
+            <a:pPr algn="l"/>
+            <a:r>
+              <a:rPr lang="en-US" smtClean="0" sz="2000">
+                <a:solidFill>
+                  <a:srgbClr val="000000"/>
+                </a:solidFill>
+                <a:latin typeface="Alien Encounters" pitchFamily="0" charset="0"/>
+                <a:cs typeface="Alien Encounters" pitchFamily="0" charset="0"/>
+              </a:rPr>
+              <a:t>Transaction 1</a:t>
+            </a:r>
+          </a:p>
+        </p:txBody>
+      </p:sp>
+      <p:sp>
+        <p:nvSpPr>
+          <p:cNvPr id="8" name="Text 8"/>
+          <p:cNvSpPr txBox="1"/>
+          <p:nvPr/>
+        </p:nvSpPr>
+        <p:spPr>
+          <a:xfrm>
+            <a:off x="292100" y="3670300"/>
+            <a:ext cx="2540000" cy="381000"/>
+          </a:xfrm>
+          <a:prstGeom prst="rect">
+            <a:avLst/>
+          </a:prstGeom>
+          <a:noFill/>
+        </p:spPr>
+        <p:txBody>
+          <a:bodyPr rtlCol="0" wrap="none" anchor="ctr"/>
+          <a:lstStyle/>
+          <a:p>
+            <a:pPr algn="l"/>
+            <a:r>
+              <a:rPr lang="en-US" smtClean="0" sz="2000">
+                <a:solidFill>
+                  <a:srgbClr val="000000"/>
+                </a:solidFill>
+                <a:latin typeface="Alien Encounters" pitchFamily="0" charset="0"/>
+                <a:cs typeface="Alien Encounters" pitchFamily="0" charset="0"/>
+              </a:rPr>
+              <a:t>Transaction 1</a:t>
+            </a:r>
+          </a:p>
+        </p:txBody>
+      </p:sp>
+      <p:sp>
+        <p:nvSpPr>
+          <p:cNvPr id="9" name="Text 9"/>
+          <p:cNvSpPr txBox="1"/>
+          <p:nvPr/>
+        </p:nvSpPr>
+        <p:spPr>
+          <a:xfrm>
+            <a:off x="7937500" y="3924300"/>
+            <a:ext cx="2540000" cy="381000"/>
+          </a:xfrm>
+          <a:prstGeom prst="rect">
+            <a:avLst/>
+          </a:prstGeom>
+          <a:noFill/>
+        </p:spPr>
+        <p:txBody>
+          <a:bodyPr rtlCol="0" wrap="none" anchor="ctr"/>
+          <a:lstStyle/>
+          <a:p>
+            <a:pPr algn="l"/>
+            <a:r>
+              <a:rPr lang="en-US" smtClean="0" sz="2000">
+                <a:solidFill>
+                  <a:srgbClr val="000000"/>
+                </a:solidFill>
+                <a:latin typeface="Alien Encounters" pitchFamily="0" charset="0"/>
+                <a:cs typeface="Alien Encounters" pitchFamily="0" charset="0"/>
+              </a:rPr>
+              <a:t>Transaction 2</a:t>
+            </a:r>
+          </a:p>
+        </p:txBody>
+      </p:sp>
+      <p:sp>
+        <p:nvSpPr>
+          <p:cNvPr id="10" name="Text 10"/>
+          <p:cNvSpPr txBox="1"/>
+          <p:nvPr/>
+        </p:nvSpPr>
+        <p:spPr>
+          <a:xfrm>
+            <a:off x="254000" y="4152900"/>
+            <a:ext cx="2540000" cy="381000"/>
+          </a:xfrm>
+          <a:prstGeom prst="rect">
+            <a:avLst/>
+          </a:prstGeom>
+          <a:noFill/>
+        </p:spPr>
+        <p:txBody>
+          <a:bodyPr rtlCol="0" wrap="none" anchor="ctr"/>
+          <a:lstStyle/>
+          <a:p>
+            <a:pPr algn="l"/>
+            <a:r>
+              <a:rPr lang="en-US" smtClean="0" sz="2000">
+                <a:solidFill>
+                  <a:srgbClr val="000000"/>
+                </a:solidFill>
+                <a:latin typeface="Alien Encounters" pitchFamily="0" charset="0"/>
+                <a:cs typeface="Alien Encounters" pitchFamily="0" charset="0"/>
+              </a:rPr>
+              <a:t>Transaction 2</a:t>
+            </a:r>
+          </a:p>
+        </p:txBody>
+      </p:sp>
+      <p:sp>
+        <p:nvSpPr>
+          <p:cNvPr id="11" name="Text 11"/>
+          <p:cNvSpPr txBox="1"/>
+          <p:nvPr/>
+        </p:nvSpPr>
+        <p:spPr>
+          <a:xfrm>
+            <a:off x="7912100" y="4457700"/>
+            <a:ext cx="2540000" cy="381000"/>
+          </a:xfrm>
+          <a:prstGeom prst="rect">
+            <a:avLst/>
+          </a:prstGeom>
+          <a:noFill/>
+        </p:spPr>
+        <p:txBody>
+          <a:bodyPr rtlCol="0" wrap="none" anchor="ctr"/>
+          <a:lstStyle/>
+          <a:p>
+            <a:pPr algn="l"/>
+            <a:r>
+              <a:rPr lang="en-US" smtClean="0" sz="2000">
+                <a:solidFill>
+                  <a:srgbClr val="000000"/>
+                </a:solidFill>
+                <a:latin typeface="Alien Encounters" pitchFamily="0" charset="0"/>
+                <a:cs typeface="Alien Encounters" pitchFamily="0" charset="0"/>
+              </a:rPr>
+              <a:t>Transaction 3</a:t>
+            </a:r>
+          </a:p>
+        </p:txBody>
+      </p:sp>
+      <p:sp>
+        <p:nvSpPr>
+          <p:cNvPr id="12" name="Text 12"/>
+          <p:cNvSpPr txBox="1"/>
+          <p:nvPr/>
+        </p:nvSpPr>
+        <p:spPr>
+          <a:xfrm>
+            <a:off x="266700" y="4737100"/>
+            <a:ext cx="2540000" cy="381000"/>
+          </a:xfrm>
+          <a:prstGeom prst="rect">
+            <a:avLst/>
+          </a:prstGeom>
+          <a:noFill/>
+        </p:spPr>
+        <p:txBody>
+          <a:bodyPr rtlCol="0" wrap="none" anchor="ctr"/>
+          <a:lstStyle/>
+          <a:p>
+            <a:pPr algn="l"/>
+            <a:r>
+              <a:rPr lang="en-US" smtClean="0" sz="2000">
+                <a:solidFill>
+                  <a:srgbClr val="000000"/>
+                </a:solidFill>
+                <a:latin typeface="Alien Encounters" pitchFamily="0" charset="0"/>
+                <a:cs typeface="Alien Encounters" pitchFamily="0" charset="0"/>
+              </a:rPr>
+              <a:t>Transaction 3</a:t>
+            </a:r>
+          </a:p>
+        </p:txBody>
+      </p:sp>
+      <p:sp>
+        <p:nvSpPr>
+          <p:cNvPr id="13" name="Text 13"/>
+          <p:cNvSpPr txBox="1"/>
+          <p:nvPr/>
+        </p:nvSpPr>
+        <p:spPr>
+          <a:xfrm>
+            <a:off x="7670800" y="5130800"/>
+            <a:ext cx="2540000" cy="381000"/>
+          </a:xfrm>
+          <a:prstGeom prst="rect">
+            <a:avLst/>
+          </a:prstGeom>
+          <a:noFill/>
+        </p:spPr>
+        <p:txBody>
+          <a:bodyPr rtlCol="0" wrap="none" anchor="ctr"/>
+          <a:lstStyle/>
+          <a:p>
+            <a:pPr algn="l"/>
+            <a:r>
+              <a:rPr lang="en-US" smtClean="0" sz="2000">
+                <a:solidFill>
+                  <a:srgbClr val="000000"/>
+                </a:solidFill>
+                <a:latin typeface="Alien Encounters" pitchFamily="0" charset="0"/>
+                <a:cs typeface="Alien Encounters" pitchFamily="0" charset="0"/>
+              </a:rPr>
+              <a:t>Ledger of Node B</a:t>
+            </a:r>
+          </a:p>
+        </p:txBody>
+      </p:sp>
+      <p:sp>
+        <p:nvSpPr>
+          <p:cNvPr id="14" name="Text 14"/>
+          <p:cNvSpPr txBox="1"/>
+          <p:nvPr/>
+        </p:nvSpPr>
+        <p:spPr>
+          <a:xfrm>
+            <a:off x="25400" y="5359400"/>
+            <a:ext cx="2540000" cy="381000"/>
+          </a:xfrm>
+          <a:prstGeom prst="rect">
+            <a:avLst/>
+          </a:prstGeom>
+          <a:noFill/>
+        </p:spPr>
+        <p:txBody>
+          <a:bodyPr rtlCol="0" wrap="none" anchor="ctr"/>
+          <a:lstStyle/>
+          <a:p>
+            <a:pPr algn="l"/>
+            <a:r>
+              <a:rPr lang="en-US" smtClean="0" sz="2000">
+                <a:solidFill>
+                  <a:srgbClr val="000000"/>
+                </a:solidFill>
+                <a:latin typeface="Alien Encounters" pitchFamily="0" charset="0"/>
+                <a:cs typeface="Alien Encounters" pitchFamily="0" charset="0"/>
+              </a:rPr>
+              <a:t>Ledger of Node D</a:t>
+            </a:r>
+          </a:p>
+        </p:txBody>
+      </p:sp>
+      <p:sp>
+        <p:nvSpPr>
+          <p:cNvPr id="15" name="Text 15"/>
+          <p:cNvSpPr txBox="1"/>
+          <p:nvPr/>
+        </p:nvSpPr>
+        <p:spPr>
+          <a:xfrm>
+            <a:off x="6134100" y="5702300"/>
+            <a:ext cx="2540000" cy="381000"/>
+          </a:xfrm>
+          <a:prstGeom prst="rect">
+            <a:avLst/>
+          </a:prstGeom>
+          <a:noFill/>
+        </p:spPr>
+        <p:txBody>
+          <a:bodyPr rtlCol="0" wrap="none" anchor="ctr"/>
+          <a:lstStyle/>
+          <a:p>
+            <a:pPr algn="l"/>
+            <a:r>
+              <a:rPr lang="en-US" smtClean="0" sz="2000">
+                <a:solidFill>
+                  <a:srgbClr val="000000"/>
+                </a:solidFill>
+                <a:latin typeface="Alien Encounters" pitchFamily="0" charset="0"/>
+                <a:cs typeface="Alien Encounters" pitchFamily="0" charset="0"/>
+              </a:rPr>
+              <a:t>Transaction 2</a:t>
+            </a:r>
+          </a:p>
+        </p:txBody>
+      </p:sp>
+      <p:sp>
+        <p:nvSpPr>
+          <p:cNvPr id="16" name="Text 16"/>
+          <p:cNvSpPr txBox="1"/>
+          <p:nvPr/>
+        </p:nvSpPr>
+        <p:spPr>
+          <a:xfrm>
+            <a:off x="1676400" y="5905500"/>
+            <a:ext cx="2540000" cy="381000"/>
+          </a:xfrm>
+          <a:prstGeom prst="rect">
+            <a:avLst/>
+          </a:prstGeom>
+          <a:noFill/>
+        </p:spPr>
+        <p:txBody>
+          <a:bodyPr rtlCol="0" wrap="none" anchor="ctr"/>
+          <a:lstStyle/>
+          <a:p>
+            <a:pPr algn="l"/>
+            <a:r>
+              <a:rPr lang="en-US" smtClean="0" sz="2000">
+                <a:solidFill>
+                  <a:srgbClr val="000000"/>
+                </a:solidFill>
+                <a:latin typeface="Alien Encounters" pitchFamily="0" charset="0"/>
+                <a:cs typeface="Alien Encounters" pitchFamily="0" charset="0"/>
+              </a:rPr>
+              <a:t>Transaction 3</a:t>
+            </a:r>
+          </a:p>
+        </p:txBody>
+      </p:sp>
+      <p:sp>
+        <p:nvSpPr>
+          <p:cNvPr id="17" name="Text 17"/>
+          <p:cNvSpPr txBox="1"/>
+          <p:nvPr/>
+        </p:nvSpPr>
+        <p:spPr>
+          <a:xfrm>
+            <a:off x="6159500" y="6032500"/>
+            <a:ext cx="2540000" cy="381000"/>
+          </a:xfrm>
+          <a:prstGeom prst="rect">
+            <a:avLst/>
+          </a:prstGeom>
+          <a:noFill/>
+        </p:spPr>
+        <p:txBody>
+          <a:bodyPr rtlCol="0" wrap="none" anchor="ctr"/>
+          <a:lstStyle/>
+          <a:p>
+            <a:pPr algn="l"/>
+            <a:r>
+              <a:rPr lang="en-US" smtClean="0" sz="2000">
+                <a:solidFill>
+                  <a:srgbClr val="000000"/>
+                </a:solidFill>
+                <a:latin typeface="Alien Encounters" pitchFamily="0" charset="0"/>
+                <a:cs typeface="Alien Encounters" pitchFamily="0" charset="0"/>
+              </a:rPr>
+              <a:t>B send E10to C</a:t>
+            </a:r>
+          </a:p>
+        </p:txBody>
+      </p:sp>
+      <p:sp>
+        <p:nvSpPr>
+          <p:cNvPr id="18" name="Text 18"/>
+          <p:cNvSpPr txBox="1"/>
+          <p:nvPr/>
+        </p:nvSpPr>
+        <p:spPr>
+          <a:xfrm>
+            <a:off x="1854200" y="6210300"/>
+            <a:ext cx="2540000" cy="381000"/>
+          </a:xfrm>
+          <a:prstGeom prst="rect">
+            <a:avLst/>
+          </a:prstGeom>
+          <a:noFill/>
+        </p:spPr>
+        <p:txBody>
+          <a:bodyPr rtlCol="0" wrap="none" anchor="ctr"/>
+          <a:lstStyle/>
+          <a:p>
+            <a:pPr algn="l"/>
+            <a:r>
+              <a:rPr lang="en-US" smtClean="0" sz="2000">
+                <a:solidFill>
+                  <a:srgbClr val="000000"/>
+                </a:solidFill>
+                <a:latin typeface="Alien Encounters" pitchFamily="0" charset="0"/>
+                <a:cs typeface="Alien Encounters" pitchFamily="0" charset="0"/>
+              </a:rPr>
+              <a:t>send E20 to D</a:t>
+            </a:r>
+          </a:p>
+        </p:txBody>
+      </p:sp>
+      <p:sp>
+        <p:nvSpPr>
+          <p:cNvPr id="19" name="Text 19"/>
+          <p:cNvSpPr txBox="1"/>
+          <p:nvPr/>
+        </p:nvSpPr>
+        <p:spPr>
+          <a:xfrm>
+            <a:off x="3898900" y="6921500"/>
+            <a:ext cx="2540000" cy="381000"/>
+          </a:xfrm>
+          <a:prstGeom prst="rect">
+            <a:avLst/>
+          </a:prstGeom>
+          <a:noFill/>
+        </p:spPr>
+        <p:txBody>
+          <a:bodyPr rtlCol="0" wrap="none" anchor="ctr"/>
+          <a:lstStyle/>
+          <a:p>
+            <a:pPr algn="l"/>
+            <a:r>
+              <a:rPr lang="en-US" smtClean="0" sz="2000">
+                <a:solidFill>
+                  <a:srgbClr val="000000"/>
+                </a:solidFill>
+                <a:latin typeface="Alien Encounters" pitchFamily="0" charset="0"/>
+                <a:cs typeface="Alien Encounters" pitchFamily="0" charset="0"/>
+              </a:rPr>
+              <a:t>Transaction 1</a:t>
+            </a:r>
+          </a:p>
+        </p:txBody>
+      </p:sp>
+      <p:sp>
+        <p:nvSpPr>
+          <p:cNvPr id="20" name="Text 20"/>
+          <p:cNvSpPr txBox="1"/>
+          <p:nvPr/>
+        </p:nvSpPr>
+        <p:spPr>
+          <a:xfrm>
+            <a:off x="3898900" y="7454900"/>
+            <a:ext cx="2540000" cy="381000"/>
+          </a:xfrm>
+          <a:prstGeom prst="rect">
+            <a:avLst/>
+          </a:prstGeom>
+          <a:noFill/>
+        </p:spPr>
+        <p:txBody>
+          <a:bodyPr rtlCol="0" wrap="none" anchor="ctr"/>
+          <a:lstStyle/>
+          <a:p>
+            <a:pPr algn="l"/>
+            <a:r>
+              <a:rPr lang="en-US" smtClean="0" sz="2000">
+                <a:solidFill>
+                  <a:srgbClr val="000000"/>
+                </a:solidFill>
+                <a:latin typeface="Alien Encounters" pitchFamily="0" charset="0"/>
+                <a:cs typeface="Alien Encounters" pitchFamily="0" charset="0"/>
+              </a:rPr>
+              <a:t>Transaction 2</a:t>
+            </a:r>
+          </a:p>
+        </p:txBody>
+      </p:sp>
+      <p:sp>
+        <p:nvSpPr>
+          <p:cNvPr id="21" name="Text 21"/>
+          <p:cNvSpPr txBox="1"/>
+          <p:nvPr/>
+        </p:nvSpPr>
+        <p:spPr>
+          <a:xfrm>
+            <a:off x="3886200" y="7975600"/>
+            <a:ext cx="2540000" cy="381000"/>
+          </a:xfrm>
+          <a:prstGeom prst="rect">
+            <a:avLst/>
+          </a:prstGeom>
+          <a:noFill/>
+        </p:spPr>
+        <p:txBody>
+          <a:bodyPr rtlCol="0" wrap="none" anchor="ctr"/>
+          <a:lstStyle/>
+          <a:p>
+            <a:pPr algn="l"/>
+            <a:r>
+              <a:rPr lang="en-US" smtClean="0" sz="2000">
+                <a:solidFill>
+                  <a:srgbClr val="000000"/>
+                </a:solidFill>
+                <a:latin typeface="Alien Encounters" pitchFamily="0" charset="0"/>
+                <a:cs typeface="Alien Encounters" pitchFamily="0" charset="0"/>
+              </a:rPr>
+              <a:t>Transaction 3</a:t>
+            </a:r>
+          </a:p>
+        </p:txBody>
+      </p:sp>
+      <p:sp>
+        <p:nvSpPr>
+          <p:cNvPr id="22" name="Text 22"/>
+          <p:cNvSpPr txBox="1"/>
+          <p:nvPr/>
+        </p:nvSpPr>
+        <p:spPr>
+          <a:xfrm>
+            <a:off x="3632200" y="8585200"/>
+            <a:ext cx="2540000" cy="381000"/>
+          </a:xfrm>
+          <a:prstGeom prst="rect">
+            <a:avLst/>
+          </a:prstGeom>
+          <a:noFill/>
+        </p:spPr>
+        <p:txBody>
+          <a:bodyPr rtlCol="0" wrap="none" anchor="ctr"/>
+          <a:lstStyle/>
+          <a:p>
+            <a:pPr algn="l"/>
+            <a:r>
+              <a:rPr lang="en-US" smtClean="0" sz="2000">
+                <a:solidFill>
+                  <a:srgbClr val="000000"/>
+                </a:solidFill>
+                <a:latin typeface="Alien Encounters" pitchFamily="0" charset="0"/>
+                <a:cs typeface="Alien Encounters" pitchFamily="0" charset="0"/>
+              </a:rPr>
+              <a:t>Ledger of Node C</a:t>
             </a:r>
           </a:p>
         </p:txBody>

</xml_diff>

<commit_message>
moved input image logic to seperate file
</commit_message>
<xml_diff>
--- a/shapes-test.pptx
+++ b/shapes-test.pptx
@@ -5,7 +5,7 @@
     <p:sldMasterId id="2147483648" r:id="rId1"/>
   </p:sldMasterIdLst>
   <p:sldIdLst>
-    <p:sldId id="256" r:id="rId-d926436e-a2e0-4b15-8ad1-345c86be76ac"/>
+    <p:sldId id="256" r:id="rId-125fd83a-26a7-49a2-981a-af5be52d1808"/>
   </p:sldIdLst>
   <p:sldSz cx="10515600" cy="9144000" type="screen4x3"/>
   <p:notesSz cx="6858000" cy="9144000"/>
@@ -734,8 +734,8 @@
         </p:nvSpPr>
         <p:spPr>
           <a:xfrm>
-            <a:off x="7848600" y="2679700"/>
-            <a:ext cx="2159000" cy="431800"/>
+            <a:off x="3644900" y="6769100"/>
+            <a:ext cx="1981200" cy="1612900"/>
           </a:xfrm>
           <a:prstGeom prst="rect">
             <a:avLst/>
@@ -763,8 +763,8 @@
         </p:nvSpPr>
         <p:spPr>
           <a:xfrm>
-            <a:off x="4165600" y="2679700"/>
-            <a:ext cx="2159000" cy="431800"/>
+            <a:off x="3657600" y="7835900"/>
+            <a:ext cx="1955800" cy="533400"/>
           </a:xfrm>
           <a:prstGeom prst="rect">
             <a:avLst/>
@@ -792,8 +792,8 @@
         </p:nvSpPr>
         <p:spPr>
           <a:xfrm>
-            <a:off x="469900" y="2679700"/>
-            <a:ext cx="2159000" cy="431800"/>
+            <a:off x="3657600" y="7315200"/>
+            <a:ext cx="1955800" cy="520700"/>
           </a:xfrm>
           <a:prstGeom prst="rect">
             <a:avLst/>
@@ -821,8 +821,8 @@
         </p:nvSpPr>
         <p:spPr>
           <a:xfrm>
-            <a:off x="7848600" y="584200"/>
-            <a:ext cx="2159000" cy="2095500"/>
+            <a:off x="3657600" y="6781800"/>
+            <a:ext cx="1955800" cy="520700"/>
           </a:xfrm>
           <a:prstGeom prst="rect">
             <a:avLst/>
@@ -850,8 +850,8 @@
         </p:nvSpPr>
         <p:spPr>
           <a:xfrm>
-            <a:off x="4165600" y="584200"/>
-            <a:ext cx="2159000" cy="2095500"/>
+            <a:off x="4318000" y="5969000"/>
+            <a:ext cx="774700" cy="584200"/>
           </a:xfrm>
           <a:prstGeom prst="rect">
             <a:avLst/>
@@ -879,8 +879,666 @@
         </p:nvSpPr>
         <p:spPr>
           <a:xfrm>
-            <a:off x="469900" y="584200"/>
-            <a:ext cx="2159000" cy="2095500"/>
+            <a:off x="4305300" y="5956300"/>
+            <a:ext cx="800100" cy="609600"/>
+          </a:xfrm>
+          <a:prstGeom prst="octagon">
+            <a:avLst>
+              <a:gd name="adj" fmla="val 29289"/>
+            </a:avLst>
+          </a:prstGeom>
+          <a:solidFill>
+            <a:srgbClr val="ffffff"/>
+          </a:solidFill>
+          <a:ln w="25400">
+            <a:solidFill>
+              <a:srgbClr val="000000"/>
+            </a:solidFill>
+          </a:ln>
+        </p:spPr>
+        <p:txBody>
+          <a:bodyPr rtlCol="0" wrap="square" anchor="ctr"/>
+          <a:lstStyle/>
+          <a:p/>
+        </p:txBody>
+      </p:sp>
+      <p:sp>
+        <p:nvSpPr>
+          <p:cNvPr id="7" name="Shape 7"/>
+          <p:cNvSpPr/>
+          <p:nvPr/>
+        </p:nvSpPr>
+        <p:spPr>
+          <a:xfrm>
+            <a:off x="2781300" y="4826000"/>
+            <a:ext cx="1308100" cy="1231900"/>
+          </a:xfrm>
+          <a:prstGeom prst="hexagon">
+            <a:avLst>
+              <a:gd name="adj" fmla="val 25000"/>
+              <a:gd name="vf" fmla="val 115470"/>
+            </a:avLst>
+          </a:prstGeom>
+          <a:solidFill>
+            <a:srgbClr val="ffffff"/>
+          </a:solidFill>
+          <a:ln w="25400">
+            <a:solidFill>
+              <a:srgbClr val="000000"/>
+            </a:solidFill>
+          </a:ln>
+        </p:spPr>
+        <p:txBody>
+          <a:bodyPr rtlCol="0" wrap="square" anchor="ctr"/>
+          <a:lstStyle/>
+          <a:p/>
+        </p:txBody>
+      </p:sp>
+      <p:sp>
+        <p:nvSpPr>
+          <p:cNvPr id="8" name="Shape 8"/>
+          <p:cNvSpPr/>
+          <p:nvPr/>
+        </p:nvSpPr>
+        <p:spPr>
+          <a:xfrm>
+            <a:off x="5334000" y="4711700"/>
+            <a:ext cx="1397000" cy="1409700"/>
+          </a:xfrm>
+          <a:prstGeom prst="hexagon">
+            <a:avLst>
+              <a:gd name="adj" fmla="val 25000"/>
+              <a:gd name="vf" fmla="val 115470"/>
+            </a:avLst>
+          </a:prstGeom>
+          <a:solidFill>
+            <a:srgbClr val="ffffff"/>
+          </a:solidFill>
+          <a:ln w="25400">
+            <a:solidFill>
+              <a:srgbClr val="000000"/>
+            </a:solidFill>
+          </a:ln>
+        </p:spPr>
+        <p:txBody>
+          <a:bodyPr rtlCol="0" wrap="square" anchor="ctr"/>
+          <a:lstStyle/>
+          <a:p/>
+        </p:txBody>
+      </p:sp>
+      <p:sp>
+        <p:nvSpPr>
+          <p:cNvPr id="9" name="Shape 9"/>
+          <p:cNvSpPr/>
+          <p:nvPr/>
+        </p:nvSpPr>
+        <p:spPr>
+          <a:xfrm>
+            <a:off x="2209800" y="3987800"/>
+            <a:ext cx="774700" cy="584200"/>
+          </a:xfrm>
+          <a:prstGeom prst="rect">
+            <a:avLst/>
+          </a:prstGeom>
+          <a:solidFill>
+            <a:srgbClr val="ffffff"/>
+          </a:solidFill>
+          <a:ln w="25400">
+            <a:solidFill>
+              <a:srgbClr val="000000"/>
+            </a:solidFill>
+          </a:ln>
+        </p:spPr>
+        <p:txBody>
+          <a:bodyPr rtlCol="0" wrap="square" anchor="ctr"/>
+          <a:lstStyle/>
+          <a:p/>
+        </p:txBody>
+      </p:sp>
+      <p:sp>
+        <p:nvSpPr>
+          <p:cNvPr id="10" name="Shape 10"/>
+          <p:cNvSpPr/>
+          <p:nvPr/>
+        </p:nvSpPr>
+        <p:spPr>
+          <a:xfrm>
+            <a:off x="2197100" y="3975100"/>
+            <a:ext cx="800100" cy="609600"/>
+          </a:xfrm>
+          <a:prstGeom prst="octagon">
+            <a:avLst>
+              <a:gd name="adj" fmla="val 29289"/>
+            </a:avLst>
+          </a:prstGeom>
+          <a:solidFill>
+            <a:srgbClr val="ffffff"/>
+          </a:solidFill>
+          <a:ln w="25400">
+            <a:solidFill>
+              <a:srgbClr val="000000"/>
+            </a:solidFill>
+          </a:ln>
+        </p:spPr>
+        <p:txBody>
+          <a:bodyPr rtlCol="0" wrap="square" anchor="ctr"/>
+          <a:lstStyle/>
+          <a:p/>
+        </p:txBody>
+      </p:sp>
+      <p:sp>
+        <p:nvSpPr>
+          <p:cNvPr id="11" name="Shape 11"/>
+          <p:cNvSpPr/>
+          <p:nvPr/>
+        </p:nvSpPr>
+        <p:spPr>
+          <a:xfrm>
+            <a:off x="6578600" y="3924300"/>
+            <a:ext cx="774700" cy="584200"/>
+          </a:xfrm>
+          <a:prstGeom prst="rect">
+            <a:avLst/>
+          </a:prstGeom>
+          <a:solidFill>
+            <a:srgbClr val="ffffff"/>
+          </a:solidFill>
+          <a:ln w="25400">
+            <a:solidFill>
+              <a:srgbClr val="000000"/>
+            </a:solidFill>
+          </a:ln>
+        </p:spPr>
+        <p:txBody>
+          <a:bodyPr rtlCol="0" wrap="square" anchor="ctr"/>
+          <a:lstStyle/>
+          <a:p/>
+        </p:txBody>
+      </p:sp>
+      <p:sp>
+        <p:nvSpPr>
+          <p:cNvPr id="12" name="Shape 12"/>
+          <p:cNvSpPr/>
+          <p:nvPr/>
+        </p:nvSpPr>
+        <p:spPr>
+          <a:xfrm>
+            <a:off x="6565900" y="3911600"/>
+            <a:ext cx="800100" cy="609600"/>
+          </a:xfrm>
+          <a:prstGeom prst="octagon">
+            <a:avLst>
+              <a:gd name="adj" fmla="val 29289"/>
+            </a:avLst>
+          </a:prstGeom>
+          <a:solidFill>
+            <a:srgbClr val="ffffff"/>
+          </a:solidFill>
+          <a:ln w="25400">
+            <a:solidFill>
+              <a:srgbClr val="000000"/>
+            </a:solidFill>
+          </a:ln>
+        </p:spPr>
+        <p:txBody>
+          <a:bodyPr rtlCol="0" wrap="square" anchor="ctr"/>
+          <a:lstStyle/>
+          <a:p/>
+        </p:txBody>
+      </p:sp>
+      <p:sp>
+        <p:nvSpPr>
+          <p:cNvPr id="13" name="Shape 13"/>
+          <p:cNvSpPr/>
+          <p:nvPr/>
+        </p:nvSpPr>
+        <p:spPr>
+          <a:xfrm>
+            <a:off x="50800" y="3505200"/>
+            <a:ext cx="1981200" cy="1612900"/>
+          </a:xfrm>
+          <a:prstGeom prst="rect">
+            <a:avLst/>
+          </a:prstGeom>
+          <a:solidFill>
+            <a:srgbClr val="ffffff"/>
+          </a:solidFill>
+          <a:ln w="25400">
+            <a:solidFill>
+              <a:srgbClr val="000000"/>
+            </a:solidFill>
+          </a:ln>
+        </p:spPr>
+        <p:txBody>
+          <a:bodyPr rtlCol="0" wrap="square" anchor="ctr"/>
+          <a:lstStyle/>
+          <a:p/>
+        </p:txBody>
+      </p:sp>
+      <p:sp>
+        <p:nvSpPr>
+          <p:cNvPr id="14" name="Shape 14"/>
+          <p:cNvSpPr/>
+          <p:nvPr/>
+        </p:nvSpPr>
+        <p:spPr>
+          <a:xfrm>
+            <a:off x="63500" y="4572000"/>
+            <a:ext cx="1955800" cy="533400"/>
+          </a:xfrm>
+          <a:prstGeom prst="rect">
+            <a:avLst/>
+          </a:prstGeom>
+          <a:solidFill>
+            <a:srgbClr val="ffffff"/>
+          </a:solidFill>
+          <a:ln w="25400">
+            <a:solidFill>
+              <a:srgbClr val="000000"/>
+            </a:solidFill>
+          </a:ln>
+        </p:spPr>
+        <p:txBody>
+          <a:bodyPr rtlCol="0" wrap="square" anchor="ctr"/>
+          <a:lstStyle/>
+          <a:p/>
+        </p:txBody>
+      </p:sp>
+      <p:sp>
+        <p:nvSpPr>
+          <p:cNvPr id="15" name="Shape 15"/>
+          <p:cNvSpPr/>
+          <p:nvPr/>
+        </p:nvSpPr>
+        <p:spPr>
+          <a:xfrm>
+            <a:off x="63500" y="4051300"/>
+            <a:ext cx="1955800" cy="520700"/>
+          </a:xfrm>
+          <a:prstGeom prst="rect">
+            <a:avLst/>
+          </a:prstGeom>
+          <a:solidFill>
+            <a:srgbClr val="ffffff"/>
+          </a:solidFill>
+          <a:ln w="25400">
+            <a:solidFill>
+              <a:srgbClr val="000000"/>
+            </a:solidFill>
+          </a:ln>
+        </p:spPr>
+        <p:txBody>
+          <a:bodyPr rtlCol="0" wrap="square" anchor="ctr"/>
+          <a:lstStyle/>
+          <a:p/>
+        </p:txBody>
+      </p:sp>
+      <p:sp>
+        <p:nvSpPr>
+          <p:cNvPr id="16" name="Shape 16"/>
+          <p:cNvSpPr/>
+          <p:nvPr/>
+        </p:nvSpPr>
+        <p:spPr>
+          <a:xfrm>
+            <a:off x="63500" y="3517900"/>
+            <a:ext cx="1955800" cy="520700"/>
+          </a:xfrm>
+          <a:prstGeom prst="rect">
+            <a:avLst/>
+          </a:prstGeom>
+          <a:solidFill>
+            <a:srgbClr val="ffffff"/>
+          </a:solidFill>
+          <a:ln w="25400">
+            <a:solidFill>
+              <a:srgbClr val="000000"/>
+            </a:solidFill>
+          </a:ln>
+        </p:spPr>
+        <p:txBody>
+          <a:bodyPr rtlCol="0" wrap="square" anchor="ctr"/>
+          <a:lstStyle/>
+          <a:p/>
+        </p:txBody>
+      </p:sp>
+      <p:sp>
+        <p:nvSpPr>
+          <p:cNvPr id="17" name="Shape 17"/>
+          <p:cNvSpPr/>
+          <p:nvPr/>
+        </p:nvSpPr>
+        <p:spPr>
+          <a:xfrm>
+            <a:off x="7632700" y="3225800"/>
+            <a:ext cx="1981200" cy="1612900"/>
+          </a:xfrm>
+          <a:prstGeom prst="rect">
+            <a:avLst/>
+          </a:prstGeom>
+          <a:solidFill>
+            <a:srgbClr val="ffffff"/>
+          </a:solidFill>
+          <a:ln w="25400">
+            <a:solidFill>
+              <a:srgbClr val="000000"/>
+            </a:solidFill>
+          </a:ln>
+        </p:spPr>
+        <p:txBody>
+          <a:bodyPr rtlCol="0" wrap="square" anchor="ctr"/>
+          <a:lstStyle/>
+          <a:p/>
+        </p:txBody>
+      </p:sp>
+      <p:sp>
+        <p:nvSpPr>
+          <p:cNvPr id="18" name="Shape 18"/>
+          <p:cNvSpPr/>
+          <p:nvPr/>
+        </p:nvSpPr>
+        <p:spPr>
+          <a:xfrm>
+            <a:off x="7645400" y="4292600"/>
+            <a:ext cx="1955800" cy="533400"/>
+          </a:xfrm>
+          <a:prstGeom prst="rect">
+            <a:avLst/>
+          </a:prstGeom>
+          <a:solidFill>
+            <a:srgbClr val="ffffff"/>
+          </a:solidFill>
+          <a:ln w="25400">
+            <a:solidFill>
+              <a:srgbClr val="000000"/>
+            </a:solidFill>
+          </a:ln>
+        </p:spPr>
+        <p:txBody>
+          <a:bodyPr rtlCol="0" wrap="square" anchor="ctr"/>
+          <a:lstStyle/>
+          <a:p/>
+        </p:txBody>
+      </p:sp>
+      <p:sp>
+        <p:nvSpPr>
+          <p:cNvPr id="19" name="Shape 19"/>
+          <p:cNvSpPr/>
+          <p:nvPr/>
+        </p:nvSpPr>
+        <p:spPr>
+          <a:xfrm>
+            <a:off x="7645400" y="3771900"/>
+            <a:ext cx="1955800" cy="520700"/>
+          </a:xfrm>
+          <a:prstGeom prst="rect">
+            <a:avLst/>
+          </a:prstGeom>
+          <a:solidFill>
+            <a:srgbClr val="ffffff"/>
+          </a:solidFill>
+          <a:ln w="25400">
+            <a:solidFill>
+              <a:srgbClr val="000000"/>
+            </a:solidFill>
+          </a:ln>
+        </p:spPr>
+        <p:txBody>
+          <a:bodyPr rtlCol="0" wrap="square" anchor="ctr"/>
+          <a:lstStyle/>
+          <a:p/>
+        </p:txBody>
+      </p:sp>
+      <p:sp>
+        <p:nvSpPr>
+          <p:cNvPr id="20" name="Shape 20"/>
+          <p:cNvSpPr/>
+          <p:nvPr/>
+        </p:nvSpPr>
+        <p:spPr>
+          <a:xfrm>
+            <a:off x="7645400" y="3238500"/>
+            <a:ext cx="1955800" cy="520700"/>
+          </a:xfrm>
+          <a:prstGeom prst="rect">
+            <a:avLst/>
+          </a:prstGeom>
+          <a:solidFill>
+            <a:srgbClr val="ffffff"/>
+          </a:solidFill>
+          <a:ln w="25400">
+            <a:solidFill>
+              <a:srgbClr val="000000"/>
+            </a:solidFill>
+          </a:ln>
+        </p:spPr>
+        <p:txBody>
+          <a:bodyPr rtlCol="0" wrap="square" anchor="ctr"/>
+          <a:lstStyle/>
+          <a:p/>
+        </p:txBody>
+      </p:sp>
+      <p:sp>
+        <p:nvSpPr>
+          <p:cNvPr id="21" name="Shape 21"/>
+          <p:cNvSpPr/>
+          <p:nvPr/>
+        </p:nvSpPr>
+        <p:spPr>
+          <a:xfrm>
+            <a:off x="2832100" y="2667000"/>
+            <a:ext cx="1181100" cy="1193800"/>
+          </a:xfrm>
+          <a:prstGeom prst="hexagon">
+            <a:avLst>
+              <a:gd name="adj" fmla="val 25000"/>
+              <a:gd name="vf" fmla="val 115470"/>
+            </a:avLst>
+          </a:prstGeom>
+          <a:solidFill>
+            <a:srgbClr val="ffffff"/>
+          </a:solidFill>
+          <a:ln w="25400">
+            <a:solidFill>
+              <a:srgbClr val="000000"/>
+            </a:solidFill>
+          </a:ln>
+        </p:spPr>
+        <p:txBody>
+          <a:bodyPr rtlCol="0" wrap="square" anchor="ctr"/>
+          <a:lstStyle/>
+          <a:p/>
+        </p:txBody>
+      </p:sp>
+      <p:sp>
+        <p:nvSpPr>
+          <p:cNvPr id="22" name="Shape 22"/>
+          <p:cNvSpPr/>
+          <p:nvPr/>
+        </p:nvSpPr>
+        <p:spPr>
+          <a:xfrm>
+            <a:off x="5245100" y="2552700"/>
+            <a:ext cx="1460500" cy="1244600"/>
+          </a:xfrm>
+          <a:prstGeom prst="hexagon">
+            <a:avLst>
+              <a:gd name="adj" fmla="val 25000"/>
+              <a:gd name="vf" fmla="val 115470"/>
+            </a:avLst>
+          </a:prstGeom>
+          <a:solidFill>
+            <a:srgbClr val="ffffff"/>
+          </a:solidFill>
+          <a:ln w="25400">
+            <a:solidFill>
+              <a:srgbClr val="000000"/>
+            </a:solidFill>
+          </a:ln>
+        </p:spPr>
+        <p:txBody>
+          <a:bodyPr rtlCol="0" wrap="square" anchor="ctr"/>
+          <a:lstStyle/>
+          <a:p/>
+        </p:txBody>
+      </p:sp>
+      <p:sp>
+        <p:nvSpPr>
+          <p:cNvPr id="23" name="Shape 23"/>
+          <p:cNvSpPr/>
+          <p:nvPr/>
+        </p:nvSpPr>
+        <p:spPr>
+          <a:xfrm>
+            <a:off x="4330700" y="2133600"/>
+            <a:ext cx="774700" cy="584200"/>
+          </a:xfrm>
+          <a:prstGeom prst="rect">
+            <a:avLst/>
+          </a:prstGeom>
+          <a:solidFill>
+            <a:srgbClr val="ffffff"/>
+          </a:solidFill>
+          <a:ln w="25400">
+            <a:solidFill>
+              <a:srgbClr val="000000"/>
+            </a:solidFill>
+          </a:ln>
+        </p:spPr>
+        <p:txBody>
+          <a:bodyPr rtlCol="0" wrap="square" anchor="ctr"/>
+          <a:lstStyle/>
+          <a:p/>
+        </p:txBody>
+      </p:sp>
+      <p:sp>
+        <p:nvSpPr>
+          <p:cNvPr id="24" name="Shape 24"/>
+          <p:cNvSpPr/>
+          <p:nvPr/>
+        </p:nvSpPr>
+        <p:spPr>
+          <a:xfrm>
+            <a:off x="4318000" y="2120900"/>
+            <a:ext cx="800100" cy="609600"/>
+          </a:xfrm>
+          <a:prstGeom prst="octagon">
+            <a:avLst>
+              <a:gd name="adj" fmla="val 29289"/>
+            </a:avLst>
+          </a:prstGeom>
+          <a:solidFill>
+            <a:srgbClr val="ffffff"/>
+          </a:solidFill>
+          <a:ln w="25400">
+            <a:solidFill>
+              <a:srgbClr val="000000"/>
+            </a:solidFill>
+          </a:ln>
+        </p:spPr>
+        <p:txBody>
+          <a:bodyPr rtlCol="0" wrap="square" anchor="ctr"/>
+          <a:lstStyle/>
+          <a:p/>
+        </p:txBody>
+      </p:sp>
+      <p:sp>
+        <p:nvSpPr>
+          <p:cNvPr id="25" name="Shape 25"/>
+          <p:cNvSpPr/>
+          <p:nvPr/>
+        </p:nvSpPr>
+        <p:spPr>
+          <a:xfrm>
+            <a:off x="3873500" y="368300"/>
+            <a:ext cx="1981200" cy="1612900"/>
+          </a:xfrm>
+          <a:prstGeom prst="rect">
+            <a:avLst/>
+          </a:prstGeom>
+          <a:solidFill>
+            <a:srgbClr val="ffffff"/>
+          </a:solidFill>
+          <a:ln w="25400">
+            <a:solidFill>
+              <a:srgbClr val="000000"/>
+            </a:solidFill>
+          </a:ln>
+        </p:spPr>
+        <p:txBody>
+          <a:bodyPr rtlCol="0" wrap="square" anchor="ctr"/>
+          <a:lstStyle/>
+          <a:p/>
+        </p:txBody>
+      </p:sp>
+      <p:sp>
+        <p:nvSpPr>
+          <p:cNvPr id="26" name="Shape 26"/>
+          <p:cNvSpPr/>
+          <p:nvPr/>
+        </p:nvSpPr>
+        <p:spPr>
+          <a:xfrm>
+            <a:off x="3886200" y="1435100"/>
+            <a:ext cx="1955800" cy="533400"/>
+          </a:xfrm>
+          <a:prstGeom prst="rect">
+            <a:avLst/>
+          </a:prstGeom>
+          <a:solidFill>
+            <a:srgbClr val="ffffff"/>
+          </a:solidFill>
+          <a:ln w="25400">
+            <a:solidFill>
+              <a:srgbClr val="000000"/>
+            </a:solidFill>
+          </a:ln>
+        </p:spPr>
+        <p:txBody>
+          <a:bodyPr rtlCol="0" wrap="square" anchor="ctr"/>
+          <a:lstStyle/>
+          <a:p/>
+        </p:txBody>
+      </p:sp>
+      <p:sp>
+        <p:nvSpPr>
+          <p:cNvPr id="27" name="Shape 27"/>
+          <p:cNvSpPr/>
+          <p:nvPr/>
+        </p:nvSpPr>
+        <p:spPr>
+          <a:xfrm>
+            <a:off x="3886200" y="914400"/>
+            <a:ext cx="1955800" cy="520700"/>
+          </a:xfrm>
+          <a:prstGeom prst="rect">
+            <a:avLst/>
+          </a:prstGeom>
+          <a:solidFill>
+            <a:srgbClr val="ffffff"/>
+          </a:solidFill>
+          <a:ln w="25400">
+            <a:solidFill>
+              <a:srgbClr val="000000"/>
+            </a:solidFill>
+          </a:ln>
+        </p:spPr>
+        <p:txBody>
+          <a:bodyPr rtlCol="0" wrap="square" anchor="ctr"/>
+          <a:lstStyle/>
+          <a:p/>
+        </p:txBody>
+      </p:sp>
+      <p:sp>
+        <p:nvSpPr>
+          <p:cNvPr id="28" name="Shape 28"/>
+          <p:cNvSpPr/>
+          <p:nvPr/>
+        </p:nvSpPr>
+        <p:spPr>
+          <a:xfrm>
+            <a:off x="3886200" y="381000"/>
+            <a:ext cx="1955800" cy="520700"/>
           </a:xfrm>
           <a:prstGeom prst="rect">
             <a:avLst/>
@@ -908,7 +1566,7 @@
         </p:nvSpPr>
         <p:spPr>
           <a:xfrm>
-            <a:off x="1282700" y="1485900"/>
+            <a:off x="3937000" y="0"/>
             <a:ext cx="2540000" cy="381000"/>
           </a:xfrm>
           <a:prstGeom prst="rect">
@@ -929,7 +1587,7 @@
                 <a:latin typeface="Alien Encounters" pitchFamily="0" charset="0"/>
                 <a:cs typeface="Alien Encounters" pitchFamily="0" charset="0"/>
               </a:rPr>
-              <a:t>Data</a:t>
+              <a:t>Ledger of Node A</a:t>
             </a:r>
           </a:p>
         </p:txBody>
@@ -942,7 +1600,7 @@
         </p:nvSpPr>
         <p:spPr>
           <a:xfrm>
-            <a:off x="4991100" y="1485900"/>
+            <a:off x="4140200" y="533400"/>
             <a:ext cx="2540000" cy="381000"/>
           </a:xfrm>
           <a:prstGeom prst="rect">
@@ -963,7 +1621,7 @@
                 <a:latin typeface="Alien Encounters" pitchFamily="0" charset="0"/>
                 <a:cs typeface="Alien Encounters" pitchFamily="0" charset="0"/>
               </a:rPr>
-              <a:t>Data</a:t>
+              <a:t>Transaction 1</a:t>
             </a:r>
           </a:p>
         </p:txBody>
@@ -976,7 +1634,7 @@
         </p:nvSpPr>
         <p:spPr>
           <a:xfrm>
-            <a:off x="8674100" y="1485900"/>
+            <a:off x="4127500" y="1054100"/>
             <a:ext cx="2540000" cy="381000"/>
           </a:xfrm>
           <a:prstGeom prst="rect">
@@ -997,7 +1655,7 @@
                 <a:latin typeface="Alien Encounters" pitchFamily="0" charset="0"/>
                 <a:cs typeface="Alien Encounters" pitchFamily="0" charset="0"/>
               </a:rPr>
-              <a:t>Data</a:t>
+              <a:t>Transaction 2</a:t>
             </a:r>
           </a:p>
         </p:txBody>
@@ -1010,7 +1668,7 @@
         </p:nvSpPr>
         <p:spPr>
           <a:xfrm>
-            <a:off x="1003300" y="2781300"/>
+            <a:off x="4127500" y="1562100"/>
             <a:ext cx="2540000" cy="381000"/>
           </a:xfrm>
           <a:prstGeom prst="rect">
@@ -1031,7 +1689,7 @@
                 <a:latin typeface="Alien Encounters" pitchFamily="0" charset="0"/>
                 <a:cs typeface="Alien Encounters" pitchFamily="0" charset="0"/>
               </a:rPr>
-              <a:t>Reference</a:t>
+              <a:t>Transaction 3</a:t>
             </a:r>
           </a:p>
         </p:txBody>
@@ -1044,7 +1702,7 @@
         </p:nvSpPr>
         <p:spPr>
           <a:xfrm>
-            <a:off x="4673600" y="2743200"/>
+            <a:off x="6184900" y="2374900"/>
             <a:ext cx="2540000" cy="381000"/>
           </a:xfrm>
           <a:prstGeom prst="rect">
@@ -1065,7 +1723,7 @@
                 <a:latin typeface="Alien Encounters" pitchFamily="0" charset="0"/>
                 <a:cs typeface="Alien Encounters" pitchFamily="0" charset="0"/>
               </a:rPr>
-              <a:t>Reference</a:t>
+              <a:t>Transaction 1</a:t>
             </a:r>
           </a:p>
         </p:txBody>
@@ -1078,7 +1736,7 @@
         </p:nvSpPr>
         <p:spPr>
           <a:xfrm>
-            <a:off x="8407400" y="2781300"/>
+            <a:off x="6210300" y="2705100"/>
             <a:ext cx="2540000" cy="381000"/>
           </a:xfrm>
           <a:prstGeom prst="rect">
@@ -1099,7 +1757,551 @@
                 <a:latin typeface="Alien Encounters" pitchFamily="0" charset="0"/>
                 <a:cs typeface="Alien Encounters" pitchFamily="0" charset="0"/>
               </a:rPr>
-              <a:t>Reference</a:t>
+              <a:t>A send E5 to B</a:t>
+            </a:r>
+          </a:p>
+        </p:txBody>
+      </p:sp>
+      <p:sp>
+        <p:nvSpPr>
+          <p:cNvPr id="7" name="Text 7"/>
+          <p:cNvSpPr txBox="1"/>
+          <p:nvPr/>
+        </p:nvSpPr>
+        <p:spPr>
+          <a:xfrm>
+            <a:off x="7912100" y="3390900"/>
+            <a:ext cx="2540000" cy="381000"/>
+          </a:xfrm>
+          <a:prstGeom prst="rect">
+            <a:avLst/>
+          </a:prstGeom>
+          <a:noFill/>
+        </p:spPr>
+        <p:txBody>
+          <a:bodyPr rtlCol="0" wrap="none" anchor="ctr"/>
+          <a:lstStyle/>
+          <a:p>
+            <a:pPr algn="l"/>
+            <a:r>
+              <a:rPr lang="en-US" smtClean="0" sz="2000">
+                <a:solidFill>
+                  <a:srgbClr val="000000"/>
+                </a:solidFill>
+                <a:latin typeface="Alien Encounters" pitchFamily="0" charset="0"/>
+                <a:cs typeface="Alien Encounters" pitchFamily="0" charset="0"/>
+              </a:rPr>
+              <a:t>Transaction 1</a:t>
+            </a:r>
+          </a:p>
+        </p:txBody>
+      </p:sp>
+      <p:sp>
+        <p:nvSpPr>
+          <p:cNvPr id="8" name="Text 8"/>
+          <p:cNvSpPr txBox="1"/>
+          <p:nvPr/>
+        </p:nvSpPr>
+        <p:spPr>
+          <a:xfrm>
+            <a:off x="292100" y="3670300"/>
+            <a:ext cx="2540000" cy="381000"/>
+          </a:xfrm>
+          <a:prstGeom prst="rect">
+            <a:avLst/>
+          </a:prstGeom>
+          <a:noFill/>
+        </p:spPr>
+        <p:txBody>
+          <a:bodyPr rtlCol="0" wrap="none" anchor="ctr"/>
+          <a:lstStyle/>
+          <a:p>
+            <a:pPr algn="l"/>
+            <a:r>
+              <a:rPr lang="en-US" smtClean="0" sz="2000">
+                <a:solidFill>
+                  <a:srgbClr val="000000"/>
+                </a:solidFill>
+                <a:latin typeface="Alien Encounters" pitchFamily="0" charset="0"/>
+                <a:cs typeface="Alien Encounters" pitchFamily="0" charset="0"/>
+              </a:rPr>
+              <a:t>Transaction 1</a:t>
+            </a:r>
+          </a:p>
+        </p:txBody>
+      </p:sp>
+      <p:sp>
+        <p:nvSpPr>
+          <p:cNvPr id="9" name="Text 9"/>
+          <p:cNvSpPr txBox="1"/>
+          <p:nvPr/>
+        </p:nvSpPr>
+        <p:spPr>
+          <a:xfrm>
+            <a:off x="7937500" y="3924300"/>
+            <a:ext cx="2540000" cy="381000"/>
+          </a:xfrm>
+          <a:prstGeom prst="rect">
+            <a:avLst/>
+          </a:prstGeom>
+          <a:noFill/>
+        </p:spPr>
+        <p:txBody>
+          <a:bodyPr rtlCol="0" wrap="none" anchor="ctr"/>
+          <a:lstStyle/>
+          <a:p>
+            <a:pPr algn="l"/>
+            <a:r>
+              <a:rPr lang="en-US" smtClean="0" sz="2000">
+                <a:solidFill>
+                  <a:srgbClr val="000000"/>
+                </a:solidFill>
+                <a:latin typeface="Alien Encounters" pitchFamily="0" charset="0"/>
+                <a:cs typeface="Alien Encounters" pitchFamily="0" charset="0"/>
+              </a:rPr>
+              <a:t>Transaction 2</a:t>
+            </a:r>
+          </a:p>
+        </p:txBody>
+      </p:sp>
+      <p:sp>
+        <p:nvSpPr>
+          <p:cNvPr id="10" name="Text 10"/>
+          <p:cNvSpPr txBox="1"/>
+          <p:nvPr/>
+        </p:nvSpPr>
+        <p:spPr>
+          <a:xfrm>
+            <a:off x="254000" y="4152900"/>
+            <a:ext cx="2540000" cy="381000"/>
+          </a:xfrm>
+          <a:prstGeom prst="rect">
+            <a:avLst/>
+          </a:prstGeom>
+          <a:noFill/>
+        </p:spPr>
+        <p:txBody>
+          <a:bodyPr rtlCol="0" wrap="none" anchor="ctr"/>
+          <a:lstStyle/>
+          <a:p>
+            <a:pPr algn="l"/>
+            <a:r>
+              <a:rPr lang="en-US" smtClean="0" sz="2000">
+                <a:solidFill>
+                  <a:srgbClr val="000000"/>
+                </a:solidFill>
+                <a:latin typeface="Alien Encounters" pitchFamily="0" charset="0"/>
+                <a:cs typeface="Alien Encounters" pitchFamily="0" charset="0"/>
+              </a:rPr>
+              <a:t>Transaction 2</a:t>
+            </a:r>
+          </a:p>
+        </p:txBody>
+      </p:sp>
+      <p:sp>
+        <p:nvSpPr>
+          <p:cNvPr id="11" name="Text 11"/>
+          <p:cNvSpPr txBox="1"/>
+          <p:nvPr/>
+        </p:nvSpPr>
+        <p:spPr>
+          <a:xfrm>
+            <a:off x="7912100" y="4457700"/>
+            <a:ext cx="2540000" cy="381000"/>
+          </a:xfrm>
+          <a:prstGeom prst="rect">
+            <a:avLst/>
+          </a:prstGeom>
+          <a:noFill/>
+        </p:spPr>
+        <p:txBody>
+          <a:bodyPr rtlCol="0" wrap="none" anchor="ctr"/>
+          <a:lstStyle/>
+          <a:p>
+            <a:pPr algn="l"/>
+            <a:r>
+              <a:rPr lang="en-US" smtClean="0" sz="2000">
+                <a:solidFill>
+                  <a:srgbClr val="000000"/>
+                </a:solidFill>
+                <a:latin typeface="Alien Encounters" pitchFamily="0" charset="0"/>
+                <a:cs typeface="Alien Encounters" pitchFamily="0" charset="0"/>
+              </a:rPr>
+              <a:t>Transaction 3</a:t>
+            </a:r>
+          </a:p>
+        </p:txBody>
+      </p:sp>
+      <p:sp>
+        <p:nvSpPr>
+          <p:cNvPr id="12" name="Text 12"/>
+          <p:cNvSpPr txBox="1"/>
+          <p:nvPr/>
+        </p:nvSpPr>
+        <p:spPr>
+          <a:xfrm>
+            <a:off x="266700" y="4737100"/>
+            <a:ext cx="2540000" cy="381000"/>
+          </a:xfrm>
+          <a:prstGeom prst="rect">
+            <a:avLst/>
+          </a:prstGeom>
+          <a:noFill/>
+        </p:spPr>
+        <p:txBody>
+          <a:bodyPr rtlCol="0" wrap="none" anchor="ctr"/>
+          <a:lstStyle/>
+          <a:p>
+            <a:pPr algn="l"/>
+            <a:r>
+              <a:rPr lang="en-US" smtClean="0" sz="2000">
+                <a:solidFill>
+                  <a:srgbClr val="000000"/>
+                </a:solidFill>
+                <a:latin typeface="Alien Encounters" pitchFamily="0" charset="0"/>
+                <a:cs typeface="Alien Encounters" pitchFamily="0" charset="0"/>
+              </a:rPr>
+              <a:t>Transaction 3</a:t>
+            </a:r>
+          </a:p>
+        </p:txBody>
+      </p:sp>
+      <p:sp>
+        <p:nvSpPr>
+          <p:cNvPr id="13" name="Text 13"/>
+          <p:cNvSpPr txBox="1"/>
+          <p:nvPr/>
+        </p:nvSpPr>
+        <p:spPr>
+          <a:xfrm>
+            <a:off x="7670800" y="5130800"/>
+            <a:ext cx="2540000" cy="381000"/>
+          </a:xfrm>
+          <a:prstGeom prst="rect">
+            <a:avLst/>
+          </a:prstGeom>
+          <a:noFill/>
+        </p:spPr>
+        <p:txBody>
+          <a:bodyPr rtlCol="0" wrap="none" anchor="ctr"/>
+          <a:lstStyle/>
+          <a:p>
+            <a:pPr algn="l"/>
+            <a:r>
+              <a:rPr lang="en-US" smtClean="0" sz="2000">
+                <a:solidFill>
+                  <a:srgbClr val="000000"/>
+                </a:solidFill>
+                <a:latin typeface="Alien Encounters" pitchFamily="0" charset="0"/>
+                <a:cs typeface="Alien Encounters" pitchFamily="0" charset="0"/>
+              </a:rPr>
+              <a:t>Ledger of Node B</a:t>
+            </a:r>
+          </a:p>
+        </p:txBody>
+      </p:sp>
+      <p:sp>
+        <p:nvSpPr>
+          <p:cNvPr id="14" name="Text 14"/>
+          <p:cNvSpPr txBox="1"/>
+          <p:nvPr/>
+        </p:nvSpPr>
+        <p:spPr>
+          <a:xfrm>
+            <a:off x="25400" y="5359400"/>
+            <a:ext cx="2540000" cy="381000"/>
+          </a:xfrm>
+          <a:prstGeom prst="rect">
+            <a:avLst/>
+          </a:prstGeom>
+          <a:noFill/>
+        </p:spPr>
+        <p:txBody>
+          <a:bodyPr rtlCol="0" wrap="none" anchor="ctr"/>
+          <a:lstStyle/>
+          <a:p>
+            <a:pPr algn="l"/>
+            <a:r>
+              <a:rPr lang="en-US" smtClean="0" sz="2000">
+                <a:solidFill>
+                  <a:srgbClr val="000000"/>
+                </a:solidFill>
+                <a:latin typeface="Alien Encounters" pitchFamily="0" charset="0"/>
+                <a:cs typeface="Alien Encounters" pitchFamily="0" charset="0"/>
+              </a:rPr>
+              <a:t>Ledger of Node D</a:t>
+            </a:r>
+          </a:p>
+        </p:txBody>
+      </p:sp>
+      <p:sp>
+        <p:nvSpPr>
+          <p:cNvPr id="15" name="Text 15"/>
+          <p:cNvSpPr txBox="1"/>
+          <p:nvPr/>
+        </p:nvSpPr>
+        <p:spPr>
+          <a:xfrm>
+            <a:off x="6134100" y="5702300"/>
+            <a:ext cx="2540000" cy="381000"/>
+          </a:xfrm>
+          <a:prstGeom prst="rect">
+            <a:avLst/>
+          </a:prstGeom>
+          <a:noFill/>
+        </p:spPr>
+        <p:txBody>
+          <a:bodyPr rtlCol="0" wrap="none" anchor="ctr"/>
+          <a:lstStyle/>
+          <a:p>
+            <a:pPr algn="l"/>
+            <a:r>
+              <a:rPr lang="en-US" smtClean="0" sz="2000">
+                <a:solidFill>
+                  <a:srgbClr val="000000"/>
+                </a:solidFill>
+                <a:latin typeface="Alien Encounters" pitchFamily="0" charset="0"/>
+                <a:cs typeface="Alien Encounters" pitchFamily="0" charset="0"/>
+              </a:rPr>
+              <a:t>Transaction 2</a:t>
+            </a:r>
+          </a:p>
+        </p:txBody>
+      </p:sp>
+      <p:sp>
+        <p:nvSpPr>
+          <p:cNvPr id="16" name="Text 16"/>
+          <p:cNvSpPr txBox="1"/>
+          <p:nvPr/>
+        </p:nvSpPr>
+        <p:spPr>
+          <a:xfrm>
+            <a:off x="1676400" y="5905500"/>
+            <a:ext cx="2540000" cy="381000"/>
+          </a:xfrm>
+          <a:prstGeom prst="rect">
+            <a:avLst/>
+          </a:prstGeom>
+          <a:noFill/>
+        </p:spPr>
+        <p:txBody>
+          <a:bodyPr rtlCol="0" wrap="none" anchor="ctr"/>
+          <a:lstStyle/>
+          <a:p>
+            <a:pPr algn="l"/>
+            <a:r>
+              <a:rPr lang="en-US" smtClean="0" sz="2000">
+                <a:solidFill>
+                  <a:srgbClr val="000000"/>
+                </a:solidFill>
+                <a:latin typeface="Alien Encounters" pitchFamily="0" charset="0"/>
+                <a:cs typeface="Alien Encounters" pitchFamily="0" charset="0"/>
+              </a:rPr>
+              <a:t>Transaction 3</a:t>
+            </a:r>
+          </a:p>
+        </p:txBody>
+      </p:sp>
+      <p:sp>
+        <p:nvSpPr>
+          <p:cNvPr id="17" name="Text 17"/>
+          <p:cNvSpPr txBox="1"/>
+          <p:nvPr/>
+        </p:nvSpPr>
+        <p:spPr>
+          <a:xfrm>
+            <a:off x="6159500" y="6032500"/>
+            <a:ext cx="2540000" cy="381000"/>
+          </a:xfrm>
+          <a:prstGeom prst="rect">
+            <a:avLst/>
+          </a:prstGeom>
+          <a:noFill/>
+        </p:spPr>
+        <p:txBody>
+          <a:bodyPr rtlCol="0" wrap="none" anchor="ctr"/>
+          <a:lstStyle/>
+          <a:p>
+            <a:pPr algn="l"/>
+            <a:r>
+              <a:rPr lang="en-US" smtClean="0" sz="2000">
+                <a:solidFill>
+                  <a:srgbClr val="000000"/>
+                </a:solidFill>
+                <a:latin typeface="Alien Encounters" pitchFamily="0" charset="0"/>
+                <a:cs typeface="Alien Encounters" pitchFamily="0" charset="0"/>
+              </a:rPr>
+              <a:t>B send E10to C</a:t>
+            </a:r>
+          </a:p>
+        </p:txBody>
+      </p:sp>
+      <p:sp>
+        <p:nvSpPr>
+          <p:cNvPr id="18" name="Text 18"/>
+          <p:cNvSpPr txBox="1"/>
+          <p:nvPr/>
+        </p:nvSpPr>
+        <p:spPr>
+          <a:xfrm>
+            <a:off x="1854200" y="6210300"/>
+            <a:ext cx="2540000" cy="381000"/>
+          </a:xfrm>
+          <a:prstGeom prst="rect">
+            <a:avLst/>
+          </a:prstGeom>
+          <a:noFill/>
+        </p:spPr>
+        <p:txBody>
+          <a:bodyPr rtlCol="0" wrap="none" anchor="ctr"/>
+          <a:lstStyle/>
+          <a:p>
+            <a:pPr algn="l"/>
+            <a:r>
+              <a:rPr lang="en-US" smtClean="0" sz="2000">
+                <a:solidFill>
+                  <a:srgbClr val="000000"/>
+                </a:solidFill>
+                <a:latin typeface="Alien Encounters" pitchFamily="0" charset="0"/>
+                <a:cs typeface="Alien Encounters" pitchFamily="0" charset="0"/>
+              </a:rPr>
+              <a:t>send E20 to D</a:t>
+            </a:r>
+          </a:p>
+        </p:txBody>
+      </p:sp>
+      <p:sp>
+        <p:nvSpPr>
+          <p:cNvPr id="19" name="Text 19"/>
+          <p:cNvSpPr txBox="1"/>
+          <p:nvPr/>
+        </p:nvSpPr>
+        <p:spPr>
+          <a:xfrm>
+            <a:off x="3898900" y="6921500"/>
+            <a:ext cx="2540000" cy="381000"/>
+          </a:xfrm>
+          <a:prstGeom prst="rect">
+            <a:avLst/>
+          </a:prstGeom>
+          <a:noFill/>
+        </p:spPr>
+        <p:txBody>
+          <a:bodyPr rtlCol="0" wrap="none" anchor="ctr"/>
+          <a:lstStyle/>
+          <a:p>
+            <a:pPr algn="l"/>
+            <a:r>
+              <a:rPr lang="en-US" smtClean="0" sz="2000">
+                <a:solidFill>
+                  <a:srgbClr val="000000"/>
+                </a:solidFill>
+                <a:latin typeface="Alien Encounters" pitchFamily="0" charset="0"/>
+                <a:cs typeface="Alien Encounters" pitchFamily="0" charset="0"/>
+              </a:rPr>
+              <a:t>Transaction 1</a:t>
+            </a:r>
+          </a:p>
+        </p:txBody>
+      </p:sp>
+      <p:sp>
+        <p:nvSpPr>
+          <p:cNvPr id="20" name="Text 20"/>
+          <p:cNvSpPr txBox="1"/>
+          <p:nvPr/>
+        </p:nvSpPr>
+        <p:spPr>
+          <a:xfrm>
+            <a:off x="3898900" y="7454900"/>
+            <a:ext cx="2540000" cy="381000"/>
+          </a:xfrm>
+          <a:prstGeom prst="rect">
+            <a:avLst/>
+          </a:prstGeom>
+          <a:noFill/>
+        </p:spPr>
+        <p:txBody>
+          <a:bodyPr rtlCol="0" wrap="none" anchor="ctr"/>
+          <a:lstStyle/>
+          <a:p>
+            <a:pPr algn="l"/>
+            <a:r>
+              <a:rPr lang="en-US" smtClean="0" sz="2000">
+                <a:solidFill>
+                  <a:srgbClr val="000000"/>
+                </a:solidFill>
+                <a:latin typeface="Alien Encounters" pitchFamily="0" charset="0"/>
+                <a:cs typeface="Alien Encounters" pitchFamily="0" charset="0"/>
+              </a:rPr>
+              <a:t>Transaction 2</a:t>
+            </a:r>
+          </a:p>
+        </p:txBody>
+      </p:sp>
+      <p:sp>
+        <p:nvSpPr>
+          <p:cNvPr id="21" name="Text 21"/>
+          <p:cNvSpPr txBox="1"/>
+          <p:nvPr/>
+        </p:nvSpPr>
+        <p:spPr>
+          <a:xfrm>
+            <a:off x="3886200" y="7975600"/>
+            <a:ext cx="2540000" cy="381000"/>
+          </a:xfrm>
+          <a:prstGeom prst="rect">
+            <a:avLst/>
+          </a:prstGeom>
+          <a:noFill/>
+        </p:spPr>
+        <p:txBody>
+          <a:bodyPr rtlCol="0" wrap="none" anchor="ctr"/>
+          <a:lstStyle/>
+          <a:p>
+            <a:pPr algn="l"/>
+            <a:r>
+              <a:rPr lang="en-US" smtClean="0" sz="2000">
+                <a:solidFill>
+                  <a:srgbClr val="000000"/>
+                </a:solidFill>
+                <a:latin typeface="Alien Encounters" pitchFamily="0" charset="0"/>
+                <a:cs typeface="Alien Encounters" pitchFamily="0" charset="0"/>
+              </a:rPr>
+              <a:t>Transaction 3</a:t>
+            </a:r>
+          </a:p>
+        </p:txBody>
+      </p:sp>
+      <p:sp>
+        <p:nvSpPr>
+          <p:cNvPr id="22" name="Text 22"/>
+          <p:cNvSpPr txBox="1"/>
+          <p:nvPr/>
+        </p:nvSpPr>
+        <p:spPr>
+          <a:xfrm>
+            <a:off x="3632200" y="8585200"/>
+            <a:ext cx="2540000" cy="381000"/>
+          </a:xfrm>
+          <a:prstGeom prst="rect">
+            <a:avLst/>
+          </a:prstGeom>
+          <a:noFill/>
+        </p:spPr>
+        <p:txBody>
+          <a:bodyPr rtlCol="0" wrap="none" anchor="ctr"/>
+          <a:lstStyle/>
+          <a:p>
+            <a:pPr algn="l"/>
+            <a:r>
+              <a:rPr lang="en-US" smtClean="0" sz="2000">
+                <a:solidFill>
+                  <a:srgbClr val="000000"/>
+                </a:solidFill>
+                <a:latin typeface="Alien Encounters" pitchFamily="0" charset="0"/>
+                <a:cs typeface="Alien Encounters" pitchFamily="0" charset="0"/>
+              </a:rPr>
+              <a:t>Ledger of Node C</a:t>
             </a:r>
           </a:p>
         </p:txBody>

</xml_diff>

<commit_message>
seperated input images to different directory
</commit_message>
<xml_diff>
--- a/shapes-test.pptx
+++ b/shapes-test.pptx
@@ -5,7 +5,7 @@
     <p:sldMasterId id="2147483648" r:id="rId1"/>
   </p:sldMasterIdLst>
   <p:sldIdLst>
-    <p:sldId id="256" r:id="rId-b09644e8-8af3-4cd3-87a7-f908b40ee896"/>
+    <p:sldId id="256" r:id="rId-f3a8aeb7-7560-4ad2-b4f0-7d28f2d8ef3b"/>
   </p:sldIdLst>
   <p:sldSz cx="10515600" cy="9144000" type="screen4x3"/>
   <p:notesSz cx="6858000" cy="9144000"/>
@@ -734,8 +734,8 @@
         </p:nvSpPr>
         <p:spPr>
           <a:xfrm>
-            <a:off x="7848600" y="2679700"/>
-            <a:ext cx="2159000" cy="431800"/>
+            <a:off x="3644900" y="6769100"/>
+            <a:ext cx="1981200" cy="1612900"/>
           </a:xfrm>
           <a:prstGeom prst="rect">
             <a:avLst/>
@@ -763,8 +763,8 @@
         </p:nvSpPr>
         <p:spPr>
           <a:xfrm>
-            <a:off x="4165600" y="2679700"/>
-            <a:ext cx="2159000" cy="431800"/>
+            <a:off x="3657600" y="7835900"/>
+            <a:ext cx="1955800" cy="533400"/>
           </a:xfrm>
           <a:prstGeom prst="rect">
             <a:avLst/>
@@ -792,8 +792,8 @@
         </p:nvSpPr>
         <p:spPr>
           <a:xfrm>
-            <a:off x="469900" y="2679700"/>
-            <a:ext cx="2159000" cy="431800"/>
+            <a:off x="3657600" y="7315200"/>
+            <a:ext cx="1955800" cy="520700"/>
           </a:xfrm>
           <a:prstGeom prst="rect">
             <a:avLst/>
@@ -821,8 +821,8 @@
         </p:nvSpPr>
         <p:spPr>
           <a:xfrm>
-            <a:off x="7848600" y="584200"/>
-            <a:ext cx="2159000" cy="2095500"/>
+            <a:off x="3657600" y="6781800"/>
+            <a:ext cx="1955800" cy="520700"/>
           </a:xfrm>
           <a:prstGeom prst="rect">
             <a:avLst/>
@@ -850,8 +850,8 @@
         </p:nvSpPr>
         <p:spPr>
           <a:xfrm>
-            <a:off x="4165600" y="584200"/>
-            <a:ext cx="2159000" cy="2095500"/>
+            <a:off x="4318000" y="5969000"/>
+            <a:ext cx="774700" cy="584200"/>
           </a:xfrm>
           <a:prstGeom prst="rect">
             <a:avLst/>
@@ -879,8 +879,666 @@
         </p:nvSpPr>
         <p:spPr>
           <a:xfrm>
-            <a:off x="469900" y="584200"/>
-            <a:ext cx="2159000" cy="2095500"/>
+            <a:off x="4305300" y="5956300"/>
+            <a:ext cx="800100" cy="609600"/>
+          </a:xfrm>
+          <a:prstGeom prst="octagon">
+            <a:avLst>
+              <a:gd name="adj" fmla="val 29289"/>
+            </a:avLst>
+          </a:prstGeom>
+          <a:solidFill>
+            <a:srgbClr val="ffffff"/>
+          </a:solidFill>
+          <a:ln w="25400">
+            <a:solidFill>
+              <a:srgbClr val="000000"/>
+            </a:solidFill>
+          </a:ln>
+        </p:spPr>
+        <p:txBody>
+          <a:bodyPr rtlCol="0" wrap="square" anchor="ctr"/>
+          <a:lstStyle/>
+          <a:p/>
+        </p:txBody>
+      </p:sp>
+      <p:sp>
+        <p:nvSpPr>
+          <p:cNvPr id="7" name="Shape 7"/>
+          <p:cNvSpPr/>
+          <p:nvPr/>
+        </p:nvSpPr>
+        <p:spPr>
+          <a:xfrm>
+            <a:off x="2781300" y="4826000"/>
+            <a:ext cx="1308100" cy="1231900"/>
+          </a:xfrm>
+          <a:prstGeom prst="hexagon">
+            <a:avLst>
+              <a:gd name="adj" fmla="val 25000"/>
+              <a:gd name="vf" fmla="val 115470"/>
+            </a:avLst>
+          </a:prstGeom>
+          <a:solidFill>
+            <a:srgbClr val="ffffff"/>
+          </a:solidFill>
+          <a:ln w="25400">
+            <a:solidFill>
+              <a:srgbClr val="000000"/>
+            </a:solidFill>
+          </a:ln>
+        </p:spPr>
+        <p:txBody>
+          <a:bodyPr rtlCol="0" wrap="square" anchor="ctr"/>
+          <a:lstStyle/>
+          <a:p/>
+        </p:txBody>
+      </p:sp>
+      <p:sp>
+        <p:nvSpPr>
+          <p:cNvPr id="8" name="Shape 8"/>
+          <p:cNvSpPr/>
+          <p:nvPr/>
+        </p:nvSpPr>
+        <p:spPr>
+          <a:xfrm>
+            <a:off x="5334000" y="4711700"/>
+            <a:ext cx="1397000" cy="1409700"/>
+          </a:xfrm>
+          <a:prstGeom prst="hexagon">
+            <a:avLst>
+              <a:gd name="adj" fmla="val 25000"/>
+              <a:gd name="vf" fmla="val 115470"/>
+            </a:avLst>
+          </a:prstGeom>
+          <a:solidFill>
+            <a:srgbClr val="ffffff"/>
+          </a:solidFill>
+          <a:ln w="25400">
+            <a:solidFill>
+              <a:srgbClr val="000000"/>
+            </a:solidFill>
+          </a:ln>
+        </p:spPr>
+        <p:txBody>
+          <a:bodyPr rtlCol="0" wrap="square" anchor="ctr"/>
+          <a:lstStyle/>
+          <a:p/>
+        </p:txBody>
+      </p:sp>
+      <p:sp>
+        <p:nvSpPr>
+          <p:cNvPr id="9" name="Shape 9"/>
+          <p:cNvSpPr/>
+          <p:nvPr/>
+        </p:nvSpPr>
+        <p:spPr>
+          <a:xfrm>
+            <a:off x="2209800" y="3987800"/>
+            <a:ext cx="774700" cy="584200"/>
+          </a:xfrm>
+          <a:prstGeom prst="rect">
+            <a:avLst/>
+          </a:prstGeom>
+          <a:solidFill>
+            <a:srgbClr val="ffffff"/>
+          </a:solidFill>
+          <a:ln w="25400">
+            <a:solidFill>
+              <a:srgbClr val="000000"/>
+            </a:solidFill>
+          </a:ln>
+        </p:spPr>
+        <p:txBody>
+          <a:bodyPr rtlCol="0" wrap="square" anchor="ctr"/>
+          <a:lstStyle/>
+          <a:p/>
+        </p:txBody>
+      </p:sp>
+      <p:sp>
+        <p:nvSpPr>
+          <p:cNvPr id="10" name="Shape 10"/>
+          <p:cNvSpPr/>
+          <p:nvPr/>
+        </p:nvSpPr>
+        <p:spPr>
+          <a:xfrm>
+            <a:off x="2197100" y="3975100"/>
+            <a:ext cx="800100" cy="609600"/>
+          </a:xfrm>
+          <a:prstGeom prst="octagon">
+            <a:avLst>
+              <a:gd name="adj" fmla="val 29289"/>
+            </a:avLst>
+          </a:prstGeom>
+          <a:solidFill>
+            <a:srgbClr val="ffffff"/>
+          </a:solidFill>
+          <a:ln w="25400">
+            <a:solidFill>
+              <a:srgbClr val="000000"/>
+            </a:solidFill>
+          </a:ln>
+        </p:spPr>
+        <p:txBody>
+          <a:bodyPr rtlCol="0" wrap="square" anchor="ctr"/>
+          <a:lstStyle/>
+          <a:p/>
+        </p:txBody>
+      </p:sp>
+      <p:sp>
+        <p:nvSpPr>
+          <p:cNvPr id="11" name="Shape 11"/>
+          <p:cNvSpPr/>
+          <p:nvPr/>
+        </p:nvSpPr>
+        <p:spPr>
+          <a:xfrm>
+            <a:off x="6578600" y="3924300"/>
+            <a:ext cx="774700" cy="584200"/>
+          </a:xfrm>
+          <a:prstGeom prst="rect">
+            <a:avLst/>
+          </a:prstGeom>
+          <a:solidFill>
+            <a:srgbClr val="ffffff"/>
+          </a:solidFill>
+          <a:ln w="25400">
+            <a:solidFill>
+              <a:srgbClr val="000000"/>
+            </a:solidFill>
+          </a:ln>
+        </p:spPr>
+        <p:txBody>
+          <a:bodyPr rtlCol="0" wrap="square" anchor="ctr"/>
+          <a:lstStyle/>
+          <a:p/>
+        </p:txBody>
+      </p:sp>
+      <p:sp>
+        <p:nvSpPr>
+          <p:cNvPr id="12" name="Shape 12"/>
+          <p:cNvSpPr/>
+          <p:nvPr/>
+        </p:nvSpPr>
+        <p:spPr>
+          <a:xfrm>
+            <a:off x="6565900" y="3911600"/>
+            <a:ext cx="800100" cy="609600"/>
+          </a:xfrm>
+          <a:prstGeom prst="octagon">
+            <a:avLst>
+              <a:gd name="adj" fmla="val 29289"/>
+            </a:avLst>
+          </a:prstGeom>
+          <a:solidFill>
+            <a:srgbClr val="ffffff"/>
+          </a:solidFill>
+          <a:ln w="25400">
+            <a:solidFill>
+              <a:srgbClr val="000000"/>
+            </a:solidFill>
+          </a:ln>
+        </p:spPr>
+        <p:txBody>
+          <a:bodyPr rtlCol="0" wrap="square" anchor="ctr"/>
+          <a:lstStyle/>
+          <a:p/>
+        </p:txBody>
+      </p:sp>
+      <p:sp>
+        <p:nvSpPr>
+          <p:cNvPr id="13" name="Shape 13"/>
+          <p:cNvSpPr/>
+          <p:nvPr/>
+        </p:nvSpPr>
+        <p:spPr>
+          <a:xfrm>
+            <a:off x="50800" y="3505200"/>
+            <a:ext cx="1981200" cy="1612900"/>
+          </a:xfrm>
+          <a:prstGeom prst="rect">
+            <a:avLst/>
+          </a:prstGeom>
+          <a:solidFill>
+            <a:srgbClr val="ffffff"/>
+          </a:solidFill>
+          <a:ln w="25400">
+            <a:solidFill>
+              <a:srgbClr val="000000"/>
+            </a:solidFill>
+          </a:ln>
+        </p:spPr>
+        <p:txBody>
+          <a:bodyPr rtlCol="0" wrap="square" anchor="ctr"/>
+          <a:lstStyle/>
+          <a:p/>
+        </p:txBody>
+      </p:sp>
+      <p:sp>
+        <p:nvSpPr>
+          <p:cNvPr id="14" name="Shape 14"/>
+          <p:cNvSpPr/>
+          <p:nvPr/>
+        </p:nvSpPr>
+        <p:spPr>
+          <a:xfrm>
+            <a:off x="63500" y="4572000"/>
+            <a:ext cx="1955800" cy="533400"/>
+          </a:xfrm>
+          <a:prstGeom prst="rect">
+            <a:avLst/>
+          </a:prstGeom>
+          <a:solidFill>
+            <a:srgbClr val="ffffff"/>
+          </a:solidFill>
+          <a:ln w="25400">
+            <a:solidFill>
+              <a:srgbClr val="000000"/>
+            </a:solidFill>
+          </a:ln>
+        </p:spPr>
+        <p:txBody>
+          <a:bodyPr rtlCol="0" wrap="square" anchor="ctr"/>
+          <a:lstStyle/>
+          <a:p/>
+        </p:txBody>
+      </p:sp>
+      <p:sp>
+        <p:nvSpPr>
+          <p:cNvPr id="15" name="Shape 15"/>
+          <p:cNvSpPr/>
+          <p:nvPr/>
+        </p:nvSpPr>
+        <p:spPr>
+          <a:xfrm>
+            <a:off x="63500" y="4051300"/>
+            <a:ext cx="1955800" cy="520700"/>
+          </a:xfrm>
+          <a:prstGeom prst="rect">
+            <a:avLst/>
+          </a:prstGeom>
+          <a:solidFill>
+            <a:srgbClr val="ffffff"/>
+          </a:solidFill>
+          <a:ln w="25400">
+            <a:solidFill>
+              <a:srgbClr val="000000"/>
+            </a:solidFill>
+          </a:ln>
+        </p:spPr>
+        <p:txBody>
+          <a:bodyPr rtlCol="0" wrap="square" anchor="ctr"/>
+          <a:lstStyle/>
+          <a:p/>
+        </p:txBody>
+      </p:sp>
+      <p:sp>
+        <p:nvSpPr>
+          <p:cNvPr id="16" name="Shape 16"/>
+          <p:cNvSpPr/>
+          <p:nvPr/>
+        </p:nvSpPr>
+        <p:spPr>
+          <a:xfrm>
+            <a:off x="63500" y="3517900"/>
+            <a:ext cx="1955800" cy="520700"/>
+          </a:xfrm>
+          <a:prstGeom prst="rect">
+            <a:avLst/>
+          </a:prstGeom>
+          <a:solidFill>
+            <a:srgbClr val="ffffff"/>
+          </a:solidFill>
+          <a:ln w="25400">
+            <a:solidFill>
+              <a:srgbClr val="000000"/>
+            </a:solidFill>
+          </a:ln>
+        </p:spPr>
+        <p:txBody>
+          <a:bodyPr rtlCol="0" wrap="square" anchor="ctr"/>
+          <a:lstStyle/>
+          <a:p/>
+        </p:txBody>
+      </p:sp>
+      <p:sp>
+        <p:nvSpPr>
+          <p:cNvPr id="17" name="Shape 17"/>
+          <p:cNvSpPr/>
+          <p:nvPr/>
+        </p:nvSpPr>
+        <p:spPr>
+          <a:xfrm>
+            <a:off x="7632700" y="3225800"/>
+            <a:ext cx="1981200" cy="1612900"/>
+          </a:xfrm>
+          <a:prstGeom prst="rect">
+            <a:avLst/>
+          </a:prstGeom>
+          <a:solidFill>
+            <a:srgbClr val="ffffff"/>
+          </a:solidFill>
+          <a:ln w="25400">
+            <a:solidFill>
+              <a:srgbClr val="000000"/>
+            </a:solidFill>
+          </a:ln>
+        </p:spPr>
+        <p:txBody>
+          <a:bodyPr rtlCol="0" wrap="square" anchor="ctr"/>
+          <a:lstStyle/>
+          <a:p/>
+        </p:txBody>
+      </p:sp>
+      <p:sp>
+        <p:nvSpPr>
+          <p:cNvPr id="18" name="Shape 18"/>
+          <p:cNvSpPr/>
+          <p:nvPr/>
+        </p:nvSpPr>
+        <p:spPr>
+          <a:xfrm>
+            <a:off x="7645400" y="4292600"/>
+            <a:ext cx="1955800" cy="533400"/>
+          </a:xfrm>
+          <a:prstGeom prst="rect">
+            <a:avLst/>
+          </a:prstGeom>
+          <a:solidFill>
+            <a:srgbClr val="ffffff"/>
+          </a:solidFill>
+          <a:ln w="25400">
+            <a:solidFill>
+              <a:srgbClr val="000000"/>
+            </a:solidFill>
+          </a:ln>
+        </p:spPr>
+        <p:txBody>
+          <a:bodyPr rtlCol="0" wrap="square" anchor="ctr"/>
+          <a:lstStyle/>
+          <a:p/>
+        </p:txBody>
+      </p:sp>
+      <p:sp>
+        <p:nvSpPr>
+          <p:cNvPr id="19" name="Shape 19"/>
+          <p:cNvSpPr/>
+          <p:nvPr/>
+        </p:nvSpPr>
+        <p:spPr>
+          <a:xfrm>
+            <a:off x="7645400" y="3771900"/>
+            <a:ext cx="1955800" cy="520700"/>
+          </a:xfrm>
+          <a:prstGeom prst="rect">
+            <a:avLst/>
+          </a:prstGeom>
+          <a:solidFill>
+            <a:srgbClr val="ffffff"/>
+          </a:solidFill>
+          <a:ln w="25400">
+            <a:solidFill>
+              <a:srgbClr val="000000"/>
+            </a:solidFill>
+          </a:ln>
+        </p:spPr>
+        <p:txBody>
+          <a:bodyPr rtlCol="0" wrap="square" anchor="ctr"/>
+          <a:lstStyle/>
+          <a:p/>
+        </p:txBody>
+      </p:sp>
+      <p:sp>
+        <p:nvSpPr>
+          <p:cNvPr id="20" name="Shape 20"/>
+          <p:cNvSpPr/>
+          <p:nvPr/>
+        </p:nvSpPr>
+        <p:spPr>
+          <a:xfrm>
+            <a:off x="7645400" y="3238500"/>
+            <a:ext cx="1955800" cy="520700"/>
+          </a:xfrm>
+          <a:prstGeom prst="rect">
+            <a:avLst/>
+          </a:prstGeom>
+          <a:solidFill>
+            <a:srgbClr val="ffffff"/>
+          </a:solidFill>
+          <a:ln w="25400">
+            <a:solidFill>
+              <a:srgbClr val="000000"/>
+            </a:solidFill>
+          </a:ln>
+        </p:spPr>
+        <p:txBody>
+          <a:bodyPr rtlCol="0" wrap="square" anchor="ctr"/>
+          <a:lstStyle/>
+          <a:p/>
+        </p:txBody>
+      </p:sp>
+      <p:sp>
+        <p:nvSpPr>
+          <p:cNvPr id="21" name="Shape 21"/>
+          <p:cNvSpPr/>
+          <p:nvPr/>
+        </p:nvSpPr>
+        <p:spPr>
+          <a:xfrm>
+            <a:off x="2832100" y="2667000"/>
+            <a:ext cx="1181100" cy="1193800"/>
+          </a:xfrm>
+          <a:prstGeom prst="hexagon">
+            <a:avLst>
+              <a:gd name="adj" fmla="val 25000"/>
+              <a:gd name="vf" fmla="val 115470"/>
+            </a:avLst>
+          </a:prstGeom>
+          <a:solidFill>
+            <a:srgbClr val="ffffff"/>
+          </a:solidFill>
+          <a:ln w="25400">
+            <a:solidFill>
+              <a:srgbClr val="000000"/>
+            </a:solidFill>
+          </a:ln>
+        </p:spPr>
+        <p:txBody>
+          <a:bodyPr rtlCol="0" wrap="square" anchor="ctr"/>
+          <a:lstStyle/>
+          <a:p/>
+        </p:txBody>
+      </p:sp>
+      <p:sp>
+        <p:nvSpPr>
+          <p:cNvPr id="22" name="Shape 22"/>
+          <p:cNvSpPr/>
+          <p:nvPr/>
+        </p:nvSpPr>
+        <p:spPr>
+          <a:xfrm>
+            <a:off x="5245100" y="2552700"/>
+            <a:ext cx="1460500" cy="1244600"/>
+          </a:xfrm>
+          <a:prstGeom prst="hexagon">
+            <a:avLst>
+              <a:gd name="adj" fmla="val 25000"/>
+              <a:gd name="vf" fmla="val 115470"/>
+            </a:avLst>
+          </a:prstGeom>
+          <a:solidFill>
+            <a:srgbClr val="ffffff"/>
+          </a:solidFill>
+          <a:ln w="25400">
+            <a:solidFill>
+              <a:srgbClr val="000000"/>
+            </a:solidFill>
+          </a:ln>
+        </p:spPr>
+        <p:txBody>
+          <a:bodyPr rtlCol="0" wrap="square" anchor="ctr"/>
+          <a:lstStyle/>
+          <a:p/>
+        </p:txBody>
+      </p:sp>
+      <p:sp>
+        <p:nvSpPr>
+          <p:cNvPr id="23" name="Shape 23"/>
+          <p:cNvSpPr/>
+          <p:nvPr/>
+        </p:nvSpPr>
+        <p:spPr>
+          <a:xfrm>
+            <a:off x="4330700" y="2133600"/>
+            <a:ext cx="774700" cy="584200"/>
+          </a:xfrm>
+          <a:prstGeom prst="rect">
+            <a:avLst/>
+          </a:prstGeom>
+          <a:solidFill>
+            <a:srgbClr val="ffffff"/>
+          </a:solidFill>
+          <a:ln w="25400">
+            <a:solidFill>
+              <a:srgbClr val="000000"/>
+            </a:solidFill>
+          </a:ln>
+        </p:spPr>
+        <p:txBody>
+          <a:bodyPr rtlCol="0" wrap="square" anchor="ctr"/>
+          <a:lstStyle/>
+          <a:p/>
+        </p:txBody>
+      </p:sp>
+      <p:sp>
+        <p:nvSpPr>
+          <p:cNvPr id="24" name="Shape 24"/>
+          <p:cNvSpPr/>
+          <p:nvPr/>
+        </p:nvSpPr>
+        <p:spPr>
+          <a:xfrm>
+            <a:off x="4318000" y="2120900"/>
+            <a:ext cx="800100" cy="609600"/>
+          </a:xfrm>
+          <a:prstGeom prst="octagon">
+            <a:avLst>
+              <a:gd name="adj" fmla="val 29289"/>
+            </a:avLst>
+          </a:prstGeom>
+          <a:solidFill>
+            <a:srgbClr val="ffffff"/>
+          </a:solidFill>
+          <a:ln w="25400">
+            <a:solidFill>
+              <a:srgbClr val="000000"/>
+            </a:solidFill>
+          </a:ln>
+        </p:spPr>
+        <p:txBody>
+          <a:bodyPr rtlCol="0" wrap="square" anchor="ctr"/>
+          <a:lstStyle/>
+          <a:p/>
+        </p:txBody>
+      </p:sp>
+      <p:sp>
+        <p:nvSpPr>
+          <p:cNvPr id="25" name="Shape 25"/>
+          <p:cNvSpPr/>
+          <p:nvPr/>
+        </p:nvSpPr>
+        <p:spPr>
+          <a:xfrm>
+            <a:off x="3873500" y="368300"/>
+            <a:ext cx="1981200" cy="1612900"/>
+          </a:xfrm>
+          <a:prstGeom prst="rect">
+            <a:avLst/>
+          </a:prstGeom>
+          <a:solidFill>
+            <a:srgbClr val="ffffff"/>
+          </a:solidFill>
+          <a:ln w="25400">
+            <a:solidFill>
+              <a:srgbClr val="000000"/>
+            </a:solidFill>
+          </a:ln>
+        </p:spPr>
+        <p:txBody>
+          <a:bodyPr rtlCol="0" wrap="square" anchor="ctr"/>
+          <a:lstStyle/>
+          <a:p/>
+        </p:txBody>
+      </p:sp>
+      <p:sp>
+        <p:nvSpPr>
+          <p:cNvPr id="26" name="Shape 26"/>
+          <p:cNvSpPr/>
+          <p:nvPr/>
+        </p:nvSpPr>
+        <p:spPr>
+          <a:xfrm>
+            <a:off x="3886200" y="1435100"/>
+            <a:ext cx="1955800" cy="533400"/>
+          </a:xfrm>
+          <a:prstGeom prst="rect">
+            <a:avLst/>
+          </a:prstGeom>
+          <a:solidFill>
+            <a:srgbClr val="ffffff"/>
+          </a:solidFill>
+          <a:ln w="25400">
+            <a:solidFill>
+              <a:srgbClr val="000000"/>
+            </a:solidFill>
+          </a:ln>
+        </p:spPr>
+        <p:txBody>
+          <a:bodyPr rtlCol="0" wrap="square" anchor="ctr"/>
+          <a:lstStyle/>
+          <a:p/>
+        </p:txBody>
+      </p:sp>
+      <p:sp>
+        <p:nvSpPr>
+          <p:cNvPr id="27" name="Shape 27"/>
+          <p:cNvSpPr/>
+          <p:nvPr/>
+        </p:nvSpPr>
+        <p:spPr>
+          <a:xfrm>
+            <a:off x="3886200" y="914400"/>
+            <a:ext cx="1955800" cy="520700"/>
+          </a:xfrm>
+          <a:prstGeom prst="rect">
+            <a:avLst/>
+          </a:prstGeom>
+          <a:solidFill>
+            <a:srgbClr val="ffffff"/>
+          </a:solidFill>
+          <a:ln w="25400">
+            <a:solidFill>
+              <a:srgbClr val="000000"/>
+            </a:solidFill>
+          </a:ln>
+        </p:spPr>
+        <p:txBody>
+          <a:bodyPr rtlCol="0" wrap="square" anchor="ctr"/>
+          <a:lstStyle/>
+          <a:p/>
+        </p:txBody>
+      </p:sp>
+      <p:sp>
+        <p:nvSpPr>
+          <p:cNvPr id="28" name="Shape 28"/>
+          <p:cNvSpPr/>
+          <p:nvPr/>
+        </p:nvSpPr>
+        <p:spPr>
+          <a:xfrm>
+            <a:off x="3886200" y="381000"/>
+            <a:ext cx="1955800" cy="520700"/>
           </a:xfrm>
           <a:prstGeom prst="rect">
             <a:avLst/>
@@ -908,7 +1566,7 @@
         </p:nvSpPr>
         <p:spPr>
           <a:xfrm>
-            <a:off x="1282700" y="1485900"/>
+            <a:off x="3937000" y="0"/>
             <a:ext cx="2540000" cy="381000"/>
           </a:xfrm>
           <a:prstGeom prst="rect">
@@ -929,7 +1587,7 @@
                 <a:latin typeface="Alien Encounters" pitchFamily="0" charset="0"/>
                 <a:cs typeface="Alien Encounters" pitchFamily="0" charset="0"/>
               </a:rPr>
-              <a:t>Data</a:t>
+              <a:t>Ledger of Node A</a:t>
             </a:r>
           </a:p>
         </p:txBody>
@@ -942,7 +1600,7 @@
         </p:nvSpPr>
         <p:spPr>
           <a:xfrm>
-            <a:off x="4991100" y="1485900"/>
+            <a:off x="4140200" y="533400"/>
             <a:ext cx="2540000" cy="381000"/>
           </a:xfrm>
           <a:prstGeom prst="rect">
@@ -963,7 +1621,7 @@
                 <a:latin typeface="Alien Encounters" pitchFamily="0" charset="0"/>
                 <a:cs typeface="Alien Encounters" pitchFamily="0" charset="0"/>
               </a:rPr>
-              <a:t>Data</a:t>
+              <a:t>Transaction 1</a:t>
             </a:r>
           </a:p>
         </p:txBody>
@@ -976,7 +1634,7 @@
         </p:nvSpPr>
         <p:spPr>
           <a:xfrm>
-            <a:off x="8674100" y="1485900"/>
+            <a:off x="4127500" y="1054100"/>
             <a:ext cx="2540000" cy="381000"/>
           </a:xfrm>
           <a:prstGeom prst="rect">
@@ -997,7 +1655,7 @@
                 <a:latin typeface="Alien Encounters" pitchFamily="0" charset="0"/>
                 <a:cs typeface="Alien Encounters" pitchFamily="0" charset="0"/>
               </a:rPr>
-              <a:t>Data</a:t>
+              <a:t>Transaction 2</a:t>
             </a:r>
           </a:p>
         </p:txBody>
@@ -1010,7 +1668,7 @@
         </p:nvSpPr>
         <p:spPr>
           <a:xfrm>
-            <a:off x="1003300" y="2781300"/>
+            <a:off x="4127500" y="1562100"/>
             <a:ext cx="2540000" cy="381000"/>
           </a:xfrm>
           <a:prstGeom prst="rect">
@@ -1031,7 +1689,7 @@
                 <a:latin typeface="Alien Encounters" pitchFamily="0" charset="0"/>
                 <a:cs typeface="Alien Encounters" pitchFamily="0" charset="0"/>
               </a:rPr>
-              <a:t>Reference</a:t>
+              <a:t>Transaction 3</a:t>
             </a:r>
           </a:p>
         </p:txBody>
@@ -1044,7 +1702,7 @@
         </p:nvSpPr>
         <p:spPr>
           <a:xfrm>
-            <a:off x="4673600" y="2743200"/>
+            <a:off x="6184900" y="2374900"/>
             <a:ext cx="2540000" cy="381000"/>
           </a:xfrm>
           <a:prstGeom prst="rect">
@@ -1065,7 +1723,7 @@
                 <a:latin typeface="Alien Encounters" pitchFamily="0" charset="0"/>
                 <a:cs typeface="Alien Encounters" pitchFamily="0" charset="0"/>
               </a:rPr>
-              <a:t>Reference</a:t>
+              <a:t>Transaction 1</a:t>
             </a:r>
           </a:p>
         </p:txBody>
@@ -1078,7 +1736,7 @@
         </p:nvSpPr>
         <p:spPr>
           <a:xfrm>
-            <a:off x="8407400" y="2781300"/>
+            <a:off x="6210300" y="2705100"/>
             <a:ext cx="2540000" cy="381000"/>
           </a:xfrm>
           <a:prstGeom prst="rect">
@@ -1099,7 +1757,551 @@
                 <a:latin typeface="Alien Encounters" pitchFamily="0" charset="0"/>
                 <a:cs typeface="Alien Encounters" pitchFamily="0" charset="0"/>
               </a:rPr>
-              <a:t>Reference</a:t>
+              <a:t>A send E5 to B</a:t>
+            </a:r>
+          </a:p>
+        </p:txBody>
+      </p:sp>
+      <p:sp>
+        <p:nvSpPr>
+          <p:cNvPr id="7" name="Text 7"/>
+          <p:cNvSpPr txBox="1"/>
+          <p:nvPr/>
+        </p:nvSpPr>
+        <p:spPr>
+          <a:xfrm>
+            <a:off x="7912100" y="3390900"/>
+            <a:ext cx="2540000" cy="381000"/>
+          </a:xfrm>
+          <a:prstGeom prst="rect">
+            <a:avLst/>
+          </a:prstGeom>
+          <a:noFill/>
+        </p:spPr>
+        <p:txBody>
+          <a:bodyPr rtlCol="0" wrap="none" anchor="ctr"/>
+          <a:lstStyle/>
+          <a:p>
+            <a:pPr algn="l"/>
+            <a:r>
+              <a:rPr lang="en-US" smtClean="0" sz="2000">
+                <a:solidFill>
+                  <a:srgbClr val="000000"/>
+                </a:solidFill>
+                <a:latin typeface="Alien Encounters" pitchFamily="0" charset="0"/>
+                <a:cs typeface="Alien Encounters" pitchFamily="0" charset="0"/>
+              </a:rPr>
+              <a:t>Transaction 1</a:t>
+            </a:r>
+          </a:p>
+        </p:txBody>
+      </p:sp>
+      <p:sp>
+        <p:nvSpPr>
+          <p:cNvPr id="8" name="Text 8"/>
+          <p:cNvSpPr txBox="1"/>
+          <p:nvPr/>
+        </p:nvSpPr>
+        <p:spPr>
+          <a:xfrm>
+            <a:off x="292100" y="3670300"/>
+            <a:ext cx="2540000" cy="381000"/>
+          </a:xfrm>
+          <a:prstGeom prst="rect">
+            <a:avLst/>
+          </a:prstGeom>
+          <a:noFill/>
+        </p:spPr>
+        <p:txBody>
+          <a:bodyPr rtlCol="0" wrap="none" anchor="ctr"/>
+          <a:lstStyle/>
+          <a:p>
+            <a:pPr algn="l"/>
+            <a:r>
+              <a:rPr lang="en-US" smtClean="0" sz="2000">
+                <a:solidFill>
+                  <a:srgbClr val="000000"/>
+                </a:solidFill>
+                <a:latin typeface="Alien Encounters" pitchFamily="0" charset="0"/>
+                <a:cs typeface="Alien Encounters" pitchFamily="0" charset="0"/>
+              </a:rPr>
+              <a:t>Transaction 1</a:t>
+            </a:r>
+          </a:p>
+        </p:txBody>
+      </p:sp>
+      <p:sp>
+        <p:nvSpPr>
+          <p:cNvPr id="9" name="Text 9"/>
+          <p:cNvSpPr txBox="1"/>
+          <p:nvPr/>
+        </p:nvSpPr>
+        <p:spPr>
+          <a:xfrm>
+            <a:off x="7937500" y="3924300"/>
+            <a:ext cx="2540000" cy="381000"/>
+          </a:xfrm>
+          <a:prstGeom prst="rect">
+            <a:avLst/>
+          </a:prstGeom>
+          <a:noFill/>
+        </p:spPr>
+        <p:txBody>
+          <a:bodyPr rtlCol="0" wrap="none" anchor="ctr"/>
+          <a:lstStyle/>
+          <a:p>
+            <a:pPr algn="l"/>
+            <a:r>
+              <a:rPr lang="en-US" smtClean="0" sz="2000">
+                <a:solidFill>
+                  <a:srgbClr val="000000"/>
+                </a:solidFill>
+                <a:latin typeface="Alien Encounters" pitchFamily="0" charset="0"/>
+                <a:cs typeface="Alien Encounters" pitchFamily="0" charset="0"/>
+              </a:rPr>
+              <a:t>Transaction 2</a:t>
+            </a:r>
+          </a:p>
+        </p:txBody>
+      </p:sp>
+      <p:sp>
+        <p:nvSpPr>
+          <p:cNvPr id="10" name="Text 10"/>
+          <p:cNvSpPr txBox="1"/>
+          <p:nvPr/>
+        </p:nvSpPr>
+        <p:spPr>
+          <a:xfrm>
+            <a:off x="254000" y="4152900"/>
+            <a:ext cx="2540000" cy="381000"/>
+          </a:xfrm>
+          <a:prstGeom prst="rect">
+            <a:avLst/>
+          </a:prstGeom>
+          <a:noFill/>
+        </p:spPr>
+        <p:txBody>
+          <a:bodyPr rtlCol="0" wrap="none" anchor="ctr"/>
+          <a:lstStyle/>
+          <a:p>
+            <a:pPr algn="l"/>
+            <a:r>
+              <a:rPr lang="en-US" smtClean="0" sz="2000">
+                <a:solidFill>
+                  <a:srgbClr val="000000"/>
+                </a:solidFill>
+                <a:latin typeface="Alien Encounters" pitchFamily="0" charset="0"/>
+                <a:cs typeface="Alien Encounters" pitchFamily="0" charset="0"/>
+              </a:rPr>
+              <a:t>Transaction 2</a:t>
+            </a:r>
+          </a:p>
+        </p:txBody>
+      </p:sp>
+      <p:sp>
+        <p:nvSpPr>
+          <p:cNvPr id="11" name="Text 11"/>
+          <p:cNvSpPr txBox="1"/>
+          <p:nvPr/>
+        </p:nvSpPr>
+        <p:spPr>
+          <a:xfrm>
+            <a:off x="7912100" y="4457700"/>
+            <a:ext cx="2540000" cy="381000"/>
+          </a:xfrm>
+          <a:prstGeom prst="rect">
+            <a:avLst/>
+          </a:prstGeom>
+          <a:noFill/>
+        </p:spPr>
+        <p:txBody>
+          <a:bodyPr rtlCol="0" wrap="none" anchor="ctr"/>
+          <a:lstStyle/>
+          <a:p>
+            <a:pPr algn="l"/>
+            <a:r>
+              <a:rPr lang="en-US" smtClean="0" sz="2000">
+                <a:solidFill>
+                  <a:srgbClr val="000000"/>
+                </a:solidFill>
+                <a:latin typeface="Alien Encounters" pitchFamily="0" charset="0"/>
+                <a:cs typeface="Alien Encounters" pitchFamily="0" charset="0"/>
+              </a:rPr>
+              <a:t>Transaction 3</a:t>
+            </a:r>
+          </a:p>
+        </p:txBody>
+      </p:sp>
+      <p:sp>
+        <p:nvSpPr>
+          <p:cNvPr id="12" name="Text 12"/>
+          <p:cNvSpPr txBox="1"/>
+          <p:nvPr/>
+        </p:nvSpPr>
+        <p:spPr>
+          <a:xfrm>
+            <a:off x="266700" y="4737100"/>
+            <a:ext cx="2540000" cy="381000"/>
+          </a:xfrm>
+          <a:prstGeom prst="rect">
+            <a:avLst/>
+          </a:prstGeom>
+          <a:noFill/>
+        </p:spPr>
+        <p:txBody>
+          <a:bodyPr rtlCol="0" wrap="none" anchor="ctr"/>
+          <a:lstStyle/>
+          <a:p>
+            <a:pPr algn="l"/>
+            <a:r>
+              <a:rPr lang="en-US" smtClean="0" sz="2000">
+                <a:solidFill>
+                  <a:srgbClr val="000000"/>
+                </a:solidFill>
+                <a:latin typeface="Alien Encounters" pitchFamily="0" charset="0"/>
+                <a:cs typeface="Alien Encounters" pitchFamily="0" charset="0"/>
+              </a:rPr>
+              <a:t>Transaction 3</a:t>
+            </a:r>
+          </a:p>
+        </p:txBody>
+      </p:sp>
+      <p:sp>
+        <p:nvSpPr>
+          <p:cNvPr id="13" name="Text 13"/>
+          <p:cNvSpPr txBox="1"/>
+          <p:nvPr/>
+        </p:nvSpPr>
+        <p:spPr>
+          <a:xfrm>
+            <a:off x="7670800" y="5130800"/>
+            <a:ext cx="2540000" cy="381000"/>
+          </a:xfrm>
+          <a:prstGeom prst="rect">
+            <a:avLst/>
+          </a:prstGeom>
+          <a:noFill/>
+        </p:spPr>
+        <p:txBody>
+          <a:bodyPr rtlCol="0" wrap="none" anchor="ctr"/>
+          <a:lstStyle/>
+          <a:p>
+            <a:pPr algn="l"/>
+            <a:r>
+              <a:rPr lang="en-US" smtClean="0" sz="2000">
+                <a:solidFill>
+                  <a:srgbClr val="000000"/>
+                </a:solidFill>
+                <a:latin typeface="Alien Encounters" pitchFamily="0" charset="0"/>
+                <a:cs typeface="Alien Encounters" pitchFamily="0" charset="0"/>
+              </a:rPr>
+              <a:t>Ledger of Node B</a:t>
+            </a:r>
+          </a:p>
+        </p:txBody>
+      </p:sp>
+      <p:sp>
+        <p:nvSpPr>
+          <p:cNvPr id="14" name="Text 14"/>
+          <p:cNvSpPr txBox="1"/>
+          <p:nvPr/>
+        </p:nvSpPr>
+        <p:spPr>
+          <a:xfrm>
+            <a:off x="25400" y="5359400"/>
+            <a:ext cx="2540000" cy="381000"/>
+          </a:xfrm>
+          <a:prstGeom prst="rect">
+            <a:avLst/>
+          </a:prstGeom>
+          <a:noFill/>
+        </p:spPr>
+        <p:txBody>
+          <a:bodyPr rtlCol="0" wrap="none" anchor="ctr"/>
+          <a:lstStyle/>
+          <a:p>
+            <a:pPr algn="l"/>
+            <a:r>
+              <a:rPr lang="en-US" smtClean="0" sz="2000">
+                <a:solidFill>
+                  <a:srgbClr val="000000"/>
+                </a:solidFill>
+                <a:latin typeface="Alien Encounters" pitchFamily="0" charset="0"/>
+                <a:cs typeface="Alien Encounters" pitchFamily="0" charset="0"/>
+              </a:rPr>
+              <a:t>Ledger of Node D</a:t>
+            </a:r>
+          </a:p>
+        </p:txBody>
+      </p:sp>
+      <p:sp>
+        <p:nvSpPr>
+          <p:cNvPr id="15" name="Text 15"/>
+          <p:cNvSpPr txBox="1"/>
+          <p:nvPr/>
+        </p:nvSpPr>
+        <p:spPr>
+          <a:xfrm>
+            <a:off x="6134100" y="5702300"/>
+            <a:ext cx="2540000" cy="381000"/>
+          </a:xfrm>
+          <a:prstGeom prst="rect">
+            <a:avLst/>
+          </a:prstGeom>
+          <a:noFill/>
+        </p:spPr>
+        <p:txBody>
+          <a:bodyPr rtlCol="0" wrap="none" anchor="ctr"/>
+          <a:lstStyle/>
+          <a:p>
+            <a:pPr algn="l"/>
+            <a:r>
+              <a:rPr lang="en-US" smtClean="0" sz="2000">
+                <a:solidFill>
+                  <a:srgbClr val="000000"/>
+                </a:solidFill>
+                <a:latin typeface="Alien Encounters" pitchFamily="0" charset="0"/>
+                <a:cs typeface="Alien Encounters" pitchFamily="0" charset="0"/>
+              </a:rPr>
+              <a:t>Transaction 2</a:t>
+            </a:r>
+          </a:p>
+        </p:txBody>
+      </p:sp>
+      <p:sp>
+        <p:nvSpPr>
+          <p:cNvPr id="16" name="Text 16"/>
+          <p:cNvSpPr txBox="1"/>
+          <p:nvPr/>
+        </p:nvSpPr>
+        <p:spPr>
+          <a:xfrm>
+            <a:off x="1676400" y="5905500"/>
+            <a:ext cx="2540000" cy="381000"/>
+          </a:xfrm>
+          <a:prstGeom prst="rect">
+            <a:avLst/>
+          </a:prstGeom>
+          <a:noFill/>
+        </p:spPr>
+        <p:txBody>
+          <a:bodyPr rtlCol="0" wrap="none" anchor="ctr"/>
+          <a:lstStyle/>
+          <a:p>
+            <a:pPr algn="l"/>
+            <a:r>
+              <a:rPr lang="en-US" smtClean="0" sz="2000">
+                <a:solidFill>
+                  <a:srgbClr val="000000"/>
+                </a:solidFill>
+                <a:latin typeface="Alien Encounters" pitchFamily="0" charset="0"/>
+                <a:cs typeface="Alien Encounters" pitchFamily="0" charset="0"/>
+              </a:rPr>
+              <a:t>Transaction 3</a:t>
+            </a:r>
+          </a:p>
+        </p:txBody>
+      </p:sp>
+      <p:sp>
+        <p:nvSpPr>
+          <p:cNvPr id="17" name="Text 17"/>
+          <p:cNvSpPr txBox="1"/>
+          <p:nvPr/>
+        </p:nvSpPr>
+        <p:spPr>
+          <a:xfrm>
+            <a:off x="6159500" y="6032500"/>
+            <a:ext cx="2540000" cy="381000"/>
+          </a:xfrm>
+          <a:prstGeom prst="rect">
+            <a:avLst/>
+          </a:prstGeom>
+          <a:noFill/>
+        </p:spPr>
+        <p:txBody>
+          <a:bodyPr rtlCol="0" wrap="none" anchor="ctr"/>
+          <a:lstStyle/>
+          <a:p>
+            <a:pPr algn="l"/>
+            <a:r>
+              <a:rPr lang="en-US" smtClean="0" sz="2000">
+                <a:solidFill>
+                  <a:srgbClr val="000000"/>
+                </a:solidFill>
+                <a:latin typeface="Alien Encounters" pitchFamily="0" charset="0"/>
+                <a:cs typeface="Alien Encounters" pitchFamily="0" charset="0"/>
+              </a:rPr>
+              <a:t>B send E10to C</a:t>
+            </a:r>
+          </a:p>
+        </p:txBody>
+      </p:sp>
+      <p:sp>
+        <p:nvSpPr>
+          <p:cNvPr id="18" name="Text 18"/>
+          <p:cNvSpPr txBox="1"/>
+          <p:nvPr/>
+        </p:nvSpPr>
+        <p:spPr>
+          <a:xfrm>
+            <a:off x="1854200" y="6210300"/>
+            <a:ext cx="2540000" cy="381000"/>
+          </a:xfrm>
+          <a:prstGeom prst="rect">
+            <a:avLst/>
+          </a:prstGeom>
+          <a:noFill/>
+        </p:spPr>
+        <p:txBody>
+          <a:bodyPr rtlCol="0" wrap="none" anchor="ctr"/>
+          <a:lstStyle/>
+          <a:p>
+            <a:pPr algn="l"/>
+            <a:r>
+              <a:rPr lang="en-US" smtClean="0" sz="2000">
+                <a:solidFill>
+                  <a:srgbClr val="000000"/>
+                </a:solidFill>
+                <a:latin typeface="Alien Encounters" pitchFamily="0" charset="0"/>
+                <a:cs typeface="Alien Encounters" pitchFamily="0" charset="0"/>
+              </a:rPr>
+              <a:t>send E20 to D</a:t>
+            </a:r>
+          </a:p>
+        </p:txBody>
+      </p:sp>
+      <p:sp>
+        <p:nvSpPr>
+          <p:cNvPr id="19" name="Text 19"/>
+          <p:cNvSpPr txBox="1"/>
+          <p:nvPr/>
+        </p:nvSpPr>
+        <p:spPr>
+          <a:xfrm>
+            <a:off x="3898900" y="6921500"/>
+            <a:ext cx="2540000" cy="381000"/>
+          </a:xfrm>
+          <a:prstGeom prst="rect">
+            <a:avLst/>
+          </a:prstGeom>
+          <a:noFill/>
+        </p:spPr>
+        <p:txBody>
+          <a:bodyPr rtlCol="0" wrap="none" anchor="ctr"/>
+          <a:lstStyle/>
+          <a:p>
+            <a:pPr algn="l"/>
+            <a:r>
+              <a:rPr lang="en-US" smtClean="0" sz="2000">
+                <a:solidFill>
+                  <a:srgbClr val="000000"/>
+                </a:solidFill>
+                <a:latin typeface="Alien Encounters" pitchFamily="0" charset="0"/>
+                <a:cs typeface="Alien Encounters" pitchFamily="0" charset="0"/>
+              </a:rPr>
+              <a:t>Transaction 1</a:t>
+            </a:r>
+          </a:p>
+        </p:txBody>
+      </p:sp>
+      <p:sp>
+        <p:nvSpPr>
+          <p:cNvPr id="20" name="Text 20"/>
+          <p:cNvSpPr txBox="1"/>
+          <p:nvPr/>
+        </p:nvSpPr>
+        <p:spPr>
+          <a:xfrm>
+            <a:off x="3898900" y="7454900"/>
+            <a:ext cx="2540000" cy="381000"/>
+          </a:xfrm>
+          <a:prstGeom prst="rect">
+            <a:avLst/>
+          </a:prstGeom>
+          <a:noFill/>
+        </p:spPr>
+        <p:txBody>
+          <a:bodyPr rtlCol="0" wrap="none" anchor="ctr"/>
+          <a:lstStyle/>
+          <a:p>
+            <a:pPr algn="l"/>
+            <a:r>
+              <a:rPr lang="en-US" smtClean="0" sz="2000">
+                <a:solidFill>
+                  <a:srgbClr val="000000"/>
+                </a:solidFill>
+                <a:latin typeface="Alien Encounters" pitchFamily="0" charset="0"/>
+                <a:cs typeface="Alien Encounters" pitchFamily="0" charset="0"/>
+              </a:rPr>
+              <a:t>Transaction 2</a:t>
+            </a:r>
+          </a:p>
+        </p:txBody>
+      </p:sp>
+      <p:sp>
+        <p:nvSpPr>
+          <p:cNvPr id="21" name="Text 21"/>
+          <p:cNvSpPr txBox="1"/>
+          <p:nvPr/>
+        </p:nvSpPr>
+        <p:spPr>
+          <a:xfrm>
+            <a:off x="3886200" y="7975600"/>
+            <a:ext cx="2540000" cy="381000"/>
+          </a:xfrm>
+          <a:prstGeom prst="rect">
+            <a:avLst/>
+          </a:prstGeom>
+          <a:noFill/>
+        </p:spPr>
+        <p:txBody>
+          <a:bodyPr rtlCol="0" wrap="none" anchor="ctr"/>
+          <a:lstStyle/>
+          <a:p>
+            <a:pPr algn="l"/>
+            <a:r>
+              <a:rPr lang="en-US" smtClean="0" sz="2000">
+                <a:solidFill>
+                  <a:srgbClr val="000000"/>
+                </a:solidFill>
+                <a:latin typeface="Alien Encounters" pitchFamily="0" charset="0"/>
+                <a:cs typeface="Alien Encounters" pitchFamily="0" charset="0"/>
+              </a:rPr>
+              <a:t>Transaction 3</a:t>
+            </a:r>
+          </a:p>
+        </p:txBody>
+      </p:sp>
+      <p:sp>
+        <p:nvSpPr>
+          <p:cNvPr id="22" name="Text 22"/>
+          <p:cNvSpPr txBox="1"/>
+          <p:nvPr/>
+        </p:nvSpPr>
+        <p:spPr>
+          <a:xfrm>
+            <a:off x="3632200" y="8585200"/>
+            <a:ext cx="2540000" cy="381000"/>
+          </a:xfrm>
+          <a:prstGeom prst="rect">
+            <a:avLst/>
+          </a:prstGeom>
+          <a:noFill/>
+        </p:spPr>
+        <p:txBody>
+          <a:bodyPr rtlCol="0" wrap="none" anchor="ctr"/>
+          <a:lstStyle/>
+          <a:p>
+            <a:pPr algn="l"/>
+            <a:r>
+              <a:rPr lang="en-US" smtClean="0" sz="2000">
+                <a:solidFill>
+                  <a:srgbClr val="000000"/>
+                </a:solidFill>
+                <a:latin typeface="Alien Encounters" pitchFamily="0" charset="0"/>
+                <a:cs typeface="Alien Encounters" pitchFamily="0" charset="0"/>
+              </a:rPr>
+              <a:t>Ledger of Node C</a:t>
             </a:r>
           </a:p>
         </p:txBody>

</xml_diff>

<commit_message>
added demo directory for demo videos and images
</commit_message>
<xml_diff>
--- a/shapes-test.pptx
+++ b/shapes-test.pptx
@@ -5,7 +5,7 @@
     <p:sldMasterId id="2147483648" r:id="rId1"/>
   </p:sldMasterIdLst>
   <p:sldIdLst>
-    <p:sldId id="256" r:id="rId-86604989-9e9d-4db3-a1a2-d7803c939018"/>
+    <p:sldId id="256" r:id="rId-ab0ed3b5-2a59-4dc6-9dc5-0636503d013a"/>
   </p:sldIdLst>
   <p:sldSz cx="10515600" cy="9144000" type="screen4x3"/>
   <p:notesSz cx="6858000" cy="9144000"/>
@@ -734,8 +734,8 @@
         </p:nvSpPr>
         <p:spPr>
           <a:xfrm>
-            <a:off x="7848600" y="2679700"/>
-            <a:ext cx="2159000" cy="431800"/>
+            <a:off x="3644900" y="6769100"/>
+            <a:ext cx="1981200" cy="1612900"/>
           </a:xfrm>
           <a:prstGeom prst="rect">
             <a:avLst/>
@@ -763,8 +763,8 @@
         </p:nvSpPr>
         <p:spPr>
           <a:xfrm>
-            <a:off x="4165600" y="2679700"/>
-            <a:ext cx="2159000" cy="431800"/>
+            <a:off x="3657600" y="7835900"/>
+            <a:ext cx="1955800" cy="533400"/>
           </a:xfrm>
           <a:prstGeom prst="rect">
             <a:avLst/>
@@ -792,8 +792,8 @@
         </p:nvSpPr>
         <p:spPr>
           <a:xfrm>
-            <a:off x="469900" y="2679700"/>
-            <a:ext cx="2159000" cy="431800"/>
+            <a:off x="3657600" y="7315200"/>
+            <a:ext cx="1955800" cy="520700"/>
           </a:xfrm>
           <a:prstGeom prst="rect">
             <a:avLst/>
@@ -821,8 +821,8 @@
         </p:nvSpPr>
         <p:spPr>
           <a:xfrm>
-            <a:off x="7848600" y="584200"/>
-            <a:ext cx="2159000" cy="2095500"/>
+            <a:off x="3657600" y="6781800"/>
+            <a:ext cx="1955800" cy="520700"/>
           </a:xfrm>
           <a:prstGeom prst="rect">
             <a:avLst/>
@@ -850,8 +850,8 @@
         </p:nvSpPr>
         <p:spPr>
           <a:xfrm>
-            <a:off x="4165600" y="584200"/>
-            <a:ext cx="2159000" cy="2095500"/>
+            <a:off x="4318000" y="5969000"/>
+            <a:ext cx="774700" cy="584200"/>
           </a:xfrm>
           <a:prstGeom prst="rect">
             <a:avLst/>
@@ -879,8 +879,666 @@
         </p:nvSpPr>
         <p:spPr>
           <a:xfrm>
-            <a:off x="469900" y="584200"/>
-            <a:ext cx="2159000" cy="2095500"/>
+            <a:off x="4305300" y="5956300"/>
+            <a:ext cx="800100" cy="609600"/>
+          </a:xfrm>
+          <a:prstGeom prst="octagon">
+            <a:avLst>
+              <a:gd name="adj" fmla="val 29289"/>
+            </a:avLst>
+          </a:prstGeom>
+          <a:solidFill>
+            <a:srgbClr val="ffffff"/>
+          </a:solidFill>
+          <a:ln w="25400">
+            <a:solidFill>
+              <a:srgbClr val="000000"/>
+            </a:solidFill>
+          </a:ln>
+        </p:spPr>
+        <p:txBody>
+          <a:bodyPr rtlCol="0" wrap="square" anchor="ctr"/>
+          <a:lstStyle/>
+          <a:p/>
+        </p:txBody>
+      </p:sp>
+      <p:sp>
+        <p:nvSpPr>
+          <p:cNvPr id="7" name="Shape 7"/>
+          <p:cNvSpPr/>
+          <p:nvPr/>
+        </p:nvSpPr>
+        <p:spPr>
+          <a:xfrm>
+            <a:off x="2781300" y="4826000"/>
+            <a:ext cx="1308100" cy="1231900"/>
+          </a:xfrm>
+          <a:prstGeom prst="hexagon">
+            <a:avLst>
+              <a:gd name="adj" fmla="val 25000"/>
+              <a:gd name="vf" fmla="val 115470"/>
+            </a:avLst>
+          </a:prstGeom>
+          <a:solidFill>
+            <a:srgbClr val="ffffff"/>
+          </a:solidFill>
+          <a:ln w="25400">
+            <a:solidFill>
+              <a:srgbClr val="000000"/>
+            </a:solidFill>
+          </a:ln>
+        </p:spPr>
+        <p:txBody>
+          <a:bodyPr rtlCol="0" wrap="square" anchor="ctr"/>
+          <a:lstStyle/>
+          <a:p/>
+        </p:txBody>
+      </p:sp>
+      <p:sp>
+        <p:nvSpPr>
+          <p:cNvPr id="8" name="Shape 8"/>
+          <p:cNvSpPr/>
+          <p:nvPr/>
+        </p:nvSpPr>
+        <p:spPr>
+          <a:xfrm>
+            <a:off x="5334000" y="4711700"/>
+            <a:ext cx="1397000" cy="1409700"/>
+          </a:xfrm>
+          <a:prstGeom prst="hexagon">
+            <a:avLst>
+              <a:gd name="adj" fmla="val 25000"/>
+              <a:gd name="vf" fmla="val 115470"/>
+            </a:avLst>
+          </a:prstGeom>
+          <a:solidFill>
+            <a:srgbClr val="ffffff"/>
+          </a:solidFill>
+          <a:ln w="25400">
+            <a:solidFill>
+              <a:srgbClr val="000000"/>
+            </a:solidFill>
+          </a:ln>
+        </p:spPr>
+        <p:txBody>
+          <a:bodyPr rtlCol="0" wrap="square" anchor="ctr"/>
+          <a:lstStyle/>
+          <a:p/>
+        </p:txBody>
+      </p:sp>
+      <p:sp>
+        <p:nvSpPr>
+          <p:cNvPr id="9" name="Shape 9"/>
+          <p:cNvSpPr/>
+          <p:nvPr/>
+        </p:nvSpPr>
+        <p:spPr>
+          <a:xfrm>
+            <a:off x="2209800" y="3987800"/>
+            <a:ext cx="774700" cy="584200"/>
+          </a:xfrm>
+          <a:prstGeom prst="rect">
+            <a:avLst/>
+          </a:prstGeom>
+          <a:solidFill>
+            <a:srgbClr val="ffffff"/>
+          </a:solidFill>
+          <a:ln w="25400">
+            <a:solidFill>
+              <a:srgbClr val="000000"/>
+            </a:solidFill>
+          </a:ln>
+        </p:spPr>
+        <p:txBody>
+          <a:bodyPr rtlCol="0" wrap="square" anchor="ctr"/>
+          <a:lstStyle/>
+          <a:p/>
+        </p:txBody>
+      </p:sp>
+      <p:sp>
+        <p:nvSpPr>
+          <p:cNvPr id="10" name="Shape 10"/>
+          <p:cNvSpPr/>
+          <p:nvPr/>
+        </p:nvSpPr>
+        <p:spPr>
+          <a:xfrm>
+            <a:off x="2197100" y="3975100"/>
+            <a:ext cx="800100" cy="609600"/>
+          </a:xfrm>
+          <a:prstGeom prst="octagon">
+            <a:avLst>
+              <a:gd name="adj" fmla="val 29289"/>
+            </a:avLst>
+          </a:prstGeom>
+          <a:solidFill>
+            <a:srgbClr val="ffffff"/>
+          </a:solidFill>
+          <a:ln w="25400">
+            <a:solidFill>
+              <a:srgbClr val="000000"/>
+            </a:solidFill>
+          </a:ln>
+        </p:spPr>
+        <p:txBody>
+          <a:bodyPr rtlCol="0" wrap="square" anchor="ctr"/>
+          <a:lstStyle/>
+          <a:p/>
+        </p:txBody>
+      </p:sp>
+      <p:sp>
+        <p:nvSpPr>
+          <p:cNvPr id="11" name="Shape 11"/>
+          <p:cNvSpPr/>
+          <p:nvPr/>
+        </p:nvSpPr>
+        <p:spPr>
+          <a:xfrm>
+            <a:off x="6578600" y="3924300"/>
+            <a:ext cx="774700" cy="584200"/>
+          </a:xfrm>
+          <a:prstGeom prst="rect">
+            <a:avLst/>
+          </a:prstGeom>
+          <a:solidFill>
+            <a:srgbClr val="ffffff"/>
+          </a:solidFill>
+          <a:ln w="25400">
+            <a:solidFill>
+              <a:srgbClr val="000000"/>
+            </a:solidFill>
+          </a:ln>
+        </p:spPr>
+        <p:txBody>
+          <a:bodyPr rtlCol="0" wrap="square" anchor="ctr"/>
+          <a:lstStyle/>
+          <a:p/>
+        </p:txBody>
+      </p:sp>
+      <p:sp>
+        <p:nvSpPr>
+          <p:cNvPr id="12" name="Shape 12"/>
+          <p:cNvSpPr/>
+          <p:nvPr/>
+        </p:nvSpPr>
+        <p:spPr>
+          <a:xfrm>
+            <a:off x="6565900" y="3911600"/>
+            <a:ext cx="800100" cy="609600"/>
+          </a:xfrm>
+          <a:prstGeom prst="octagon">
+            <a:avLst>
+              <a:gd name="adj" fmla="val 29289"/>
+            </a:avLst>
+          </a:prstGeom>
+          <a:solidFill>
+            <a:srgbClr val="ffffff"/>
+          </a:solidFill>
+          <a:ln w="25400">
+            <a:solidFill>
+              <a:srgbClr val="000000"/>
+            </a:solidFill>
+          </a:ln>
+        </p:spPr>
+        <p:txBody>
+          <a:bodyPr rtlCol="0" wrap="square" anchor="ctr"/>
+          <a:lstStyle/>
+          <a:p/>
+        </p:txBody>
+      </p:sp>
+      <p:sp>
+        <p:nvSpPr>
+          <p:cNvPr id="13" name="Shape 13"/>
+          <p:cNvSpPr/>
+          <p:nvPr/>
+        </p:nvSpPr>
+        <p:spPr>
+          <a:xfrm>
+            <a:off x="50800" y="3505200"/>
+            <a:ext cx="1981200" cy="1612900"/>
+          </a:xfrm>
+          <a:prstGeom prst="rect">
+            <a:avLst/>
+          </a:prstGeom>
+          <a:solidFill>
+            <a:srgbClr val="ffffff"/>
+          </a:solidFill>
+          <a:ln w="25400">
+            <a:solidFill>
+              <a:srgbClr val="000000"/>
+            </a:solidFill>
+          </a:ln>
+        </p:spPr>
+        <p:txBody>
+          <a:bodyPr rtlCol="0" wrap="square" anchor="ctr"/>
+          <a:lstStyle/>
+          <a:p/>
+        </p:txBody>
+      </p:sp>
+      <p:sp>
+        <p:nvSpPr>
+          <p:cNvPr id="14" name="Shape 14"/>
+          <p:cNvSpPr/>
+          <p:nvPr/>
+        </p:nvSpPr>
+        <p:spPr>
+          <a:xfrm>
+            <a:off x="63500" y="4572000"/>
+            <a:ext cx="1955800" cy="533400"/>
+          </a:xfrm>
+          <a:prstGeom prst="rect">
+            <a:avLst/>
+          </a:prstGeom>
+          <a:solidFill>
+            <a:srgbClr val="ffffff"/>
+          </a:solidFill>
+          <a:ln w="25400">
+            <a:solidFill>
+              <a:srgbClr val="000000"/>
+            </a:solidFill>
+          </a:ln>
+        </p:spPr>
+        <p:txBody>
+          <a:bodyPr rtlCol="0" wrap="square" anchor="ctr"/>
+          <a:lstStyle/>
+          <a:p/>
+        </p:txBody>
+      </p:sp>
+      <p:sp>
+        <p:nvSpPr>
+          <p:cNvPr id="15" name="Shape 15"/>
+          <p:cNvSpPr/>
+          <p:nvPr/>
+        </p:nvSpPr>
+        <p:spPr>
+          <a:xfrm>
+            <a:off x="63500" y="4051300"/>
+            <a:ext cx="1955800" cy="520700"/>
+          </a:xfrm>
+          <a:prstGeom prst="rect">
+            <a:avLst/>
+          </a:prstGeom>
+          <a:solidFill>
+            <a:srgbClr val="ffffff"/>
+          </a:solidFill>
+          <a:ln w="25400">
+            <a:solidFill>
+              <a:srgbClr val="000000"/>
+            </a:solidFill>
+          </a:ln>
+        </p:spPr>
+        <p:txBody>
+          <a:bodyPr rtlCol="0" wrap="square" anchor="ctr"/>
+          <a:lstStyle/>
+          <a:p/>
+        </p:txBody>
+      </p:sp>
+      <p:sp>
+        <p:nvSpPr>
+          <p:cNvPr id="16" name="Shape 16"/>
+          <p:cNvSpPr/>
+          <p:nvPr/>
+        </p:nvSpPr>
+        <p:spPr>
+          <a:xfrm>
+            <a:off x="63500" y="3517900"/>
+            <a:ext cx="1955800" cy="520700"/>
+          </a:xfrm>
+          <a:prstGeom prst="rect">
+            <a:avLst/>
+          </a:prstGeom>
+          <a:solidFill>
+            <a:srgbClr val="ffffff"/>
+          </a:solidFill>
+          <a:ln w="25400">
+            <a:solidFill>
+              <a:srgbClr val="000000"/>
+            </a:solidFill>
+          </a:ln>
+        </p:spPr>
+        <p:txBody>
+          <a:bodyPr rtlCol="0" wrap="square" anchor="ctr"/>
+          <a:lstStyle/>
+          <a:p/>
+        </p:txBody>
+      </p:sp>
+      <p:sp>
+        <p:nvSpPr>
+          <p:cNvPr id="17" name="Shape 17"/>
+          <p:cNvSpPr/>
+          <p:nvPr/>
+        </p:nvSpPr>
+        <p:spPr>
+          <a:xfrm>
+            <a:off x="7632700" y="3225800"/>
+            <a:ext cx="1981200" cy="1612900"/>
+          </a:xfrm>
+          <a:prstGeom prst="rect">
+            <a:avLst/>
+          </a:prstGeom>
+          <a:solidFill>
+            <a:srgbClr val="ffffff"/>
+          </a:solidFill>
+          <a:ln w="25400">
+            <a:solidFill>
+              <a:srgbClr val="000000"/>
+            </a:solidFill>
+          </a:ln>
+        </p:spPr>
+        <p:txBody>
+          <a:bodyPr rtlCol="0" wrap="square" anchor="ctr"/>
+          <a:lstStyle/>
+          <a:p/>
+        </p:txBody>
+      </p:sp>
+      <p:sp>
+        <p:nvSpPr>
+          <p:cNvPr id="18" name="Shape 18"/>
+          <p:cNvSpPr/>
+          <p:nvPr/>
+        </p:nvSpPr>
+        <p:spPr>
+          <a:xfrm>
+            <a:off x="7645400" y="4292600"/>
+            <a:ext cx="1955800" cy="533400"/>
+          </a:xfrm>
+          <a:prstGeom prst="rect">
+            <a:avLst/>
+          </a:prstGeom>
+          <a:solidFill>
+            <a:srgbClr val="ffffff"/>
+          </a:solidFill>
+          <a:ln w="25400">
+            <a:solidFill>
+              <a:srgbClr val="000000"/>
+            </a:solidFill>
+          </a:ln>
+        </p:spPr>
+        <p:txBody>
+          <a:bodyPr rtlCol="0" wrap="square" anchor="ctr"/>
+          <a:lstStyle/>
+          <a:p/>
+        </p:txBody>
+      </p:sp>
+      <p:sp>
+        <p:nvSpPr>
+          <p:cNvPr id="19" name="Shape 19"/>
+          <p:cNvSpPr/>
+          <p:nvPr/>
+        </p:nvSpPr>
+        <p:spPr>
+          <a:xfrm>
+            <a:off x="7645400" y="3771900"/>
+            <a:ext cx="1955800" cy="520700"/>
+          </a:xfrm>
+          <a:prstGeom prst="rect">
+            <a:avLst/>
+          </a:prstGeom>
+          <a:solidFill>
+            <a:srgbClr val="ffffff"/>
+          </a:solidFill>
+          <a:ln w="25400">
+            <a:solidFill>
+              <a:srgbClr val="000000"/>
+            </a:solidFill>
+          </a:ln>
+        </p:spPr>
+        <p:txBody>
+          <a:bodyPr rtlCol="0" wrap="square" anchor="ctr"/>
+          <a:lstStyle/>
+          <a:p/>
+        </p:txBody>
+      </p:sp>
+      <p:sp>
+        <p:nvSpPr>
+          <p:cNvPr id="20" name="Shape 20"/>
+          <p:cNvSpPr/>
+          <p:nvPr/>
+        </p:nvSpPr>
+        <p:spPr>
+          <a:xfrm>
+            <a:off x="7645400" y="3238500"/>
+            <a:ext cx="1955800" cy="520700"/>
+          </a:xfrm>
+          <a:prstGeom prst="rect">
+            <a:avLst/>
+          </a:prstGeom>
+          <a:solidFill>
+            <a:srgbClr val="ffffff"/>
+          </a:solidFill>
+          <a:ln w="25400">
+            <a:solidFill>
+              <a:srgbClr val="000000"/>
+            </a:solidFill>
+          </a:ln>
+        </p:spPr>
+        <p:txBody>
+          <a:bodyPr rtlCol="0" wrap="square" anchor="ctr"/>
+          <a:lstStyle/>
+          <a:p/>
+        </p:txBody>
+      </p:sp>
+      <p:sp>
+        <p:nvSpPr>
+          <p:cNvPr id="21" name="Shape 21"/>
+          <p:cNvSpPr/>
+          <p:nvPr/>
+        </p:nvSpPr>
+        <p:spPr>
+          <a:xfrm>
+            <a:off x="2832100" y="2667000"/>
+            <a:ext cx="1181100" cy="1193800"/>
+          </a:xfrm>
+          <a:prstGeom prst="hexagon">
+            <a:avLst>
+              <a:gd name="adj" fmla="val 25000"/>
+              <a:gd name="vf" fmla="val 115470"/>
+            </a:avLst>
+          </a:prstGeom>
+          <a:solidFill>
+            <a:srgbClr val="ffffff"/>
+          </a:solidFill>
+          <a:ln w="25400">
+            <a:solidFill>
+              <a:srgbClr val="000000"/>
+            </a:solidFill>
+          </a:ln>
+        </p:spPr>
+        <p:txBody>
+          <a:bodyPr rtlCol="0" wrap="square" anchor="ctr"/>
+          <a:lstStyle/>
+          <a:p/>
+        </p:txBody>
+      </p:sp>
+      <p:sp>
+        <p:nvSpPr>
+          <p:cNvPr id="22" name="Shape 22"/>
+          <p:cNvSpPr/>
+          <p:nvPr/>
+        </p:nvSpPr>
+        <p:spPr>
+          <a:xfrm>
+            <a:off x="5245100" y="2552700"/>
+            <a:ext cx="1460500" cy="1244600"/>
+          </a:xfrm>
+          <a:prstGeom prst="hexagon">
+            <a:avLst>
+              <a:gd name="adj" fmla="val 25000"/>
+              <a:gd name="vf" fmla="val 115470"/>
+            </a:avLst>
+          </a:prstGeom>
+          <a:solidFill>
+            <a:srgbClr val="ffffff"/>
+          </a:solidFill>
+          <a:ln w="25400">
+            <a:solidFill>
+              <a:srgbClr val="000000"/>
+            </a:solidFill>
+          </a:ln>
+        </p:spPr>
+        <p:txBody>
+          <a:bodyPr rtlCol="0" wrap="square" anchor="ctr"/>
+          <a:lstStyle/>
+          <a:p/>
+        </p:txBody>
+      </p:sp>
+      <p:sp>
+        <p:nvSpPr>
+          <p:cNvPr id="23" name="Shape 23"/>
+          <p:cNvSpPr/>
+          <p:nvPr/>
+        </p:nvSpPr>
+        <p:spPr>
+          <a:xfrm>
+            <a:off x="4330700" y="2133600"/>
+            <a:ext cx="774700" cy="584200"/>
+          </a:xfrm>
+          <a:prstGeom prst="rect">
+            <a:avLst/>
+          </a:prstGeom>
+          <a:solidFill>
+            <a:srgbClr val="ffffff"/>
+          </a:solidFill>
+          <a:ln w="25400">
+            <a:solidFill>
+              <a:srgbClr val="000000"/>
+            </a:solidFill>
+          </a:ln>
+        </p:spPr>
+        <p:txBody>
+          <a:bodyPr rtlCol="0" wrap="square" anchor="ctr"/>
+          <a:lstStyle/>
+          <a:p/>
+        </p:txBody>
+      </p:sp>
+      <p:sp>
+        <p:nvSpPr>
+          <p:cNvPr id="24" name="Shape 24"/>
+          <p:cNvSpPr/>
+          <p:nvPr/>
+        </p:nvSpPr>
+        <p:spPr>
+          <a:xfrm>
+            <a:off x="4318000" y="2120900"/>
+            <a:ext cx="800100" cy="609600"/>
+          </a:xfrm>
+          <a:prstGeom prst="octagon">
+            <a:avLst>
+              <a:gd name="adj" fmla="val 29289"/>
+            </a:avLst>
+          </a:prstGeom>
+          <a:solidFill>
+            <a:srgbClr val="ffffff"/>
+          </a:solidFill>
+          <a:ln w="25400">
+            <a:solidFill>
+              <a:srgbClr val="000000"/>
+            </a:solidFill>
+          </a:ln>
+        </p:spPr>
+        <p:txBody>
+          <a:bodyPr rtlCol="0" wrap="square" anchor="ctr"/>
+          <a:lstStyle/>
+          <a:p/>
+        </p:txBody>
+      </p:sp>
+      <p:sp>
+        <p:nvSpPr>
+          <p:cNvPr id="25" name="Shape 25"/>
+          <p:cNvSpPr/>
+          <p:nvPr/>
+        </p:nvSpPr>
+        <p:spPr>
+          <a:xfrm>
+            <a:off x="3873500" y="368300"/>
+            <a:ext cx="1981200" cy="1612900"/>
+          </a:xfrm>
+          <a:prstGeom prst="rect">
+            <a:avLst/>
+          </a:prstGeom>
+          <a:solidFill>
+            <a:srgbClr val="ffffff"/>
+          </a:solidFill>
+          <a:ln w="25400">
+            <a:solidFill>
+              <a:srgbClr val="000000"/>
+            </a:solidFill>
+          </a:ln>
+        </p:spPr>
+        <p:txBody>
+          <a:bodyPr rtlCol="0" wrap="square" anchor="ctr"/>
+          <a:lstStyle/>
+          <a:p/>
+        </p:txBody>
+      </p:sp>
+      <p:sp>
+        <p:nvSpPr>
+          <p:cNvPr id="26" name="Shape 26"/>
+          <p:cNvSpPr/>
+          <p:nvPr/>
+        </p:nvSpPr>
+        <p:spPr>
+          <a:xfrm>
+            <a:off x="3886200" y="1435100"/>
+            <a:ext cx="1955800" cy="533400"/>
+          </a:xfrm>
+          <a:prstGeom prst="rect">
+            <a:avLst/>
+          </a:prstGeom>
+          <a:solidFill>
+            <a:srgbClr val="ffffff"/>
+          </a:solidFill>
+          <a:ln w="25400">
+            <a:solidFill>
+              <a:srgbClr val="000000"/>
+            </a:solidFill>
+          </a:ln>
+        </p:spPr>
+        <p:txBody>
+          <a:bodyPr rtlCol="0" wrap="square" anchor="ctr"/>
+          <a:lstStyle/>
+          <a:p/>
+        </p:txBody>
+      </p:sp>
+      <p:sp>
+        <p:nvSpPr>
+          <p:cNvPr id="27" name="Shape 27"/>
+          <p:cNvSpPr/>
+          <p:nvPr/>
+        </p:nvSpPr>
+        <p:spPr>
+          <a:xfrm>
+            <a:off x="3886200" y="914400"/>
+            <a:ext cx="1955800" cy="520700"/>
+          </a:xfrm>
+          <a:prstGeom prst="rect">
+            <a:avLst/>
+          </a:prstGeom>
+          <a:solidFill>
+            <a:srgbClr val="ffffff"/>
+          </a:solidFill>
+          <a:ln w="25400">
+            <a:solidFill>
+              <a:srgbClr val="000000"/>
+            </a:solidFill>
+          </a:ln>
+        </p:spPr>
+        <p:txBody>
+          <a:bodyPr rtlCol="0" wrap="square" anchor="ctr"/>
+          <a:lstStyle/>
+          <a:p/>
+        </p:txBody>
+      </p:sp>
+      <p:sp>
+        <p:nvSpPr>
+          <p:cNvPr id="28" name="Shape 28"/>
+          <p:cNvSpPr/>
+          <p:nvPr/>
+        </p:nvSpPr>
+        <p:spPr>
+          <a:xfrm>
+            <a:off x="3886200" y="381000"/>
+            <a:ext cx="1955800" cy="520700"/>
           </a:xfrm>
           <a:prstGeom prst="rect">
             <a:avLst/>
@@ -908,7 +1566,7 @@
         </p:nvSpPr>
         <p:spPr>
           <a:xfrm>
-            <a:off x="1282700" y="1485900"/>
+            <a:off x="3937000" y="0"/>
             <a:ext cx="2540000" cy="381000"/>
           </a:xfrm>
           <a:prstGeom prst="rect">
@@ -929,7 +1587,7 @@
                 <a:latin typeface="Alien Encounters" pitchFamily="0" charset="0"/>
                 <a:cs typeface="Alien Encounters" pitchFamily="0" charset="0"/>
               </a:rPr>
-              <a:t>Data</a:t>
+              <a:t>Ledger of Node A</a:t>
             </a:r>
           </a:p>
         </p:txBody>
@@ -942,7 +1600,7 @@
         </p:nvSpPr>
         <p:spPr>
           <a:xfrm>
-            <a:off x="4991100" y="1485900"/>
+            <a:off x="4140200" y="533400"/>
             <a:ext cx="2540000" cy="381000"/>
           </a:xfrm>
           <a:prstGeom prst="rect">
@@ -963,7 +1621,7 @@
                 <a:latin typeface="Alien Encounters" pitchFamily="0" charset="0"/>
                 <a:cs typeface="Alien Encounters" pitchFamily="0" charset="0"/>
               </a:rPr>
-              <a:t>Data</a:t>
+              <a:t>Transaction 1</a:t>
             </a:r>
           </a:p>
         </p:txBody>
@@ -976,7 +1634,7 @@
         </p:nvSpPr>
         <p:spPr>
           <a:xfrm>
-            <a:off x="8674100" y="1485900"/>
+            <a:off x="4127500" y="1054100"/>
             <a:ext cx="2540000" cy="381000"/>
           </a:xfrm>
           <a:prstGeom prst="rect">
@@ -997,7 +1655,7 @@
                 <a:latin typeface="Alien Encounters" pitchFamily="0" charset="0"/>
                 <a:cs typeface="Alien Encounters" pitchFamily="0" charset="0"/>
               </a:rPr>
-              <a:t>Data</a:t>
+              <a:t>Transaction 2</a:t>
             </a:r>
           </a:p>
         </p:txBody>
@@ -1010,7 +1668,7 @@
         </p:nvSpPr>
         <p:spPr>
           <a:xfrm>
-            <a:off x="1003300" y="2781300"/>
+            <a:off x="4127500" y="1562100"/>
             <a:ext cx="2540000" cy="381000"/>
           </a:xfrm>
           <a:prstGeom prst="rect">
@@ -1031,7 +1689,7 @@
                 <a:latin typeface="Alien Encounters" pitchFamily="0" charset="0"/>
                 <a:cs typeface="Alien Encounters" pitchFamily="0" charset="0"/>
               </a:rPr>
-              <a:t>Reference</a:t>
+              <a:t>Transaction 3</a:t>
             </a:r>
           </a:p>
         </p:txBody>
@@ -1044,7 +1702,7 @@
         </p:nvSpPr>
         <p:spPr>
           <a:xfrm>
-            <a:off x="4673600" y="2743200"/>
+            <a:off x="6184900" y="2374900"/>
             <a:ext cx="2540000" cy="381000"/>
           </a:xfrm>
           <a:prstGeom prst="rect">
@@ -1065,7 +1723,7 @@
                 <a:latin typeface="Alien Encounters" pitchFamily="0" charset="0"/>
                 <a:cs typeface="Alien Encounters" pitchFamily="0" charset="0"/>
               </a:rPr>
-              <a:t>Reference</a:t>
+              <a:t>Transaction 1</a:t>
             </a:r>
           </a:p>
         </p:txBody>
@@ -1078,7 +1736,7 @@
         </p:nvSpPr>
         <p:spPr>
           <a:xfrm>
-            <a:off x="8407400" y="2781300"/>
+            <a:off x="6210300" y="2705100"/>
             <a:ext cx="2540000" cy="381000"/>
           </a:xfrm>
           <a:prstGeom prst="rect">
@@ -1099,7 +1757,551 @@
                 <a:latin typeface="Alien Encounters" pitchFamily="0" charset="0"/>
                 <a:cs typeface="Alien Encounters" pitchFamily="0" charset="0"/>
               </a:rPr>
-              <a:t>Reference</a:t>
+              <a:t>A send E5 to B</a:t>
+            </a:r>
+          </a:p>
+        </p:txBody>
+      </p:sp>
+      <p:sp>
+        <p:nvSpPr>
+          <p:cNvPr id="7" name="Text 7"/>
+          <p:cNvSpPr txBox="1"/>
+          <p:nvPr/>
+        </p:nvSpPr>
+        <p:spPr>
+          <a:xfrm>
+            <a:off x="7912100" y="3390900"/>
+            <a:ext cx="2540000" cy="381000"/>
+          </a:xfrm>
+          <a:prstGeom prst="rect">
+            <a:avLst/>
+          </a:prstGeom>
+          <a:noFill/>
+        </p:spPr>
+        <p:txBody>
+          <a:bodyPr rtlCol="0" wrap="none" anchor="ctr"/>
+          <a:lstStyle/>
+          <a:p>
+            <a:pPr algn="l"/>
+            <a:r>
+              <a:rPr lang="en-US" smtClean="0" sz="2000">
+                <a:solidFill>
+                  <a:srgbClr val="000000"/>
+                </a:solidFill>
+                <a:latin typeface="Alien Encounters" pitchFamily="0" charset="0"/>
+                <a:cs typeface="Alien Encounters" pitchFamily="0" charset="0"/>
+              </a:rPr>
+              <a:t>Transaction 1</a:t>
+            </a:r>
+          </a:p>
+        </p:txBody>
+      </p:sp>
+      <p:sp>
+        <p:nvSpPr>
+          <p:cNvPr id="8" name="Text 8"/>
+          <p:cNvSpPr txBox="1"/>
+          <p:nvPr/>
+        </p:nvSpPr>
+        <p:spPr>
+          <a:xfrm>
+            <a:off x="292100" y="3670300"/>
+            <a:ext cx="2540000" cy="381000"/>
+          </a:xfrm>
+          <a:prstGeom prst="rect">
+            <a:avLst/>
+          </a:prstGeom>
+          <a:noFill/>
+        </p:spPr>
+        <p:txBody>
+          <a:bodyPr rtlCol="0" wrap="none" anchor="ctr"/>
+          <a:lstStyle/>
+          <a:p>
+            <a:pPr algn="l"/>
+            <a:r>
+              <a:rPr lang="en-US" smtClean="0" sz="2000">
+                <a:solidFill>
+                  <a:srgbClr val="000000"/>
+                </a:solidFill>
+                <a:latin typeface="Alien Encounters" pitchFamily="0" charset="0"/>
+                <a:cs typeface="Alien Encounters" pitchFamily="0" charset="0"/>
+              </a:rPr>
+              <a:t>Transaction 1</a:t>
+            </a:r>
+          </a:p>
+        </p:txBody>
+      </p:sp>
+      <p:sp>
+        <p:nvSpPr>
+          <p:cNvPr id="9" name="Text 9"/>
+          <p:cNvSpPr txBox="1"/>
+          <p:nvPr/>
+        </p:nvSpPr>
+        <p:spPr>
+          <a:xfrm>
+            <a:off x="7937500" y="3924300"/>
+            <a:ext cx="2540000" cy="381000"/>
+          </a:xfrm>
+          <a:prstGeom prst="rect">
+            <a:avLst/>
+          </a:prstGeom>
+          <a:noFill/>
+        </p:spPr>
+        <p:txBody>
+          <a:bodyPr rtlCol="0" wrap="none" anchor="ctr"/>
+          <a:lstStyle/>
+          <a:p>
+            <a:pPr algn="l"/>
+            <a:r>
+              <a:rPr lang="en-US" smtClean="0" sz="2000">
+                <a:solidFill>
+                  <a:srgbClr val="000000"/>
+                </a:solidFill>
+                <a:latin typeface="Alien Encounters" pitchFamily="0" charset="0"/>
+                <a:cs typeface="Alien Encounters" pitchFamily="0" charset="0"/>
+              </a:rPr>
+              <a:t>Transaction 2</a:t>
+            </a:r>
+          </a:p>
+        </p:txBody>
+      </p:sp>
+      <p:sp>
+        <p:nvSpPr>
+          <p:cNvPr id="10" name="Text 10"/>
+          <p:cNvSpPr txBox="1"/>
+          <p:nvPr/>
+        </p:nvSpPr>
+        <p:spPr>
+          <a:xfrm>
+            <a:off x="254000" y="4152900"/>
+            <a:ext cx="2540000" cy="381000"/>
+          </a:xfrm>
+          <a:prstGeom prst="rect">
+            <a:avLst/>
+          </a:prstGeom>
+          <a:noFill/>
+        </p:spPr>
+        <p:txBody>
+          <a:bodyPr rtlCol="0" wrap="none" anchor="ctr"/>
+          <a:lstStyle/>
+          <a:p>
+            <a:pPr algn="l"/>
+            <a:r>
+              <a:rPr lang="en-US" smtClean="0" sz="2000">
+                <a:solidFill>
+                  <a:srgbClr val="000000"/>
+                </a:solidFill>
+                <a:latin typeface="Alien Encounters" pitchFamily="0" charset="0"/>
+                <a:cs typeface="Alien Encounters" pitchFamily="0" charset="0"/>
+              </a:rPr>
+              <a:t>Transaction 2</a:t>
+            </a:r>
+          </a:p>
+        </p:txBody>
+      </p:sp>
+      <p:sp>
+        <p:nvSpPr>
+          <p:cNvPr id="11" name="Text 11"/>
+          <p:cNvSpPr txBox="1"/>
+          <p:nvPr/>
+        </p:nvSpPr>
+        <p:spPr>
+          <a:xfrm>
+            <a:off x="7912100" y="4457700"/>
+            <a:ext cx="2540000" cy="381000"/>
+          </a:xfrm>
+          <a:prstGeom prst="rect">
+            <a:avLst/>
+          </a:prstGeom>
+          <a:noFill/>
+        </p:spPr>
+        <p:txBody>
+          <a:bodyPr rtlCol="0" wrap="none" anchor="ctr"/>
+          <a:lstStyle/>
+          <a:p>
+            <a:pPr algn="l"/>
+            <a:r>
+              <a:rPr lang="en-US" smtClean="0" sz="2000">
+                <a:solidFill>
+                  <a:srgbClr val="000000"/>
+                </a:solidFill>
+                <a:latin typeface="Alien Encounters" pitchFamily="0" charset="0"/>
+                <a:cs typeface="Alien Encounters" pitchFamily="0" charset="0"/>
+              </a:rPr>
+              <a:t>Transaction 3</a:t>
+            </a:r>
+          </a:p>
+        </p:txBody>
+      </p:sp>
+      <p:sp>
+        <p:nvSpPr>
+          <p:cNvPr id="12" name="Text 12"/>
+          <p:cNvSpPr txBox="1"/>
+          <p:nvPr/>
+        </p:nvSpPr>
+        <p:spPr>
+          <a:xfrm>
+            <a:off x="266700" y="4737100"/>
+            <a:ext cx="2540000" cy="381000"/>
+          </a:xfrm>
+          <a:prstGeom prst="rect">
+            <a:avLst/>
+          </a:prstGeom>
+          <a:noFill/>
+        </p:spPr>
+        <p:txBody>
+          <a:bodyPr rtlCol="0" wrap="none" anchor="ctr"/>
+          <a:lstStyle/>
+          <a:p>
+            <a:pPr algn="l"/>
+            <a:r>
+              <a:rPr lang="en-US" smtClean="0" sz="2000">
+                <a:solidFill>
+                  <a:srgbClr val="000000"/>
+                </a:solidFill>
+                <a:latin typeface="Alien Encounters" pitchFamily="0" charset="0"/>
+                <a:cs typeface="Alien Encounters" pitchFamily="0" charset="0"/>
+              </a:rPr>
+              <a:t>Transaction 3</a:t>
+            </a:r>
+          </a:p>
+        </p:txBody>
+      </p:sp>
+      <p:sp>
+        <p:nvSpPr>
+          <p:cNvPr id="13" name="Text 13"/>
+          <p:cNvSpPr txBox="1"/>
+          <p:nvPr/>
+        </p:nvSpPr>
+        <p:spPr>
+          <a:xfrm>
+            <a:off x="7670800" y="5130800"/>
+            <a:ext cx="2540000" cy="381000"/>
+          </a:xfrm>
+          <a:prstGeom prst="rect">
+            <a:avLst/>
+          </a:prstGeom>
+          <a:noFill/>
+        </p:spPr>
+        <p:txBody>
+          <a:bodyPr rtlCol="0" wrap="none" anchor="ctr"/>
+          <a:lstStyle/>
+          <a:p>
+            <a:pPr algn="l"/>
+            <a:r>
+              <a:rPr lang="en-US" smtClean="0" sz="2000">
+                <a:solidFill>
+                  <a:srgbClr val="000000"/>
+                </a:solidFill>
+                <a:latin typeface="Alien Encounters" pitchFamily="0" charset="0"/>
+                <a:cs typeface="Alien Encounters" pitchFamily="0" charset="0"/>
+              </a:rPr>
+              <a:t>Ledger of Node B</a:t>
+            </a:r>
+          </a:p>
+        </p:txBody>
+      </p:sp>
+      <p:sp>
+        <p:nvSpPr>
+          <p:cNvPr id="14" name="Text 14"/>
+          <p:cNvSpPr txBox="1"/>
+          <p:nvPr/>
+        </p:nvSpPr>
+        <p:spPr>
+          <a:xfrm>
+            <a:off x="25400" y="5359400"/>
+            <a:ext cx="2540000" cy="381000"/>
+          </a:xfrm>
+          <a:prstGeom prst="rect">
+            <a:avLst/>
+          </a:prstGeom>
+          <a:noFill/>
+        </p:spPr>
+        <p:txBody>
+          <a:bodyPr rtlCol="0" wrap="none" anchor="ctr"/>
+          <a:lstStyle/>
+          <a:p>
+            <a:pPr algn="l"/>
+            <a:r>
+              <a:rPr lang="en-US" smtClean="0" sz="2000">
+                <a:solidFill>
+                  <a:srgbClr val="000000"/>
+                </a:solidFill>
+                <a:latin typeface="Alien Encounters" pitchFamily="0" charset="0"/>
+                <a:cs typeface="Alien Encounters" pitchFamily="0" charset="0"/>
+              </a:rPr>
+              <a:t>Ledger of Node D</a:t>
+            </a:r>
+          </a:p>
+        </p:txBody>
+      </p:sp>
+      <p:sp>
+        <p:nvSpPr>
+          <p:cNvPr id="15" name="Text 15"/>
+          <p:cNvSpPr txBox="1"/>
+          <p:nvPr/>
+        </p:nvSpPr>
+        <p:spPr>
+          <a:xfrm>
+            <a:off x="6134100" y="5702300"/>
+            <a:ext cx="2540000" cy="381000"/>
+          </a:xfrm>
+          <a:prstGeom prst="rect">
+            <a:avLst/>
+          </a:prstGeom>
+          <a:noFill/>
+        </p:spPr>
+        <p:txBody>
+          <a:bodyPr rtlCol="0" wrap="none" anchor="ctr"/>
+          <a:lstStyle/>
+          <a:p>
+            <a:pPr algn="l"/>
+            <a:r>
+              <a:rPr lang="en-US" smtClean="0" sz="2000">
+                <a:solidFill>
+                  <a:srgbClr val="000000"/>
+                </a:solidFill>
+                <a:latin typeface="Alien Encounters" pitchFamily="0" charset="0"/>
+                <a:cs typeface="Alien Encounters" pitchFamily="0" charset="0"/>
+              </a:rPr>
+              <a:t>Transaction 2</a:t>
+            </a:r>
+          </a:p>
+        </p:txBody>
+      </p:sp>
+      <p:sp>
+        <p:nvSpPr>
+          <p:cNvPr id="16" name="Text 16"/>
+          <p:cNvSpPr txBox="1"/>
+          <p:nvPr/>
+        </p:nvSpPr>
+        <p:spPr>
+          <a:xfrm>
+            <a:off x="1676400" y="5905500"/>
+            <a:ext cx="2540000" cy="381000"/>
+          </a:xfrm>
+          <a:prstGeom prst="rect">
+            <a:avLst/>
+          </a:prstGeom>
+          <a:noFill/>
+        </p:spPr>
+        <p:txBody>
+          <a:bodyPr rtlCol="0" wrap="none" anchor="ctr"/>
+          <a:lstStyle/>
+          <a:p>
+            <a:pPr algn="l"/>
+            <a:r>
+              <a:rPr lang="en-US" smtClean="0" sz="2000">
+                <a:solidFill>
+                  <a:srgbClr val="000000"/>
+                </a:solidFill>
+                <a:latin typeface="Alien Encounters" pitchFamily="0" charset="0"/>
+                <a:cs typeface="Alien Encounters" pitchFamily="0" charset="0"/>
+              </a:rPr>
+              <a:t>Transaction 3</a:t>
+            </a:r>
+          </a:p>
+        </p:txBody>
+      </p:sp>
+      <p:sp>
+        <p:nvSpPr>
+          <p:cNvPr id="17" name="Text 17"/>
+          <p:cNvSpPr txBox="1"/>
+          <p:nvPr/>
+        </p:nvSpPr>
+        <p:spPr>
+          <a:xfrm>
+            <a:off x="6159500" y="6032500"/>
+            <a:ext cx="2540000" cy="381000"/>
+          </a:xfrm>
+          <a:prstGeom prst="rect">
+            <a:avLst/>
+          </a:prstGeom>
+          <a:noFill/>
+        </p:spPr>
+        <p:txBody>
+          <a:bodyPr rtlCol="0" wrap="none" anchor="ctr"/>
+          <a:lstStyle/>
+          <a:p>
+            <a:pPr algn="l"/>
+            <a:r>
+              <a:rPr lang="en-US" smtClean="0" sz="2000">
+                <a:solidFill>
+                  <a:srgbClr val="000000"/>
+                </a:solidFill>
+                <a:latin typeface="Alien Encounters" pitchFamily="0" charset="0"/>
+                <a:cs typeface="Alien Encounters" pitchFamily="0" charset="0"/>
+              </a:rPr>
+              <a:t>B send E10to C</a:t>
+            </a:r>
+          </a:p>
+        </p:txBody>
+      </p:sp>
+      <p:sp>
+        <p:nvSpPr>
+          <p:cNvPr id="18" name="Text 18"/>
+          <p:cNvSpPr txBox="1"/>
+          <p:nvPr/>
+        </p:nvSpPr>
+        <p:spPr>
+          <a:xfrm>
+            <a:off x="1854200" y="6210300"/>
+            <a:ext cx="2540000" cy="381000"/>
+          </a:xfrm>
+          <a:prstGeom prst="rect">
+            <a:avLst/>
+          </a:prstGeom>
+          <a:noFill/>
+        </p:spPr>
+        <p:txBody>
+          <a:bodyPr rtlCol="0" wrap="none" anchor="ctr"/>
+          <a:lstStyle/>
+          <a:p>
+            <a:pPr algn="l"/>
+            <a:r>
+              <a:rPr lang="en-US" smtClean="0" sz="2000">
+                <a:solidFill>
+                  <a:srgbClr val="000000"/>
+                </a:solidFill>
+                <a:latin typeface="Alien Encounters" pitchFamily="0" charset="0"/>
+                <a:cs typeface="Alien Encounters" pitchFamily="0" charset="0"/>
+              </a:rPr>
+              <a:t>send E20 to D</a:t>
+            </a:r>
+          </a:p>
+        </p:txBody>
+      </p:sp>
+      <p:sp>
+        <p:nvSpPr>
+          <p:cNvPr id="19" name="Text 19"/>
+          <p:cNvSpPr txBox="1"/>
+          <p:nvPr/>
+        </p:nvSpPr>
+        <p:spPr>
+          <a:xfrm>
+            <a:off x="3898900" y="6921500"/>
+            <a:ext cx="2540000" cy="381000"/>
+          </a:xfrm>
+          <a:prstGeom prst="rect">
+            <a:avLst/>
+          </a:prstGeom>
+          <a:noFill/>
+        </p:spPr>
+        <p:txBody>
+          <a:bodyPr rtlCol="0" wrap="none" anchor="ctr"/>
+          <a:lstStyle/>
+          <a:p>
+            <a:pPr algn="l"/>
+            <a:r>
+              <a:rPr lang="en-US" smtClean="0" sz="2000">
+                <a:solidFill>
+                  <a:srgbClr val="000000"/>
+                </a:solidFill>
+                <a:latin typeface="Alien Encounters" pitchFamily="0" charset="0"/>
+                <a:cs typeface="Alien Encounters" pitchFamily="0" charset="0"/>
+              </a:rPr>
+              <a:t>Transaction 1</a:t>
+            </a:r>
+          </a:p>
+        </p:txBody>
+      </p:sp>
+      <p:sp>
+        <p:nvSpPr>
+          <p:cNvPr id="20" name="Text 20"/>
+          <p:cNvSpPr txBox="1"/>
+          <p:nvPr/>
+        </p:nvSpPr>
+        <p:spPr>
+          <a:xfrm>
+            <a:off x="3898900" y="7454900"/>
+            <a:ext cx="2540000" cy="381000"/>
+          </a:xfrm>
+          <a:prstGeom prst="rect">
+            <a:avLst/>
+          </a:prstGeom>
+          <a:noFill/>
+        </p:spPr>
+        <p:txBody>
+          <a:bodyPr rtlCol="0" wrap="none" anchor="ctr"/>
+          <a:lstStyle/>
+          <a:p>
+            <a:pPr algn="l"/>
+            <a:r>
+              <a:rPr lang="en-US" smtClean="0" sz="2000">
+                <a:solidFill>
+                  <a:srgbClr val="000000"/>
+                </a:solidFill>
+                <a:latin typeface="Alien Encounters" pitchFamily="0" charset="0"/>
+                <a:cs typeface="Alien Encounters" pitchFamily="0" charset="0"/>
+              </a:rPr>
+              <a:t>Transaction 2</a:t>
+            </a:r>
+          </a:p>
+        </p:txBody>
+      </p:sp>
+      <p:sp>
+        <p:nvSpPr>
+          <p:cNvPr id="21" name="Text 21"/>
+          <p:cNvSpPr txBox="1"/>
+          <p:nvPr/>
+        </p:nvSpPr>
+        <p:spPr>
+          <a:xfrm>
+            <a:off x="3886200" y="7975600"/>
+            <a:ext cx="2540000" cy="381000"/>
+          </a:xfrm>
+          <a:prstGeom prst="rect">
+            <a:avLst/>
+          </a:prstGeom>
+          <a:noFill/>
+        </p:spPr>
+        <p:txBody>
+          <a:bodyPr rtlCol="0" wrap="none" anchor="ctr"/>
+          <a:lstStyle/>
+          <a:p>
+            <a:pPr algn="l"/>
+            <a:r>
+              <a:rPr lang="en-US" smtClean="0" sz="2000">
+                <a:solidFill>
+                  <a:srgbClr val="000000"/>
+                </a:solidFill>
+                <a:latin typeface="Alien Encounters" pitchFamily="0" charset="0"/>
+                <a:cs typeface="Alien Encounters" pitchFamily="0" charset="0"/>
+              </a:rPr>
+              <a:t>Transaction 3</a:t>
+            </a:r>
+          </a:p>
+        </p:txBody>
+      </p:sp>
+      <p:sp>
+        <p:nvSpPr>
+          <p:cNvPr id="22" name="Text 22"/>
+          <p:cNvSpPr txBox="1"/>
+          <p:nvPr/>
+        </p:nvSpPr>
+        <p:spPr>
+          <a:xfrm>
+            <a:off x="3632200" y="8585200"/>
+            <a:ext cx="2540000" cy="381000"/>
+          </a:xfrm>
+          <a:prstGeom prst="rect">
+            <a:avLst/>
+          </a:prstGeom>
+          <a:noFill/>
+        </p:spPr>
+        <p:txBody>
+          <a:bodyPr rtlCol="0" wrap="none" anchor="ctr"/>
+          <a:lstStyle/>
+          <a:p>
+            <a:pPr algn="l"/>
+            <a:r>
+              <a:rPr lang="en-US" smtClean="0" sz="2000">
+                <a:solidFill>
+                  <a:srgbClr val="000000"/>
+                </a:solidFill>
+                <a:latin typeface="Alien Encounters" pitchFamily="0" charset="0"/>
+                <a:cs typeface="Alien Encounters" pitchFamily="0" charset="0"/>
+              </a:rPr>
+              <a:t>Ledger of Node C</a:t>
             </a:r>
           </a:p>
         </p:txBody>

</xml_diff>